<commit_message>
no solar on hstab
</commit_message>
<xml_diff>
--- a/presentations/2020-6-15 Update.pptx
+++ b/presentations/2020-6-15 Update.pptx
@@ -3,18 +3,20 @@
 <p:presentation xmlns:a="http://schemas.openxmlformats.org/drawingml/2006/main" xmlns:r="http://schemas.openxmlformats.org/officeDocument/2006/relationships" xmlns:p="http://schemas.openxmlformats.org/presentationml/2006/main" showSpecialPlsOnTitleSld="0" saveSubsetFonts="1">
   <p:sldMasterIdLst>
     <p:sldMasterId id="2147483648" r:id="rId1"/>
+    <p:sldMasterId id="2147483658" r:id="rId2"/>
   </p:sldMasterIdLst>
   <p:notesMasterIdLst>
-    <p:notesMasterId r:id="rId9"/>
+    <p:notesMasterId r:id="rId11"/>
   </p:notesMasterIdLst>
   <p:sldIdLst>
-    <p:sldId id="256" r:id="rId2"/>
-    <p:sldId id="260" r:id="rId3"/>
-    <p:sldId id="257" r:id="rId4"/>
-    <p:sldId id="259" r:id="rId5"/>
-    <p:sldId id="261" r:id="rId6"/>
-    <p:sldId id="262" r:id="rId7"/>
-    <p:sldId id="258" r:id="rId8"/>
+    <p:sldId id="256" r:id="rId3"/>
+    <p:sldId id="260" r:id="rId4"/>
+    <p:sldId id="263" r:id="rId5"/>
+    <p:sldId id="257" r:id="rId6"/>
+    <p:sldId id="259" r:id="rId7"/>
+    <p:sldId id="261" r:id="rId8"/>
+    <p:sldId id="262" r:id="rId9"/>
+    <p:sldId id="258" r:id="rId10"/>
   </p:sldIdLst>
   <p:sldSz cx="12192000" cy="6858000"/>
   <p:notesSz cx="6858000" cy="9144000"/>
@@ -203,7 +205,7 @@
           <a:p>
             <a:fld id="{CF232345-023C-4565-94DD-7E2E5C54A001}" type="datetimeFigureOut">
               <a:rPr lang="en-US" smtClean="0"/>
-              <a:t>6/13/2020</a:t>
+              <a:t>6/14/2020</a:t>
             </a:fld>
             <a:endParaRPr lang="en-US"/>
           </a:p>
@@ -620,7 +622,7 @@
           <a:p>
             <a:fld id="{E96D3011-1EAD-478E-AF74-AE76F45D3B9B}" type="datetime1">
               <a:rPr lang="en-US" smtClean="0"/>
-              <a:t>6/13/2020</a:t>
+              <a:t>6/14/2020</a:t>
             </a:fld>
             <a:endParaRPr lang="en-US"/>
           </a:p>
@@ -768,6 +770,2397 @@
 </p:sldLayout>
 </file>
 
+<file path=ppt/slideLayouts/slideLayout10.xml><?xml version="1.0" encoding="utf-8"?>
+<p:sldLayout xmlns:a="http://schemas.openxmlformats.org/drawingml/2006/main" xmlns:r="http://schemas.openxmlformats.org/officeDocument/2006/relationships" xmlns:p="http://schemas.openxmlformats.org/presentationml/2006/main" type="title" preserve="1">
+  <p:cSld name="Title Slide">
+    <p:bg>
+      <p:bgPr>
+        <a:solidFill>
+          <a:schemeClr val="accent2"/>
+        </a:solidFill>
+        <a:effectLst/>
+      </p:bgPr>
+    </p:bg>
+    <p:spTree>
+      <p:nvGrpSpPr>
+        <p:cNvPr id="1" name=""/>
+        <p:cNvGrpSpPr/>
+        <p:nvPr/>
+      </p:nvGrpSpPr>
+      <p:grpSpPr>
+        <a:xfrm>
+          <a:off x="0" y="0"/>
+          <a:ext cx="0" cy="0"/>
+          <a:chOff x="0" y="0"/>
+          <a:chExt cx="0" cy="0"/>
+        </a:xfrm>
+      </p:grpSpPr>
+      <p:sp>
+        <p:nvSpPr>
+          <p:cNvPr id="2" name="Title 1"/>
+          <p:cNvSpPr>
+            <a:spLocks noGrp="1"/>
+          </p:cNvSpPr>
+          <p:nvPr>
+            <p:ph type="ctrTitle"/>
+          </p:nvPr>
+        </p:nvSpPr>
+        <p:spPr bwMode="blackWhite">
+          <a:xfrm>
+            <a:off x="1600200" y="2386744"/>
+            <a:ext cx="8991600" cy="1645920"/>
+          </a:xfrm>
+          <a:solidFill>
+            <a:srgbClr val="FFFFFF"/>
+          </a:solidFill>
+          <a:ln w="38100">
+            <a:solidFill>
+              <a:srgbClr val="404040"/>
+            </a:solidFill>
+          </a:ln>
+        </p:spPr>
+        <p:txBody>
+          <a:bodyPr lIns="274320" rIns="274320" anchor="ctr" anchorCtr="1">
+            <a:normAutofit/>
+          </a:bodyPr>
+          <a:lstStyle>
+            <a:lvl1pPr algn="ctr">
+              <a:defRPr sz="3800">
+                <a:solidFill>
+                  <a:srgbClr val="262626"/>
+                </a:solidFill>
+              </a:defRPr>
+            </a:lvl1pPr>
+          </a:lstStyle>
+          <a:p>
+            <a:r>
+              <a:rPr lang="en-US"/>
+              <a:t>Click to edit Master title style</a:t>
+            </a:r>
+            <a:endParaRPr lang="en-US" dirty="0"/>
+          </a:p>
+        </p:txBody>
+      </p:sp>
+      <p:sp>
+        <p:nvSpPr>
+          <p:cNvPr id="3" name="Subtitle 2"/>
+          <p:cNvSpPr>
+            <a:spLocks noGrp="1"/>
+          </p:cNvSpPr>
+          <p:nvPr>
+            <p:ph type="subTitle" idx="1"/>
+          </p:nvPr>
+        </p:nvSpPr>
+        <p:spPr>
+          <a:xfrm>
+            <a:off x="2695194" y="4352544"/>
+            <a:ext cx="6801612" cy="1239894"/>
+          </a:xfrm>
+          <a:noFill/>
+        </p:spPr>
+        <p:txBody>
+          <a:bodyPr>
+            <a:normAutofit/>
+          </a:bodyPr>
+          <a:lstStyle>
+            <a:lvl1pPr marL="0" indent="0" algn="ctr">
+              <a:buNone/>
+              <a:defRPr sz="2000">
+                <a:solidFill>
+                  <a:schemeClr val="tx1">
+                    <a:lumMod val="75000"/>
+                    <a:lumOff val="25000"/>
+                  </a:schemeClr>
+                </a:solidFill>
+              </a:defRPr>
+            </a:lvl1pPr>
+            <a:lvl2pPr marL="457200" indent="0" algn="ctr">
+              <a:buNone/>
+              <a:defRPr sz="2000"/>
+            </a:lvl2pPr>
+            <a:lvl3pPr marL="914400" indent="0" algn="ctr">
+              <a:buNone/>
+              <a:defRPr sz="1800"/>
+            </a:lvl3pPr>
+            <a:lvl4pPr marL="1371600" indent="0" algn="ctr">
+              <a:buNone/>
+              <a:defRPr sz="1600"/>
+            </a:lvl4pPr>
+            <a:lvl5pPr marL="1828800" indent="0" algn="ctr">
+              <a:buNone/>
+              <a:defRPr sz="1600"/>
+            </a:lvl5pPr>
+            <a:lvl6pPr marL="2286000" indent="0" algn="ctr">
+              <a:buNone/>
+              <a:defRPr sz="1600"/>
+            </a:lvl6pPr>
+            <a:lvl7pPr marL="2743200" indent="0" algn="ctr">
+              <a:buNone/>
+              <a:defRPr sz="1600"/>
+            </a:lvl7pPr>
+            <a:lvl8pPr marL="3200400" indent="0" algn="ctr">
+              <a:buNone/>
+              <a:defRPr sz="1600"/>
+            </a:lvl8pPr>
+            <a:lvl9pPr marL="3657600" indent="0" algn="ctr">
+              <a:buNone/>
+              <a:defRPr sz="1600"/>
+            </a:lvl9pPr>
+          </a:lstStyle>
+          <a:p>
+            <a:r>
+              <a:rPr lang="en-US"/>
+              <a:t>Click to edit Master subtitle style</a:t>
+            </a:r>
+            <a:endParaRPr lang="en-US" dirty="0"/>
+          </a:p>
+        </p:txBody>
+      </p:sp>
+      <p:sp>
+        <p:nvSpPr>
+          <p:cNvPr id="7" name="Date Placeholder 6"/>
+          <p:cNvSpPr>
+            <a:spLocks noGrp="1"/>
+          </p:cNvSpPr>
+          <p:nvPr>
+            <p:ph type="dt" sz="half" idx="10"/>
+          </p:nvPr>
+        </p:nvSpPr>
+        <p:spPr/>
+        <p:txBody>
+          <a:bodyPr/>
+          <a:lstStyle/>
+          <a:p>
+            <a:fld id="{1160EA64-D806-43AC-9DF2-F8C432F32B4C}" type="datetimeFigureOut">
+              <a:rPr lang="en-US" dirty="0"/>
+              <a:t>6/14/2020</a:t>
+            </a:fld>
+            <a:endParaRPr lang="en-US" dirty="0"/>
+          </a:p>
+        </p:txBody>
+      </p:sp>
+      <p:sp>
+        <p:nvSpPr>
+          <p:cNvPr id="8" name="Footer Placeholder 7"/>
+          <p:cNvSpPr>
+            <a:spLocks noGrp="1"/>
+          </p:cNvSpPr>
+          <p:nvPr>
+            <p:ph type="ftr" sz="quarter" idx="11"/>
+          </p:nvPr>
+        </p:nvSpPr>
+        <p:spPr/>
+        <p:txBody>
+          <a:bodyPr/>
+          <a:lstStyle/>
+          <a:p>
+            <a:endParaRPr lang="en-US" dirty="0"/>
+          </a:p>
+        </p:txBody>
+      </p:sp>
+      <p:sp>
+        <p:nvSpPr>
+          <p:cNvPr id="9" name="Slide Number Placeholder 8"/>
+          <p:cNvSpPr>
+            <a:spLocks noGrp="1"/>
+          </p:cNvSpPr>
+          <p:nvPr>
+            <p:ph type="sldNum" sz="quarter" idx="12"/>
+          </p:nvPr>
+        </p:nvSpPr>
+        <p:spPr/>
+        <p:txBody>
+          <a:bodyPr/>
+          <a:lstStyle/>
+          <a:p>
+            <a:fld id="{8A7A6979-0714-4377-B894-6BE4C2D6E202}" type="slidenum">
+              <a:rPr lang="en-US" dirty="0"/>
+              <a:pPr/>
+              <a:t>‹#›</a:t>
+            </a:fld>
+            <a:endParaRPr lang="en-US" dirty="0"/>
+          </a:p>
+        </p:txBody>
+      </p:sp>
+    </p:spTree>
+    <p:extLst>
+      <p:ext uri="{BB962C8B-B14F-4D97-AF65-F5344CB8AC3E}">
+        <p14:creationId xmlns:p14="http://schemas.microsoft.com/office/powerpoint/2010/main" val="1500962909"/>
+      </p:ext>
+    </p:extLst>
+  </p:cSld>
+  <p:clrMapOvr>
+    <a:overrideClrMapping bg1="dk1" tx1="lt1" bg2="dk2" tx2="lt2" accent1="accent1" accent2="accent2" accent3="accent3" accent4="accent4" accent5="accent5" accent6="accent6" hlink="hlink" folHlink="folHlink"/>
+  </p:clrMapOvr>
+</p:sldLayout>
+</file>
+
+<file path=ppt/slideLayouts/slideLayout11.xml><?xml version="1.0" encoding="utf-8"?>
+<p:sldLayout xmlns:a="http://schemas.openxmlformats.org/drawingml/2006/main" xmlns:r="http://schemas.openxmlformats.org/officeDocument/2006/relationships" xmlns:p="http://schemas.openxmlformats.org/presentationml/2006/main" type="obj" preserve="1">
+  <p:cSld name="Title and Content">
+    <p:spTree>
+      <p:nvGrpSpPr>
+        <p:cNvPr id="1" name=""/>
+        <p:cNvGrpSpPr/>
+        <p:nvPr/>
+      </p:nvGrpSpPr>
+      <p:grpSpPr>
+        <a:xfrm>
+          <a:off x="0" y="0"/>
+          <a:ext cx="0" cy="0"/>
+          <a:chOff x="0" y="0"/>
+          <a:chExt cx="0" cy="0"/>
+        </a:xfrm>
+      </p:grpSpPr>
+      <p:sp>
+        <p:nvSpPr>
+          <p:cNvPr id="2" name="Title 1"/>
+          <p:cNvSpPr>
+            <a:spLocks noGrp="1"/>
+          </p:cNvSpPr>
+          <p:nvPr>
+            <p:ph type="title"/>
+          </p:nvPr>
+        </p:nvSpPr>
+        <p:spPr/>
+        <p:txBody>
+          <a:bodyPr/>
+          <a:lstStyle/>
+          <a:p>
+            <a:r>
+              <a:rPr lang="en-US"/>
+              <a:t>Click to edit Master title style</a:t>
+            </a:r>
+            <a:endParaRPr lang="en-US" dirty="0"/>
+          </a:p>
+        </p:txBody>
+      </p:sp>
+      <p:sp>
+        <p:nvSpPr>
+          <p:cNvPr id="3" name="Content Placeholder 2"/>
+          <p:cNvSpPr>
+            <a:spLocks noGrp="1"/>
+          </p:cNvSpPr>
+          <p:nvPr>
+            <p:ph idx="1"/>
+          </p:nvPr>
+        </p:nvSpPr>
+        <p:spPr/>
+        <p:txBody>
+          <a:bodyPr/>
+          <a:lstStyle/>
+          <a:p>
+            <a:pPr lvl="0"/>
+            <a:r>
+              <a:rPr lang="en-US"/>
+              <a:t>Click to edit Master text styles</a:t>
+            </a:r>
+          </a:p>
+          <a:p>
+            <a:pPr lvl="1"/>
+            <a:r>
+              <a:rPr lang="en-US"/>
+              <a:t>Second level</a:t>
+            </a:r>
+          </a:p>
+          <a:p>
+            <a:pPr lvl="2"/>
+            <a:r>
+              <a:rPr lang="en-US"/>
+              <a:t>Third level</a:t>
+            </a:r>
+          </a:p>
+          <a:p>
+            <a:pPr lvl="3"/>
+            <a:r>
+              <a:rPr lang="en-US"/>
+              <a:t>Fourth level</a:t>
+            </a:r>
+          </a:p>
+          <a:p>
+            <a:pPr lvl="4"/>
+            <a:r>
+              <a:rPr lang="en-US"/>
+              <a:t>Fifth level</a:t>
+            </a:r>
+            <a:endParaRPr lang="en-US" dirty="0"/>
+          </a:p>
+        </p:txBody>
+      </p:sp>
+      <p:sp>
+        <p:nvSpPr>
+          <p:cNvPr id="7" name="Date Placeholder 6"/>
+          <p:cNvSpPr>
+            <a:spLocks noGrp="1"/>
+          </p:cNvSpPr>
+          <p:nvPr>
+            <p:ph type="dt" sz="half" idx="10"/>
+          </p:nvPr>
+        </p:nvSpPr>
+        <p:spPr/>
+        <p:txBody>
+          <a:bodyPr/>
+          <a:lstStyle/>
+          <a:p>
+            <a:fld id="{F070A7B3-6521-4DCA-87E5-044747A908C1}" type="datetimeFigureOut">
+              <a:rPr lang="en-US" dirty="0"/>
+              <a:t>6/14/2020</a:t>
+            </a:fld>
+            <a:endParaRPr lang="en-US" dirty="0"/>
+          </a:p>
+        </p:txBody>
+      </p:sp>
+      <p:sp>
+        <p:nvSpPr>
+          <p:cNvPr id="8" name="Footer Placeholder 7"/>
+          <p:cNvSpPr>
+            <a:spLocks noGrp="1"/>
+          </p:cNvSpPr>
+          <p:nvPr>
+            <p:ph type="ftr" sz="quarter" idx="11"/>
+          </p:nvPr>
+        </p:nvSpPr>
+        <p:spPr/>
+        <p:txBody>
+          <a:bodyPr/>
+          <a:lstStyle/>
+          <a:p>
+            <a:endParaRPr lang="en-US" dirty="0"/>
+          </a:p>
+        </p:txBody>
+      </p:sp>
+      <p:sp>
+        <p:nvSpPr>
+          <p:cNvPr id="9" name="Slide Number Placeholder 8"/>
+          <p:cNvSpPr>
+            <a:spLocks noGrp="1"/>
+          </p:cNvSpPr>
+          <p:nvPr>
+            <p:ph type="sldNum" sz="quarter" idx="12"/>
+          </p:nvPr>
+        </p:nvSpPr>
+        <p:spPr/>
+        <p:txBody>
+          <a:bodyPr/>
+          <a:lstStyle/>
+          <a:p>
+            <a:fld id="{8A7A6979-0714-4377-B894-6BE4C2D6E202}" type="slidenum">
+              <a:rPr lang="en-US" dirty="0"/>
+              <a:pPr/>
+              <a:t>‹#›</a:t>
+            </a:fld>
+            <a:endParaRPr lang="en-US" dirty="0"/>
+          </a:p>
+        </p:txBody>
+      </p:sp>
+    </p:spTree>
+    <p:extLst>
+      <p:ext uri="{BB962C8B-B14F-4D97-AF65-F5344CB8AC3E}">
+        <p14:creationId xmlns:p14="http://schemas.microsoft.com/office/powerpoint/2010/main" val="931464086"/>
+      </p:ext>
+    </p:extLst>
+  </p:cSld>
+  <p:clrMapOvr>
+    <a:masterClrMapping/>
+  </p:clrMapOvr>
+</p:sldLayout>
+</file>
+
+<file path=ppt/slideLayouts/slideLayout12.xml><?xml version="1.0" encoding="utf-8"?>
+<p:sldLayout xmlns:a="http://schemas.openxmlformats.org/drawingml/2006/main" xmlns:r="http://schemas.openxmlformats.org/officeDocument/2006/relationships" xmlns:p="http://schemas.openxmlformats.org/presentationml/2006/main" type="secHead" preserve="1">
+  <p:cSld name="Section Header">
+    <p:bg>
+      <p:bgPr>
+        <a:solidFill>
+          <a:schemeClr val="accent1"/>
+        </a:solidFill>
+        <a:effectLst/>
+      </p:bgPr>
+    </p:bg>
+    <p:spTree>
+      <p:nvGrpSpPr>
+        <p:cNvPr id="1" name=""/>
+        <p:cNvGrpSpPr/>
+        <p:nvPr/>
+      </p:nvGrpSpPr>
+      <p:grpSpPr>
+        <a:xfrm>
+          <a:off x="0" y="0"/>
+          <a:ext cx="0" cy="0"/>
+          <a:chOff x="0" y="0"/>
+          <a:chExt cx="0" cy="0"/>
+        </a:xfrm>
+      </p:grpSpPr>
+      <p:sp>
+        <p:nvSpPr>
+          <p:cNvPr id="2" name="Title 1"/>
+          <p:cNvSpPr>
+            <a:spLocks noGrp="1"/>
+          </p:cNvSpPr>
+          <p:nvPr>
+            <p:ph type="title"/>
+          </p:nvPr>
+        </p:nvSpPr>
+        <p:spPr bwMode="blackWhite">
+          <a:xfrm>
+            <a:off x="1600200" y="2386744"/>
+            <a:ext cx="8991600" cy="1645920"/>
+          </a:xfrm>
+          <a:solidFill>
+            <a:srgbClr val="FFFFFF"/>
+          </a:solidFill>
+          <a:ln w="38100">
+            <a:solidFill>
+              <a:srgbClr val="404040"/>
+            </a:solidFill>
+          </a:ln>
+        </p:spPr>
+        <p:txBody>
+          <a:bodyPr lIns="274320" rIns="274320" anchor="ctr" anchorCtr="1">
+            <a:normAutofit/>
+          </a:bodyPr>
+          <a:lstStyle>
+            <a:lvl1pPr>
+              <a:defRPr sz="3800">
+                <a:solidFill>
+                  <a:srgbClr val="262626"/>
+                </a:solidFill>
+              </a:defRPr>
+            </a:lvl1pPr>
+          </a:lstStyle>
+          <a:p>
+            <a:r>
+              <a:rPr lang="en-US"/>
+              <a:t>Click to edit Master title style</a:t>
+            </a:r>
+            <a:endParaRPr lang="en-US" dirty="0"/>
+          </a:p>
+        </p:txBody>
+      </p:sp>
+      <p:sp>
+        <p:nvSpPr>
+          <p:cNvPr id="3" name="Text Placeholder 2"/>
+          <p:cNvSpPr>
+            <a:spLocks noGrp="1"/>
+          </p:cNvSpPr>
+          <p:nvPr>
+            <p:ph type="body" idx="1"/>
+          </p:nvPr>
+        </p:nvSpPr>
+        <p:spPr>
+          <a:xfrm>
+            <a:off x="2695194" y="4352465"/>
+            <a:ext cx="6801612" cy="1265082"/>
+          </a:xfrm>
+        </p:spPr>
+        <p:txBody>
+          <a:bodyPr anchor="t" anchorCtr="1">
+            <a:normAutofit/>
+          </a:bodyPr>
+          <a:lstStyle>
+            <a:lvl1pPr marL="0" indent="0">
+              <a:buNone/>
+              <a:defRPr sz="2000">
+                <a:solidFill>
+                  <a:schemeClr val="tx1"/>
+                </a:solidFill>
+              </a:defRPr>
+            </a:lvl1pPr>
+            <a:lvl2pPr marL="457200" indent="0">
+              <a:buNone/>
+              <a:defRPr sz="2000">
+                <a:solidFill>
+                  <a:schemeClr val="tx1">
+                    <a:tint val="75000"/>
+                  </a:schemeClr>
+                </a:solidFill>
+              </a:defRPr>
+            </a:lvl2pPr>
+            <a:lvl3pPr marL="914400" indent="0">
+              <a:buNone/>
+              <a:defRPr sz="1800">
+                <a:solidFill>
+                  <a:schemeClr val="tx1">
+                    <a:tint val="75000"/>
+                  </a:schemeClr>
+                </a:solidFill>
+              </a:defRPr>
+            </a:lvl3pPr>
+            <a:lvl4pPr marL="1371600" indent="0">
+              <a:buNone/>
+              <a:defRPr sz="1600">
+                <a:solidFill>
+                  <a:schemeClr val="tx1">
+                    <a:tint val="75000"/>
+                  </a:schemeClr>
+                </a:solidFill>
+              </a:defRPr>
+            </a:lvl4pPr>
+            <a:lvl5pPr marL="1828800" indent="0">
+              <a:buNone/>
+              <a:defRPr sz="1600">
+                <a:solidFill>
+                  <a:schemeClr val="tx1">
+                    <a:tint val="75000"/>
+                  </a:schemeClr>
+                </a:solidFill>
+              </a:defRPr>
+            </a:lvl5pPr>
+            <a:lvl6pPr marL="2286000" indent="0">
+              <a:buNone/>
+              <a:defRPr sz="1600">
+                <a:solidFill>
+                  <a:schemeClr val="tx1">
+                    <a:tint val="75000"/>
+                  </a:schemeClr>
+                </a:solidFill>
+              </a:defRPr>
+            </a:lvl6pPr>
+            <a:lvl7pPr marL="2743200" indent="0">
+              <a:buNone/>
+              <a:defRPr sz="1600">
+                <a:solidFill>
+                  <a:schemeClr val="tx1">
+                    <a:tint val="75000"/>
+                  </a:schemeClr>
+                </a:solidFill>
+              </a:defRPr>
+            </a:lvl7pPr>
+            <a:lvl8pPr marL="3200400" indent="0">
+              <a:buNone/>
+              <a:defRPr sz="1600">
+                <a:solidFill>
+                  <a:schemeClr val="tx1">
+                    <a:tint val="75000"/>
+                  </a:schemeClr>
+                </a:solidFill>
+              </a:defRPr>
+            </a:lvl8pPr>
+            <a:lvl9pPr marL="3657600" indent="0">
+              <a:buNone/>
+              <a:defRPr sz="1600">
+                <a:solidFill>
+                  <a:schemeClr val="tx1">
+                    <a:tint val="75000"/>
+                  </a:schemeClr>
+                </a:solidFill>
+              </a:defRPr>
+            </a:lvl9pPr>
+          </a:lstStyle>
+          <a:p>
+            <a:pPr lvl="0"/>
+            <a:r>
+              <a:rPr lang="en-US"/>
+              <a:t>Click to edit Master text styles</a:t>
+            </a:r>
+          </a:p>
+        </p:txBody>
+      </p:sp>
+      <p:sp>
+        <p:nvSpPr>
+          <p:cNvPr id="7" name="Date Placeholder 6"/>
+          <p:cNvSpPr>
+            <a:spLocks noGrp="1"/>
+          </p:cNvSpPr>
+          <p:nvPr>
+            <p:ph type="dt" sz="half" idx="10"/>
+          </p:nvPr>
+        </p:nvSpPr>
+        <p:spPr/>
+        <p:txBody>
+          <a:bodyPr/>
+          <a:lstStyle/>
+          <a:p>
+            <a:fld id="{1160EA64-D806-43AC-9DF2-F8C432F32B4C}" type="datetimeFigureOut">
+              <a:rPr lang="en-US" dirty="0"/>
+              <a:t>6/14/2020</a:t>
+            </a:fld>
+            <a:endParaRPr lang="en-US" dirty="0"/>
+          </a:p>
+        </p:txBody>
+      </p:sp>
+      <p:sp>
+        <p:nvSpPr>
+          <p:cNvPr id="8" name="Footer Placeholder 7"/>
+          <p:cNvSpPr>
+            <a:spLocks noGrp="1"/>
+          </p:cNvSpPr>
+          <p:nvPr>
+            <p:ph type="ftr" sz="quarter" idx="11"/>
+          </p:nvPr>
+        </p:nvSpPr>
+        <p:spPr/>
+        <p:txBody>
+          <a:bodyPr/>
+          <a:lstStyle/>
+          <a:p>
+            <a:endParaRPr lang="en-US" dirty="0"/>
+          </a:p>
+        </p:txBody>
+      </p:sp>
+      <p:sp>
+        <p:nvSpPr>
+          <p:cNvPr id="9" name="Slide Number Placeholder 8"/>
+          <p:cNvSpPr>
+            <a:spLocks noGrp="1"/>
+          </p:cNvSpPr>
+          <p:nvPr>
+            <p:ph type="sldNum" sz="quarter" idx="12"/>
+          </p:nvPr>
+        </p:nvSpPr>
+        <p:spPr/>
+        <p:txBody>
+          <a:bodyPr/>
+          <a:lstStyle/>
+          <a:p>
+            <a:fld id="{8A7A6979-0714-4377-B894-6BE4C2D6E202}" type="slidenum">
+              <a:rPr lang="en-US" dirty="0"/>
+              <a:pPr/>
+              <a:t>‹#›</a:t>
+            </a:fld>
+            <a:endParaRPr lang="en-US" dirty="0"/>
+          </a:p>
+        </p:txBody>
+      </p:sp>
+    </p:spTree>
+    <p:extLst>
+      <p:ext uri="{BB962C8B-B14F-4D97-AF65-F5344CB8AC3E}">
+        <p14:creationId xmlns:p14="http://schemas.microsoft.com/office/powerpoint/2010/main" val="3471948417"/>
+      </p:ext>
+    </p:extLst>
+  </p:cSld>
+  <p:clrMapOvr>
+    <a:overrideClrMapping bg1="dk1" tx1="lt1" bg2="dk2" tx2="lt2" accent1="accent1" accent2="accent2" accent3="accent3" accent4="accent4" accent5="accent5" accent6="accent6" hlink="hlink" folHlink="folHlink"/>
+  </p:clrMapOvr>
+</p:sldLayout>
+</file>
+
+<file path=ppt/slideLayouts/slideLayout13.xml><?xml version="1.0" encoding="utf-8"?>
+<p:sldLayout xmlns:a="http://schemas.openxmlformats.org/drawingml/2006/main" xmlns:r="http://schemas.openxmlformats.org/officeDocument/2006/relationships" xmlns:p="http://schemas.openxmlformats.org/presentationml/2006/main" type="twoObj" preserve="1">
+  <p:cSld name="Two Content">
+    <p:spTree>
+      <p:nvGrpSpPr>
+        <p:cNvPr id="1" name=""/>
+        <p:cNvGrpSpPr/>
+        <p:nvPr/>
+      </p:nvGrpSpPr>
+      <p:grpSpPr>
+        <a:xfrm>
+          <a:off x="0" y="0"/>
+          <a:ext cx="0" cy="0"/>
+          <a:chOff x="0" y="0"/>
+          <a:chExt cx="0" cy="0"/>
+        </a:xfrm>
+      </p:grpSpPr>
+      <p:sp>
+        <p:nvSpPr>
+          <p:cNvPr id="2" name="Title 1"/>
+          <p:cNvSpPr>
+            <a:spLocks noGrp="1"/>
+          </p:cNvSpPr>
+          <p:nvPr>
+            <p:ph type="title"/>
+          </p:nvPr>
+        </p:nvSpPr>
+        <p:spPr/>
+        <p:txBody>
+          <a:bodyPr/>
+          <a:lstStyle/>
+          <a:p>
+            <a:r>
+              <a:rPr lang="en-US"/>
+              <a:t>Click to edit Master title style</a:t>
+            </a:r>
+            <a:endParaRPr lang="en-US" dirty="0"/>
+          </a:p>
+        </p:txBody>
+      </p:sp>
+      <p:sp>
+        <p:nvSpPr>
+          <p:cNvPr id="3" name="Content Placeholder 2"/>
+          <p:cNvSpPr>
+            <a:spLocks noGrp="1"/>
+          </p:cNvSpPr>
+          <p:nvPr>
+            <p:ph sz="half" idx="1"/>
+          </p:nvPr>
+        </p:nvSpPr>
+        <p:spPr>
+          <a:xfrm>
+            <a:off x="1581912" y="2638044"/>
+            <a:ext cx="4271771" cy="3101982"/>
+          </a:xfrm>
+        </p:spPr>
+        <p:txBody>
+          <a:bodyPr/>
+          <a:lstStyle/>
+          <a:p>
+            <a:pPr lvl="0"/>
+            <a:r>
+              <a:rPr lang="en-US"/>
+              <a:t>Click to edit Master text styles</a:t>
+            </a:r>
+          </a:p>
+          <a:p>
+            <a:pPr lvl="1"/>
+            <a:r>
+              <a:rPr lang="en-US"/>
+              <a:t>Second level</a:t>
+            </a:r>
+          </a:p>
+          <a:p>
+            <a:pPr lvl="2"/>
+            <a:r>
+              <a:rPr lang="en-US"/>
+              <a:t>Third level</a:t>
+            </a:r>
+          </a:p>
+          <a:p>
+            <a:pPr lvl="3"/>
+            <a:r>
+              <a:rPr lang="en-US"/>
+              <a:t>Fourth level</a:t>
+            </a:r>
+          </a:p>
+          <a:p>
+            <a:pPr lvl="4"/>
+            <a:r>
+              <a:rPr lang="en-US"/>
+              <a:t>Fifth level</a:t>
+            </a:r>
+            <a:endParaRPr lang="en-US" dirty="0"/>
+          </a:p>
+        </p:txBody>
+      </p:sp>
+      <p:sp>
+        <p:nvSpPr>
+          <p:cNvPr id="4" name="Content Placeholder 3"/>
+          <p:cNvSpPr>
+            <a:spLocks noGrp="1"/>
+          </p:cNvSpPr>
+          <p:nvPr>
+            <p:ph sz="half" idx="2"/>
+          </p:nvPr>
+        </p:nvSpPr>
+        <p:spPr>
+          <a:xfrm>
+            <a:off x="6338315" y="2638044"/>
+            <a:ext cx="4270247" cy="3101982"/>
+          </a:xfrm>
+        </p:spPr>
+        <p:txBody>
+          <a:bodyPr/>
+          <a:lstStyle/>
+          <a:p>
+            <a:pPr lvl="0"/>
+            <a:r>
+              <a:rPr lang="en-US"/>
+              <a:t>Click to edit Master text styles</a:t>
+            </a:r>
+          </a:p>
+          <a:p>
+            <a:pPr lvl="1"/>
+            <a:r>
+              <a:rPr lang="en-US"/>
+              <a:t>Second level</a:t>
+            </a:r>
+          </a:p>
+          <a:p>
+            <a:pPr lvl="2"/>
+            <a:r>
+              <a:rPr lang="en-US"/>
+              <a:t>Third level</a:t>
+            </a:r>
+          </a:p>
+          <a:p>
+            <a:pPr lvl="3"/>
+            <a:r>
+              <a:rPr lang="en-US"/>
+              <a:t>Fourth level</a:t>
+            </a:r>
+          </a:p>
+          <a:p>
+            <a:pPr lvl="4"/>
+            <a:r>
+              <a:rPr lang="en-US"/>
+              <a:t>Fifth level</a:t>
+            </a:r>
+            <a:endParaRPr lang="en-US" dirty="0"/>
+          </a:p>
+        </p:txBody>
+      </p:sp>
+      <p:sp>
+        <p:nvSpPr>
+          <p:cNvPr id="8" name="Date Placeholder 7"/>
+          <p:cNvSpPr>
+            <a:spLocks noGrp="1"/>
+          </p:cNvSpPr>
+          <p:nvPr>
+            <p:ph type="dt" sz="half" idx="10"/>
+          </p:nvPr>
+        </p:nvSpPr>
+        <p:spPr/>
+        <p:txBody>
+          <a:bodyPr/>
+          <a:lstStyle/>
+          <a:p>
+            <a:fld id="{AB134690-1557-4C89-A502-4959FE7FAD70}" type="datetimeFigureOut">
+              <a:rPr lang="en-US" dirty="0"/>
+              <a:t>6/14/2020</a:t>
+            </a:fld>
+            <a:endParaRPr lang="en-US" dirty="0"/>
+          </a:p>
+        </p:txBody>
+      </p:sp>
+      <p:sp>
+        <p:nvSpPr>
+          <p:cNvPr id="9" name="Footer Placeholder 8"/>
+          <p:cNvSpPr>
+            <a:spLocks noGrp="1"/>
+          </p:cNvSpPr>
+          <p:nvPr>
+            <p:ph type="ftr" sz="quarter" idx="11"/>
+          </p:nvPr>
+        </p:nvSpPr>
+        <p:spPr/>
+        <p:txBody>
+          <a:bodyPr/>
+          <a:lstStyle/>
+          <a:p>
+            <a:endParaRPr lang="en-US" dirty="0"/>
+          </a:p>
+        </p:txBody>
+      </p:sp>
+      <p:sp>
+        <p:nvSpPr>
+          <p:cNvPr id="10" name="Slide Number Placeholder 9"/>
+          <p:cNvSpPr>
+            <a:spLocks noGrp="1"/>
+          </p:cNvSpPr>
+          <p:nvPr>
+            <p:ph type="sldNum" sz="quarter" idx="12"/>
+          </p:nvPr>
+        </p:nvSpPr>
+        <p:spPr/>
+        <p:txBody>
+          <a:bodyPr/>
+          <a:lstStyle/>
+          <a:p>
+            <a:fld id="{8A7A6979-0714-4377-B894-6BE4C2D6E202}" type="slidenum">
+              <a:rPr lang="en-US" dirty="0"/>
+              <a:t>‹#›</a:t>
+            </a:fld>
+            <a:endParaRPr lang="en-US" dirty="0"/>
+          </a:p>
+        </p:txBody>
+      </p:sp>
+    </p:spTree>
+    <p:extLst>
+      <p:ext uri="{BB962C8B-B14F-4D97-AF65-F5344CB8AC3E}">
+        <p14:creationId xmlns:p14="http://schemas.microsoft.com/office/powerpoint/2010/main" val="223104234"/>
+      </p:ext>
+    </p:extLst>
+  </p:cSld>
+  <p:clrMapOvr>
+    <a:masterClrMapping/>
+  </p:clrMapOvr>
+</p:sldLayout>
+</file>
+
+<file path=ppt/slideLayouts/slideLayout14.xml><?xml version="1.0" encoding="utf-8"?>
+<p:sldLayout xmlns:a="http://schemas.openxmlformats.org/drawingml/2006/main" xmlns:r="http://schemas.openxmlformats.org/officeDocument/2006/relationships" xmlns:p="http://schemas.openxmlformats.org/presentationml/2006/main" type="twoTxTwoObj" preserve="1">
+  <p:cSld name="Comparison">
+    <p:spTree>
+      <p:nvGrpSpPr>
+        <p:cNvPr id="1" name=""/>
+        <p:cNvGrpSpPr/>
+        <p:nvPr/>
+      </p:nvGrpSpPr>
+      <p:grpSpPr>
+        <a:xfrm>
+          <a:off x="0" y="0"/>
+          <a:ext cx="0" cy="0"/>
+          <a:chOff x="0" y="0"/>
+          <a:chExt cx="0" cy="0"/>
+        </a:xfrm>
+      </p:grpSpPr>
+      <p:sp>
+        <p:nvSpPr>
+          <p:cNvPr id="3" name="Text Placeholder 2"/>
+          <p:cNvSpPr>
+            <a:spLocks noGrp="1"/>
+          </p:cNvSpPr>
+          <p:nvPr>
+            <p:ph type="body" idx="1"/>
+          </p:nvPr>
+        </p:nvSpPr>
+        <p:spPr>
+          <a:xfrm>
+            <a:off x="1583436" y="2313433"/>
+            <a:ext cx="4270248" cy="704087"/>
+          </a:xfrm>
+        </p:spPr>
+        <p:txBody>
+          <a:bodyPr anchor="b" anchorCtr="1">
+            <a:normAutofit/>
+          </a:bodyPr>
+          <a:lstStyle>
+            <a:lvl1pPr marL="0" indent="0" algn="ctr">
+              <a:buNone/>
+              <a:defRPr sz="1900" b="0" cap="all" spc="100" baseline="0">
+                <a:solidFill>
+                  <a:schemeClr val="accent2">
+                    <a:lumMod val="75000"/>
+                  </a:schemeClr>
+                </a:solidFill>
+              </a:defRPr>
+            </a:lvl1pPr>
+            <a:lvl2pPr marL="457200" indent="0">
+              <a:buNone/>
+              <a:defRPr sz="1900" b="1"/>
+            </a:lvl2pPr>
+            <a:lvl3pPr marL="914400" indent="0">
+              <a:buNone/>
+              <a:defRPr sz="1800" b="1"/>
+            </a:lvl3pPr>
+            <a:lvl4pPr marL="1371600" indent="0">
+              <a:buNone/>
+              <a:defRPr sz="1600" b="1"/>
+            </a:lvl4pPr>
+            <a:lvl5pPr marL="1828800" indent="0">
+              <a:buNone/>
+              <a:defRPr sz="1600" b="1"/>
+            </a:lvl5pPr>
+            <a:lvl6pPr marL="2286000" indent="0">
+              <a:buNone/>
+              <a:defRPr sz="1600" b="1"/>
+            </a:lvl6pPr>
+            <a:lvl7pPr marL="2743200" indent="0">
+              <a:buNone/>
+              <a:defRPr sz="1600" b="1"/>
+            </a:lvl7pPr>
+            <a:lvl8pPr marL="3200400" indent="0">
+              <a:buNone/>
+              <a:defRPr sz="1600" b="1"/>
+            </a:lvl8pPr>
+            <a:lvl9pPr marL="3657600" indent="0">
+              <a:buNone/>
+              <a:defRPr sz="1600" b="1"/>
+            </a:lvl9pPr>
+          </a:lstStyle>
+          <a:p>
+            <a:pPr lvl="0"/>
+            <a:r>
+              <a:rPr lang="en-US"/>
+              <a:t>Click to edit Master text styles</a:t>
+            </a:r>
+          </a:p>
+        </p:txBody>
+      </p:sp>
+      <p:sp>
+        <p:nvSpPr>
+          <p:cNvPr id="4" name="Content Placeholder 3"/>
+          <p:cNvSpPr>
+            <a:spLocks noGrp="1"/>
+          </p:cNvSpPr>
+          <p:nvPr>
+            <p:ph sz="half" idx="2"/>
+          </p:nvPr>
+        </p:nvSpPr>
+        <p:spPr>
+          <a:xfrm>
+            <a:off x="1583436" y="3143250"/>
+            <a:ext cx="4270248" cy="2596776"/>
+          </a:xfrm>
+        </p:spPr>
+        <p:txBody>
+          <a:bodyPr/>
+          <a:lstStyle/>
+          <a:p>
+            <a:pPr lvl="0"/>
+            <a:r>
+              <a:rPr lang="en-US"/>
+              <a:t>Click to edit Master text styles</a:t>
+            </a:r>
+          </a:p>
+          <a:p>
+            <a:pPr lvl="1"/>
+            <a:r>
+              <a:rPr lang="en-US"/>
+              <a:t>Second level</a:t>
+            </a:r>
+          </a:p>
+          <a:p>
+            <a:pPr lvl="2"/>
+            <a:r>
+              <a:rPr lang="en-US"/>
+              <a:t>Third level</a:t>
+            </a:r>
+          </a:p>
+          <a:p>
+            <a:pPr lvl="3"/>
+            <a:r>
+              <a:rPr lang="en-US"/>
+              <a:t>Fourth level</a:t>
+            </a:r>
+          </a:p>
+          <a:p>
+            <a:pPr lvl="4"/>
+            <a:r>
+              <a:rPr lang="en-US"/>
+              <a:t>Fifth level</a:t>
+            </a:r>
+            <a:endParaRPr lang="en-US" dirty="0"/>
+          </a:p>
+        </p:txBody>
+      </p:sp>
+      <p:sp>
+        <p:nvSpPr>
+          <p:cNvPr id="6" name="Content Placeholder 5"/>
+          <p:cNvSpPr>
+            <a:spLocks noGrp="1"/>
+          </p:cNvSpPr>
+          <p:nvPr>
+            <p:ph sz="quarter" idx="4"/>
+          </p:nvPr>
+        </p:nvSpPr>
+        <p:spPr>
+          <a:xfrm>
+            <a:off x="6338316" y="3143250"/>
+            <a:ext cx="4253484" cy="2596776"/>
+          </a:xfrm>
+        </p:spPr>
+        <p:txBody>
+          <a:bodyPr/>
+          <a:lstStyle>
+            <a:lvl5pPr>
+              <a:defRPr/>
+            </a:lvl5pPr>
+          </a:lstStyle>
+          <a:p>
+            <a:pPr lvl="0"/>
+            <a:r>
+              <a:rPr lang="en-US"/>
+              <a:t>Click to edit Master text styles</a:t>
+            </a:r>
+          </a:p>
+          <a:p>
+            <a:pPr lvl="1"/>
+            <a:r>
+              <a:rPr lang="en-US"/>
+              <a:t>Second level</a:t>
+            </a:r>
+          </a:p>
+          <a:p>
+            <a:pPr lvl="2"/>
+            <a:r>
+              <a:rPr lang="en-US"/>
+              <a:t>Third level</a:t>
+            </a:r>
+          </a:p>
+          <a:p>
+            <a:pPr lvl="3"/>
+            <a:r>
+              <a:rPr lang="en-US"/>
+              <a:t>Fourth level</a:t>
+            </a:r>
+          </a:p>
+          <a:p>
+            <a:pPr lvl="4"/>
+            <a:r>
+              <a:rPr lang="en-US"/>
+              <a:t>Fifth level</a:t>
+            </a:r>
+            <a:endParaRPr lang="en-US" dirty="0"/>
+          </a:p>
+        </p:txBody>
+      </p:sp>
+      <p:sp>
+        <p:nvSpPr>
+          <p:cNvPr id="11" name="Text Placeholder 4"/>
+          <p:cNvSpPr>
+            <a:spLocks noGrp="1"/>
+          </p:cNvSpPr>
+          <p:nvPr>
+            <p:ph type="body" sz="quarter" idx="13"/>
+          </p:nvPr>
+        </p:nvSpPr>
+        <p:spPr>
+          <a:xfrm>
+            <a:off x="6338316" y="2313433"/>
+            <a:ext cx="4270248" cy="704087"/>
+          </a:xfrm>
+        </p:spPr>
+        <p:txBody>
+          <a:bodyPr anchor="b" anchorCtr="1">
+            <a:normAutofit/>
+          </a:bodyPr>
+          <a:lstStyle>
+            <a:lvl1pPr marL="0" indent="0" algn="ctr">
+              <a:buNone/>
+              <a:defRPr sz="1900" b="0" cap="all" spc="100" baseline="0">
+                <a:solidFill>
+                  <a:schemeClr val="accent2">
+                    <a:lumMod val="75000"/>
+                  </a:schemeClr>
+                </a:solidFill>
+              </a:defRPr>
+            </a:lvl1pPr>
+            <a:lvl2pPr marL="457200" indent="0">
+              <a:buNone/>
+              <a:defRPr sz="1900" b="1"/>
+            </a:lvl2pPr>
+            <a:lvl3pPr marL="914400" indent="0">
+              <a:buNone/>
+              <a:defRPr sz="1800" b="1"/>
+            </a:lvl3pPr>
+            <a:lvl4pPr marL="1371600" indent="0">
+              <a:buNone/>
+              <a:defRPr sz="1600" b="1"/>
+            </a:lvl4pPr>
+            <a:lvl5pPr marL="1828800" indent="0">
+              <a:buNone/>
+              <a:defRPr sz="1600" b="1"/>
+            </a:lvl5pPr>
+            <a:lvl6pPr marL="2286000" indent="0">
+              <a:buNone/>
+              <a:defRPr sz="1600" b="1"/>
+            </a:lvl6pPr>
+            <a:lvl7pPr marL="2743200" indent="0">
+              <a:buNone/>
+              <a:defRPr sz="1600" b="1"/>
+            </a:lvl7pPr>
+            <a:lvl8pPr marL="3200400" indent="0">
+              <a:buNone/>
+              <a:defRPr sz="1600" b="1"/>
+            </a:lvl8pPr>
+            <a:lvl9pPr marL="3657600" indent="0">
+              <a:buNone/>
+              <a:defRPr sz="1600" b="1"/>
+            </a:lvl9pPr>
+          </a:lstStyle>
+          <a:p>
+            <a:pPr lvl="0"/>
+            <a:r>
+              <a:rPr lang="en-US"/>
+              <a:t>Click to edit Master text styles</a:t>
+            </a:r>
+          </a:p>
+        </p:txBody>
+      </p:sp>
+      <p:sp>
+        <p:nvSpPr>
+          <p:cNvPr id="7" name="Date Placeholder 6"/>
+          <p:cNvSpPr>
+            <a:spLocks noGrp="1"/>
+          </p:cNvSpPr>
+          <p:nvPr>
+            <p:ph type="dt" sz="half" idx="10"/>
+          </p:nvPr>
+        </p:nvSpPr>
+        <p:spPr/>
+        <p:txBody>
+          <a:bodyPr/>
+          <a:lstStyle/>
+          <a:p>
+            <a:fld id="{4F7D4976-E339-4826-83B7-FBD03F55ECF8}" type="datetimeFigureOut">
+              <a:rPr lang="en-US" dirty="0"/>
+              <a:t>6/14/2020</a:t>
+            </a:fld>
+            <a:endParaRPr lang="en-US" dirty="0"/>
+          </a:p>
+        </p:txBody>
+      </p:sp>
+      <p:sp>
+        <p:nvSpPr>
+          <p:cNvPr id="8" name="Footer Placeholder 7"/>
+          <p:cNvSpPr>
+            <a:spLocks noGrp="1"/>
+          </p:cNvSpPr>
+          <p:nvPr>
+            <p:ph type="ftr" sz="quarter" idx="11"/>
+          </p:nvPr>
+        </p:nvSpPr>
+        <p:spPr/>
+        <p:txBody>
+          <a:bodyPr/>
+          <a:lstStyle/>
+          <a:p>
+            <a:endParaRPr lang="en-US" dirty="0"/>
+          </a:p>
+        </p:txBody>
+      </p:sp>
+      <p:sp>
+        <p:nvSpPr>
+          <p:cNvPr id="9" name="Slide Number Placeholder 8"/>
+          <p:cNvSpPr>
+            <a:spLocks noGrp="1"/>
+          </p:cNvSpPr>
+          <p:nvPr>
+            <p:ph type="sldNum" sz="quarter" idx="12"/>
+          </p:nvPr>
+        </p:nvSpPr>
+        <p:spPr/>
+        <p:txBody>
+          <a:bodyPr/>
+          <a:lstStyle/>
+          <a:p>
+            <a:fld id="{8A7A6979-0714-4377-B894-6BE4C2D6E202}" type="slidenum">
+              <a:rPr lang="en-US" dirty="0"/>
+              <a:t>‹#›</a:t>
+            </a:fld>
+            <a:endParaRPr lang="en-US" dirty="0"/>
+          </a:p>
+        </p:txBody>
+      </p:sp>
+      <p:sp>
+        <p:nvSpPr>
+          <p:cNvPr id="10" name="Title 9"/>
+          <p:cNvSpPr>
+            <a:spLocks noGrp="1"/>
+          </p:cNvSpPr>
+          <p:nvPr>
+            <p:ph type="title"/>
+          </p:nvPr>
+        </p:nvSpPr>
+        <p:spPr/>
+        <p:txBody>
+          <a:bodyPr/>
+          <a:lstStyle/>
+          <a:p>
+            <a:r>
+              <a:rPr lang="en-US"/>
+              <a:t>Click to edit Master title style</a:t>
+            </a:r>
+            <a:endParaRPr lang="en-US" dirty="0"/>
+          </a:p>
+        </p:txBody>
+      </p:sp>
+    </p:spTree>
+    <p:extLst>
+      <p:ext uri="{BB962C8B-B14F-4D97-AF65-F5344CB8AC3E}">
+        <p14:creationId xmlns:p14="http://schemas.microsoft.com/office/powerpoint/2010/main" val="17617104"/>
+      </p:ext>
+    </p:extLst>
+  </p:cSld>
+  <p:clrMapOvr>
+    <a:masterClrMapping/>
+  </p:clrMapOvr>
+</p:sldLayout>
+</file>
+
+<file path=ppt/slideLayouts/slideLayout15.xml><?xml version="1.0" encoding="utf-8"?>
+<p:sldLayout xmlns:a="http://schemas.openxmlformats.org/drawingml/2006/main" xmlns:r="http://schemas.openxmlformats.org/officeDocument/2006/relationships" xmlns:p="http://schemas.openxmlformats.org/presentationml/2006/main" type="titleOnly" preserve="1">
+  <p:cSld name="Title Only">
+    <p:spTree>
+      <p:nvGrpSpPr>
+        <p:cNvPr id="1" name=""/>
+        <p:cNvGrpSpPr/>
+        <p:nvPr/>
+      </p:nvGrpSpPr>
+      <p:grpSpPr>
+        <a:xfrm>
+          <a:off x="0" y="0"/>
+          <a:ext cx="0" cy="0"/>
+          <a:chOff x="0" y="0"/>
+          <a:chExt cx="0" cy="0"/>
+        </a:xfrm>
+      </p:grpSpPr>
+      <p:sp>
+        <p:nvSpPr>
+          <p:cNvPr id="2" name="Title 1"/>
+          <p:cNvSpPr>
+            <a:spLocks noGrp="1"/>
+          </p:cNvSpPr>
+          <p:nvPr>
+            <p:ph type="title"/>
+          </p:nvPr>
+        </p:nvSpPr>
+        <p:spPr/>
+        <p:txBody>
+          <a:bodyPr/>
+          <a:lstStyle/>
+          <a:p>
+            <a:r>
+              <a:rPr lang="en-US"/>
+              <a:t>Click to edit Master title style</a:t>
+            </a:r>
+            <a:endParaRPr lang="en-US" dirty="0"/>
+          </a:p>
+        </p:txBody>
+      </p:sp>
+      <p:sp>
+        <p:nvSpPr>
+          <p:cNvPr id="3" name="Date Placeholder 2"/>
+          <p:cNvSpPr>
+            <a:spLocks noGrp="1"/>
+          </p:cNvSpPr>
+          <p:nvPr>
+            <p:ph type="dt" sz="half" idx="10"/>
+          </p:nvPr>
+        </p:nvSpPr>
+        <p:spPr/>
+        <p:txBody>
+          <a:bodyPr/>
+          <a:lstStyle/>
+          <a:p>
+            <a:fld id="{E1037C31-9E7A-4F99-8774-A0E530DE1A42}" type="datetimeFigureOut">
+              <a:rPr lang="en-US" dirty="0"/>
+              <a:t>6/14/2020</a:t>
+            </a:fld>
+            <a:endParaRPr lang="en-US" dirty="0"/>
+          </a:p>
+        </p:txBody>
+      </p:sp>
+      <p:sp>
+        <p:nvSpPr>
+          <p:cNvPr id="4" name="Footer Placeholder 3"/>
+          <p:cNvSpPr>
+            <a:spLocks noGrp="1"/>
+          </p:cNvSpPr>
+          <p:nvPr>
+            <p:ph type="ftr" sz="quarter" idx="11"/>
+          </p:nvPr>
+        </p:nvSpPr>
+        <p:spPr/>
+        <p:txBody>
+          <a:bodyPr/>
+          <a:lstStyle/>
+          <a:p>
+            <a:endParaRPr lang="en-US" dirty="0"/>
+          </a:p>
+        </p:txBody>
+      </p:sp>
+      <p:sp>
+        <p:nvSpPr>
+          <p:cNvPr id="5" name="Slide Number Placeholder 4"/>
+          <p:cNvSpPr>
+            <a:spLocks noGrp="1"/>
+          </p:cNvSpPr>
+          <p:nvPr>
+            <p:ph type="sldNum" sz="quarter" idx="12"/>
+          </p:nvPr>
+        </p:nvSpPr>
+        <p:spPr/>
+        <p:txBody>
+          <a:bodyPr/>
+          <a:lstStyle/>
+          <a:p>
+            <a:fld id="{8A7A6979-0714-4377-B894-6BE4C2D6E202}" type="slidenum">
+              <a:rPr lang="en-US" dirty="0"/>
+              <a:t>‹#›</a:t>
+            </a:fld>
+            <a:endParaRPr lang="en-US" dirty="0"/>
+          </a:p>
+        </p:txBody>
+      </p:sp>
+    </p:spTree>
+    <p:extLst>
+      <p:ext uri="{BB962C8B-B14F-4D97-AF65-F5344CB8AC3E}">
+        <p14:creationId xmlns:p14="http://schemas.microsoft.com/office/powerpoint/2010/main" val="1448329987"/>
+      </p:ext>
+    </p:extLst>
+  </p:cSld>
+  <p:clrMapOvr>
+    <a:masterClrMapping/>
+  </p:clrMapOvr>
+</p:sldLayout>
+</file>
+
+<file path=ppt/slideLayouts/slideLayout16.xml><?xml version="1.0" encoding="utf-8"?>
+<p:sldLayout xmlns:a="http://schemas.openxmlformats.org/drawingml/2006/main" xmlns:r="http://schemas.openxmlformats.org/officeDocument/2006/relationships" xmlns:p="http://schemas.openxmlformats.org/presentationml/2006/main" type="blank" preserve="1">
+  <p:cSld name="Blank">
+    <p:spTree>
+      <p:nvGrpSpPr>
+        <p:cNvPr id="1" name=""/>
+        <p:cNvGrpSpPr/>
+        <p:nvPr/>
+      </p:nvGrpSpPr>
+      <p:grpSpPr>
+        <a:xfrm>
+          <a:off x="0" y="0"/>
+          <a:ext cx="0" cy="0"/>
+          <a:chOff x="0" y="0"/>
+          <a:chExt cx="0" cy="0"/>
+        </a:xfrm>
+      </p:grpSpPr>
+      <p:sp>
+        <p:nvSpPr>
+          <p:cNvPr id="2" name="Date Placeholder 1"/>
+          <p:cNvSpPr>
+            <a:spLocks noGrp="1"/>
+          </p:cNvSpPr>
+          <p:nvPr>
+            <p:ph type="dt" sz="half" idx="10"/>
+          </p:nvPr>
+        </p:nvSpPr>
+        <p:spPr/>
+        <p:txBody>
+          <a:bodyPr/>
+          <a:lstStyle/>
+          <a:p>
+            <a:fld id="{C278504F-A551-4DE0-9316-4DCD1D8CC752}" type="datetimeFigureOut">
+              <a:rPr lang="en-US" dirty="0"/>
+              <a:t>6/14/2020</a:t>
+            </a:fld>
+            <a:endParaRPr lang="en-US" dirty="0"/>
+          </a:p>
+        </p:txBody>
+      </p:sp>
+      <p:sp>
+        <p:nvSpPr>
+          <p:cNvPr id="3" name="Footer Placeholder 2"/>
+          <p:cNvSpPr>
+            <a:spLocks noGrp="1"/>
+          </p:cNvSpPr>
+          <p:nvPr>
+            <p:ph type="ftr" sz="quarter" idx="11"/>
+          </p:nvPr>
+        </p:nvSpPr>
+        <p:spPr/>
+        <p:txBody>
+          <a:bodyPr/>
+          <a:lstStyle/>
+          <a:p>
+            <a:endParaRPr lang="en-US" dirty="0"/>
+          </a:p>
+        </p:txBody>
+      </p:sp>
+      <p:sp>
+        <p:nvSpPr>
+          <p:cNvPr id="4" name="Slide Number Placeholder 3"/>
+          <p:cNvSpPr>
+            <a:spLocks noGrp="1"/>
+          </p:cNvSpPr>
+          <p:nvPr>
+            <p:ph type="sldNum" sz="quarter" idx="12"/>
+          </p:nvPr>
+        </p:nvSpPr>
+        <p:spPr/>
+        <p:txBody>
+          <a:bodyPr/>
+          <a:lstStyle/>
+          <a:p>
+            <a:fld id="{8A7A6979-0714-4377-B894-6BE4C2D6E202}" type="slidenum">
+              <a:rPr lang="en-US" dirty="0"/>
+              <a:t>‹#›</a:t>
+            </a:fld>
+            <a:endParaRPr lang="en-US" dirty="0"/>
+          </a:p>
+        </p:txBody>
+      </p:sp>
+    </p:spTree>
+    <p:extLst>
+      <p:ext uri="{BB962C8B-B14F-4D97-AF65-F5344CB8AC3E}">
+        <p14:creationId xmlns:p14="http://schemas.microsoft.com/office/powerpoint/2010/main" val="3233509218"/>
+      </p:ext>
+    </p:extLst>
+  </p:cSld>
+  <p:clrMapOvr>
+    <a:masterClrMapping/>
+  </p:clrMapOvr>
+</p:sldLayout>
+</file>
+
+<file path=ppt/slideLayouts/slideLayout17.xml><?xml version="1.0" encoding="utf-8"?>
+<p:sldLayout xmlns:a="http://schemas.openxmlformats.org/drawingml/2006/main" xmlns:r="http://schemas.openxmlformats.org/officeDocument/2006/relationships" xmlns:p="http://schemas.openxmlformats.org/presentationml/2006/main" type="objTx" preserve="1">
+  <p:cSld name="Content with Caption">
+    <p:spTree>
+      <p:nvGrpSpPr>
+        <p:cNvPr id="1" name=""/>
+        <p:cNvGrpSpPr/>
+        <p:nvPr/>
+      </p:nvGrpSpPr>
+      <p:grpSpPr>
+        <a:xfrm>
+          <a:off x="0" y="0"/>
+          <a:ext cx="0" cy="0"/>
+          <a:chOff x="0" y="0"/>
+          <a:chExt cx="0" cy="0"/>
+        </a:xfrm>
+      </p:grpSpPr>
+      <p:sp>
+        <p:nvSpPr>
+          <p:cNvPr id="26" name="Rectangle 25"/>
+          <p:cNvSpPr/>
+          <p:nvPr/>
+        </p:nvSpPr>
+        <p:spPr>
+          <a:xfrm>
+            <a:off x="0" y="0"/>
+            <a:ext cx="6096000" cy="6858000"/>
+          </a:xfrm>
+          <a:prstGeom prst="rect">
+            <a:avLst/>
+          </a:prstGeom>
+          <a:solidFill>
+            <a:schemeClr val="accent2"/>
+          </a:solidFill>
+          <a:ln>
+            <a:noFill/>
+          </a:ln>
+        </p:spPr>
+        <p:style>
+          <a:lnRef idx="2">
+            <a:schemeClr val="accent1">
+              <a:shade val="50000"/>
+            </a:schemeClr>
+          </a:lnRef>
+          <a:fillRef idx="1">
+            <a:schemeClr val="accent1"/>
+          </a:fillRef>
+          <a:effectRef idx="0">
+            <a:schemeClr val="accent1"/>
+          </a:effectRef>
+          <a:fontRef idx="minor">
+            <a:schemeClr val="lt1"/>
+          </a:fontRef>
+        </p:style>
+      </p:sp>
+      <p:sp>
+        <p:nvSpPr>
+          <p:cNvPr id="2" name="Title 1"/>
+          <p:cNvSpPr>
+            <a:spLocks noGrp="1"/>
+          </p:cNvSpPr>
+          <p:nvPr>
+            <p:ph type="title"/>
+          </p:nvPr>
+        </p:nvSpPr>
+        <p:spPr bwMode="blackWhite">
+          <a:xfrm>
+            <a:off x="804672" y="2243828"/>
+            <a:ext cx="4486656" cy="1141497"/>
+          </a:xfrm>
+          <a:solidFill>
+            <a:srgbClr val="FFFFFF"/>
+          </a:solidFill>
+          <a:ln>
+            <a:solidFill>
+              <a:srgbClr val="404040"/>
+            </a:solidFill>
+          </a:ln>
+        </p:spPr>
+        <p:txBody>
+          <a:bodyPr anchor="ctr" anchorCtr="1">
+            <a:normAutofit/>
+          </a:bodyPr>
+          <a:lstStyle>
+            <a:lvl1pPr>
+              <a:defRPr sz="2200">
+                <a:solidFill>
+                  <a:srgbClr val="262626"/>
+                </a:solidFill>
+              </a:defRPr>
+            </a:lvl1pPr>
+          </a:lstStyle>
+          <a:p>
+            <a:r>
+              <a:rPr lang="en-US"/>
+              <a:t>Click to edit Master title style</a:t>
+            </a:r>
+            <a:endParaRPr lang="en-US" dirty="0"/>
+          </a:p>
+        </p:txBody>
+      </p:sp>
+      <p:sp>
+        <p:nvSpPr>
+          <p:cNvPr id="3" name="Content Placeholder 2"/>
+          <p:cNvSpPr>
+            <a:spLocks noGrp="1"/>
+          </p:cNvSpPr>
+          <p:nvPr>
+            <p:ph idx="1"/>
+          </p:nvPr>
+        </p:nvSpPr>
+        <p:spPr>
+          <a:xfrm>
+            <a:off x="6736080" y="804672"/>
+            <a:ext cx="4815840" cy="5248656"/>
+          </a:xfrm>
+        </p:spPr>
+        <p:txBody>
+          <a:bodyPr>
+            <a:normAutofit/>
+          </a:bodyPr>
+          <a:lstStyle>
+            <a:lvl1pPr>
+              <a:defRPr sz="1900">
+                <a:solidFill>
+                  <a:schemeClr val="tx1"/>
+                </a:solidFill>
+              </a:defRPr>
+            </a:lvl1pPr>
+            <a:lvl2pPr>
+              <a:defRPr sz="1600">
+                <a:solidFill>
+                  <a:schemeClr val="tx1"/>
+                </a:solidFill>
+              </a:defRPr>
+            </a:lvl2pPr>
+            <a:lvl3pPr>
+              <a:defRPr sz="1600">
+                <a:solidFill>
+                  <a:schemeClr val="tx1"/>
+                </a:solidFill>
+              </a:defRPr>
+            </a:lvl3pPr>
+            <a:lvl4pPr>
+              <a:defRPr sz="1600">
+                <a:solidFill>
+                  <a:schemeClr val="tx1"/>
+                </a:solidFill>
+              </a:defRPr>
+            </a:lvl4pPr>
+            <a:lvl5pPr>
+              <a:defRPr sz="1600">
+                <a:solidFill>
+                  <a:schemeClr val="tx1"/>
+                </a:solidFill>
+              </a:defRPr>
+            </a:lvl5pPr>
+            <a:lvl6pPr>
+              <a:defRPr sz="1600"/>
+            </a:lvl6pPr>
+            <a:lvl7pPr>
+              <a:defRPr sz="1600"/>
+            </a:lvl7pPr>
+            <a:lvl8pPr>
+              <a:defRPr sz="1600"/>
+            </a:lvl8pPr>
+            <a:lvl9pPr>
+              <a:defRPr sz="1600"/>
+            </a:lvl9pPr>
+          </a:lstStyle>
+          <a:p>
+            <a:pPr lvl="0"/>
+            <a:r>
+              <a:rPr lang="en-US"/>
+              <a:t>Click to edit Master text styles</a:t>
+            </a:r>
+          </a:p>
+          <a:p>
+            <a:pPr lvl="1"/>
+            <a:r>
+              <a:rPr lang="en-US"/>
+              <a:t>Second level</a:t>
+            </a:r>
+          </a:p>
+          <a:p>
+            <a:pPr lvl="2"/>
+            <a:r>
+              <a:rPr lang="en-US"/>
+              <a:t>Third level</a:t>
+            </a:r>
+          </a:p>
+          <a:p>
+            <a:pPr lvl="3"/>
+            <a:r>
+              <a:rPr lang="en-US"/>
+              <a:t>Fourth level</a:t>
+            </a:r>
+          </a:p>
+          <a:p>
+            <a:pPr lvl="4"/>
+            <a:r>
+              <a:rPr lang="en-US"/>
+              <a:t>Fifth level</a:t>
+            </a:r>
+            <a:endParaRPr lang="en-US" dirty="0"/>
+          </a:p>
+        </p:txBody>
+      </p:sp>
+      <p:sp>
+        <p:nvSpPr>
+          <p:cNvPr id="4" name="Text Placeholder 3"/>
+          <p:cNvSpPr>
+            <a:spLocks noGrp="1"/>
+          </p:cNvSpPr>
+          <p:nvPr>
+            <p:ph type="body" sz="half" idx="2"/>
+          </p:nvPr>
+        </p:nvSpPr>
+        <p:spPr>
+          <a:xfrm>
+            <a:off x="1115568" y="3549918"/>
+            <a:ext cx="3794760" cy="2194036"/>
+          </a:xfrm>
+        </p:spPr>
+        <p:txBody>
+          <a:bodyPr anchor="t" anchorCtr="1">
+            <a:normAutofit/>
+          </a:bodyPr>
+          <a:lstStyle>
+            <a:lvl1pPr marL="0" indent="0" algn="ctr">
+              <a:buNone/>
+              <a:defRPr sz="1500">
+                <a:solidFill>
+                  <a:srgbClr val="FFFFFF"/>
+                </a:solidFill>
+              </a:defRPr>
+            </a:lvl1pPr>
+            <a:lvl2pPr marL="457200" indent="0">
+              <a:buNone/>
+              <a:defRPr sz="1400"/>
+            </a:lvl2pPr>
+            <a:lvl3pPr marL="914400" indent="0">
+              <a:buNone/>
+              <a:defRPr sz="1200"/>
+            </a:lvl3pPr>
+            <a:lvl4pPr marL="1371600" indent="0">
+              <a:buNone/>
+              <a:defRPr sz="1000"/>
+            </a:lvl4pPr>
+            <a:lvl5pPr marL="1828800" indent="0">
+              <a:buNone/>
+              <a:defRPr sz="1000"/>
+            </a:lvl5pPr>
+            <a:lvl6pPr marL="2286000" indent="0">
+              <a:buNone/>
+              <a:defRPr sz="1000"/>
+            </a:lvl6pPr>
+            <a:lvl7pPr marL="2743200" indent="0">
+              <a:buNone/>
+              <a:defRPr sz="1000"/>
+            </a:lvl7pPr>
+            <a:lvl8pPr marL="3200400" indent="0">
+              <a:buNone/>
+              <a:defRPr sz="1000"/>
+            </a:lvl8pPr>
+            <a:lvl9pPr marL="3657600" indent="0">
+              <a:buNone/>
+              <a:defRPr sz="1000"/>
+            </a:lvl9pPr>
+          </a:lstStyle>
+          <a:p>
+            <a:pPr lvl="0"/>
+            <a:r>
+              <a:rPr lang="en-US"/>
+              <a:t>Click to edit Master text styles</a:t>
+            </a:r>
+          </a:p>
+        </p:txBody>
+      </p:sp>
+      <p:sp>
+        <p:nvSpPr>
+          <p:cNvPr id="9" name="Date Placeholder 8"/>
+          <p:cNvSpPr>
+            <a:spLocks noGrp="1"/>
+          </p:cNvSpPr>
+          <p:nvPr>
+            <p:ph type="dt" sz="half" idx="10"/>
+          </p:nvPr>
+        </p:nvSpPr>
+        <p:spPr/>
+        <p:txBody>
+          <a:bodyPr/>
+          <a:lstStyle/>
+          <a:p>
+            <a:fld id="{D1BE4249-C0D0-4B06-8692-E8BB871AF643}" type="datetimeFigureOut">
+              <a:rPr lang="en-US" dirty="0"/>
+              <a:t>6/14/2020</a:t>
+            </a:fld>
+            <a:endParaRPr lang="en-US" dirty="0"/>
+          </a:p>
+        </p:txBody>
+      </p:sp>
+      <p:sp>
+        <p:nvSpPr>
+          <p:cNvPr id="10" name="Footer Placeholder 9"/>
+          <p:cNvSpPr>
+            <a:spLocks noGrp="1"/>
+          </p:cNvSpPr>
+          <p:nvPr>
+            <p:ph type="ftr" sz="quarter" idx="11"/>
+          </p:nvPr>
+        </p:nvSpPr>
+        <p:spPr>
+          <a:xfrm>
+            <a:off x="804672" y="6236208"/>
+            <a:ext cx="5124797" cy="320040"/>
+          </a:xfrm>
+        </p:spPr>
+        <p:txBody>
+          <a:bodyPr/>
+          <a:lstStyle>
+            <a:lvl1pPr>
+              <a:defRPr>
+                <a:solidFill>
+                  <a:srgbClr val="FFFFFF">
+                    <a:alpha val="70000"/>
+                  </a:srgbClr>
+                </a:solidFill>
+              </a:defRPr>
+            </a:lvl1pPr>
+          </a:lstStyle>
+          <a:p>
+            <a:endParaRPr lang="en-US" dirty="0"/>
+          </a:p>
+        </p:txBody>
+      </p:sp>
+      <p:sp>
+        <p:nvSpPr>
+          <p:cNvPr id="11" name="Slide Number Placeholder 10"/>
+          <p:cNvSpPr>
+            <a:spLocks noGrp="1"/>
+          </p:cNvSpPr>
+          <p:nvPr>
+            <p:ph type="sldNum" sz="quarter" idx="12"/>
+          </p:nvPr>
+        </p:nvSpPr>
+        <p:spPr/>
+        <p:txBody>
+          <a:bodyPr/>
+          <a:lstStyle/>
+          <a:p>
+            <a:fld id="{8A7A6979-0714-4377-B894-6BE4C2D6E202}" type="slidenum">
+              <a:rPr lang="en-US" dirty="0"/>
+              <a:t>‹#›</a:t>
+            </a:fld>
+            <a:endParaRPr lang="en-US" dirty="0"/>
+          </a:p>
+        </p:txBody>
+      </p:sp>
+    </p:spTree>
+    <p:extLst>
+      <p:ext uri="{BB962C8B-B14F-4D97-AF65-F5344CB8AC3E}">
+        <p14:creationId xmlns:p14="http://schemas.microsoft.com/office/powerpoint/2010/main" val="2754113660"/>
+      </p:ext>
+    </p:extLst>
+  </p:cSld>
+  <p:clrMapOvr>
+    <a:masterClrMapping/>
+  </p:clrMapOvr>
+</p:sldLayout>
+</file>
+
+<file path=ppt/slideLayouts/slideLayout18.xml><?xml version="1.0" encoding="utf-8"?>
+<p:sldLayout xmlns:a="http://schemas.openxmlformats.org/drawingml/2006/main" xmlns:r="http://schemas.openxmlformats.org/officeDocument/2006/relationships" xmlns:p="http://schemas.openxmlformats.org/presentationml/2006/main" type="picTx" preserve="1">
+  <p:cSld name="Picture with Caption">
+    <p:spTree>
+      <p:nvGrpSpPr>
+        <p:cNvPr id="1" name=""/>
+        <p:cNvGrpSpPr/>
+        <p:nvPr/>
+      </p:nvGrpSpPr>
+      <p:grpSpPr>
+        <a:xfrm>
+          <a:off x="0" y="0"/>
+          <a:ext cx="0" cy="0"/>
+          <a:chOff x="0" y="0"/>
+          <a:chExt cx="0" cy="0"/>
+        </a:xfrm>
+      </p:grpSpPr>
+      <p:sp>
+        <p:nvSpPr>
+          <p:cNvPr id="18" name="Rectangle 17"/>
+          <p:cNvSpPr/>
+          <p:nvPr/>
+        </p:nvSpPr>
+        <p:spPr>
+          <a:xfrm>
+            <a:off x="0" y="0"/>
+            <a:ext cx="6095999" cy="6858000"/>
+          </a:xfrm>
+          <a:prstGeom prst="rect">
+            <a:avLst/>
+          </a:prstGeom>
+          <a:solidFill>
+            <a:schemeClr val="accent2"/>
+          </a:solidFill>
+          <a:ln>
+            <a:noFill/>
+          </a:ln>
+        </p:spPr>
+        <p:style>
+          <a:lnRef idx="2">
+            <a:schemeClr val="accent1">
+              <a:shade val="50000"/>
+            </a:schemeClr>
+          </a:lnRef>
+          <a:fillRef idx="1">
+            <a:schemeClr val="accent1"/>
+          </a:fillRef>
+          <a:effectRef idx="0">
+            <a:schemeClr val="accent1"/>
+          </a:effectRef>
+          <a:fontRef idx="minor">
+            <a:schemeClr val="lt1"/>
+          </a:fontRef>
+        </p:style>
+      </p:sp>
+      <p:sp>
+        <p:nvSpPr>
+          <p:cNvPr id="2" name="Title 1"/>
+          <p:cNvSpPr>
+            <a:spLocks noGrp="1"/>
+          </p:cNvSpPr>
+          <p:nvPr>
+            <p:ph type="title"/>
+          </p:nvPr>
+        </p:nvSpPr>
+        <p:spPr bwMode="blackWhite">
+          <a:xfrm>
+            <a:off x="808523" y="2243828"/>
+            <a:ext cx="4494998" cy="1134640"/>
+          </a:xfrm>
+          <a:solidFill>
+            <a:srgbClr val="FFFFFF"/>
+          </a:solidFill>
+          <a:ln>
+            <a:solidFill>
+              <a:srgbClr val="404040"/>
+            </a:solidFill>
+          </a:ln>
+        </p:spPr>
+        <p:txBody>
+          <a:bodyPr anchor="ctr" anchorCtr="1">
+            <a:noAutofit/>
+          </a:bodyPr>
+          <a:lstStyle>
+            <a:lvl1pPr>
+              <a:defRPr sz="2200">
+                <a:solidFill>
+                  <a:srgbClr val="262626"/>
+                </a:solidFill>
+              </a:defRPr>
+            </a:lvl1pPr>
+          </a:lstStyle>
+          <a:p>
+            <a:r>
+              <a:rPr lang="en-US"/>
+              <a:t>Click to edit Master title style</a:t>
+            </a:r>
+            <a:endParaRPr lang="en-US" dirty="0"/>
+          </a:p>
+        </p:txBody>
+      </p:sp>
+      <p:sp>
+        <p:nvSpPr>
+          <p:cNvPr id="3" name="Picture Placeholder 2"/>
+          <p:cNvSpPr>
+            <a:spLocks noGrp="1" noChangeAspect="1"/>
+          </p:cNvSpPr>
+          <p:nvPr>
+            <p:ph type="pic" idx="1"/>
+          </p:nvPr>
+        </p:nvSpPr>
+        <p:spPr>
+          <a:xfrm>
+            <a:off x="6095999" y="0"/>
+            <a:ext cx="6102097" cy="6858000"/>
+          </a:xfrm>
+          <a:solidFill>
+            <a:schemeClr val="bg1">
+              <a:lumMod val="75000"/>
+            </a:schemeClr>
+          </a:solidFill>
+        </p:spPr>
+        <p:txBody>
+          <a:bodyPr anchor="t"/>
+          <a:lstStyle>
+            <a:lvl1pPr marL="0" indent="0">
+              <a:buNone/>
+              <a:defRPr sz="3200">
+                <a:solidFill>
+                  <a:schemeClr val="bg1">
+                    <a:lumMod val="85000"/>
+                    <a:lumOff val="15000"/>
+                  </a:schemeClr>
+                </a:solidFill>
+              </a:defRPr>
+            </a:lvl1pPr>
+            <a:lvl2pPr marL="457200" indent="0">
+              <a:buNone/>
+              <a:defRPr sz="2800"/>
+            </a:lvl2pPr>
+            <a:lvl3pPr marL="914400" indent="0">
+              <a:buNone/>
+              <a:defRPr sz="2400"/>
+            </a:lvl3pPr>
+            <a:lvl4pPr marL="1371600" indent="0">
+              <a:buNone/>
+              <a:defRPr sz="2000"/>
+            </a:lvl4pPr>
+            <a:lvl5pPr marL="1828800" indent="0">
+              <a:buNone/>
+              <a:defRPr sz="2000"/>
+            </a:lvl5pPr>
+            <a:lvl6pPr marL="2286000" indent="0">
+              <a:buNone/>
+              <a:defRPr sz="2000"/>
+            </a:lvl6pPr>
+            <a:lvl7pPr marL="2743200" indent="0">
+              <a:buNone/>
+              <a:defRPr sz="2000"/>
+            </a:lvl7pPr>
+            <a:lvl8pPr marL="3200400" indent="0">
+              <a:buNone/>
+              <a:defRPr sz="2000"/>
+            </a:lvl8pPr>
+            <a:lvl9pPr marL="3657600" indent="0">
+              <a:buNone/>
+              <a:defRPr sz="2000"/>
+            </a:lvl9pPr>
+          </a:lstStyle>
+          <a:p>
+            <a:r>
+              <a:rPr lang="en-US"/>
+              <a:t>Click icon to add picture</a:t>
+            </a:r>
+            <a:endParaRPr lang="en-US" dirty="0"/>
+          </a:p>
+        </p:txBody>
+      </p:sp>
+      <p:sp>
+        <p:nvSpPr>
+          <p:cNvPr id="4" name="Text Placeholder 3"/>
+          <p:cNvSpPr>
+            <a:spLocks noGrp="1"/>
+          </p:cNvSpPr>
+          <p:nvPr>
+            <p:ph type="body" sz="half" idx="2"/>
+          </p:nvPr>
+        </p:nvSpPr>
+        <p:spPr>
+          <a:xfrm>
+            <a:off x="1115568" y="3549918"/>
+            <a:ext cx="3794760" cy="2194037"/>
+          </a:xfrm>
+        </p:spPr>
+        <p:txBody>
+          <a:bodyPr anchor="t" anchorCtr="1">
+            <a:normAutofit/>
+          </a:bodyPr>
+          <a:lstStyle>
+            <a:lvl1pPr marL="0" indent="0" algn="ctr">
+              <a:buNone/>
+              <a:defRPr sz="1500">
+                <a:solidFill>
+                  <a:srgbClr val="FFFFFF"/>
+                </a:solidFill>
+              </a:defRPr>
+            </a:lvl1pPr>
+            <a:lvl2pPr marL="457200" indent="0">
+              <a:buNone/>
+              <a:defRPr sz="1400"/>
+            </a:lvl2pPr>
+            <a:lvl3pPr marL="914400" indent="0">
+              <a:buNone/>
+              <a:defRPr sz="1200"/>
+            </a:lvl3pPr>
+            <a:lvl4pPr marL="1371600" indent="0">
+              <a:buNone/>
+              <a:defRPr sz="1000"/>
+            </a:lvl4pPr>
+            <a:lvl5pPr marL="1828800" indent="0">
+              <a:buNone/>
+              <a:defRPr sz="1000"/>
+            </a:lvl5pPr>
+            <a:lvl6pPr marL="2286000" indent="0">
+              <a:buNone/>
+              <a:defRPr sz="1000"/>
+            </a:lvl6pPr>
+            <a:lvl7pPr marL="2743200" indent="0">
+              <a:buNone/>
+              <a:defRPr sz="1000"/>
+            </a:lvl7pPr>
+            <a:lvl8pPr marL="3200400" indent="0">
+              <a:buNone/>
+              <a:defRPr sz="1000"/>
+            </a:lvl8pPr>
+            <a:lvl9pPr marL="3657600" indent="0">
+              <a:buNone/>
+              <a:defRPr sz="1000"/>
+            </a:lvl9pPr>
+          </a:lstStyle>
+          <a:p>
+            <a:pPr lvl="0"/>
+            <a:r>
+              <a:rPr lang="en-US"/>
+              <a:t>Click to edit Master text styles</a:t>
+            </a:r>
+          </a:p>
+        </p:txBody>
+      </p:sp>
+      <p:sp>
+        <p:nvSpPr>
+          <p:cNvPr id="8" name="Date Placeholder 7"/>
+          <p:cNvSpPr>
+            <a:spLocks noGrp="1"/>
+          </p:cNvSpPr>
+          <p:nvPr>
+            <p:ph type="dt" sz="half" idx="10"/>
+          </p:nvPr>
+        </p:nvSpPr>
+        <p:spPr/>
+        <p:txBody>
+          <a:bodyPr/>
+          <a:lstStyle>
+            <a:lvl1pPr>
+              <a:defRPr>
+                <a:solidFill>
+                  <a:srgbClr val="FFFFFF"/>
+                </a:solidFill>
+                <a:effectLst>
+                  <a:outerShdw blurRad="50800" dist="38100" dir="2700000" algn="tl" rotWithShape="0">
+                    <a:prstClr val="black">
+                      <a:alpha val="43000"/>
+                    </a:prstClr>
+                  </a:outerShdw>
+                </a:effectLst>
+              </a:defRPr>
+            </a:lvl1pPr>
+          </a:lstStyle>
+          <a:p>
+            <a:fld id="{042B0DB6-F5C7-45FB-8CF3-31B45F9C2DAC}" type="datetimeFigureOut">
+              <a:rPr lang="en-US" dirty="0"/>
+              <a:t>6/14/2020</a:t>
+            </a:fld>
+            <a:endParaRPr lang="en-US" dirty="0"/>
+          </a:p>
+        </p:txBody>
+      </p:sp>
+      <p:sp>
+        <p:nvSpPr>
+          <p:cNvPr id="9" name="Footer Placeholder 8"/>
+          <p:cNvSpPr>
+            <a:spLocks noGrp="1"/>
+          </p:cNvSpPr>
+          <p:nvPr>
+            <p:ph type="ftr" sz="quarter" idx="11"/>
+          </p:nvPr>
+        </p:nvSpPr>
+        <p:spPr>
+          <a:xfrm>
+            <a:off x="804672" y="6236208"/>
+            <a:ext cx="5124797" cy="320040"/>
+          </a:xfrm>
+        </p:spPr>
+        <p:txBody>
+          <a:bodyPr/>
+          <a:lstStyle>
+            <a:lvl1pPr>
+              <a:defRPr>
+                <a:solidFill>
+                  <a:srgbClr val="FFFFFF">
+                    <a:alpha val="70000"/>
+                  </a:srgbClr>
+                </a:solidFill>
+              </a:defRPr>
+            </a:lvl1pPr>
+          </a:lstStyle>
+          <a:p>
+            <a:endParaRPr lang="en-US" dirty="0"/>
+          </a:p>
+        </p:txBody>
+      </p:sp>
+      <p:sp>
+        <p:nvSpPr>
+          <p:cNvPr id="10" name="Slide Number Placeholder 9"/>
+          <p:cNvSpPr>
+            <a:spLocks noGrp="1"/>
+          </p:cNvSpPr>
+          <p:nvPr>
+            <p:ph type="sldNum" sz="quarter" idx="12"/>
+          </p:nvPr>
+        </p:nvSpPr>
+        <p:spPr/>
+        <p:txBody>
+          <a:bodyPr/>
+          <a:lstStyle/>
+          <a:p>
+            <a:fld id="{8A7A6979-0714-4377-B894-6BE4C2D6E202}" type="slidenum">
+              <a:rPr lang="en-US" dirty="0"/>
+              <a:t>‹#›</a:t>
+            </a:fld>
+            <a:endParaRPr lang="en-US" dirty="0"/>
+          </a:p>
+        </p:txBody>
+      </p:sp>
+    </p:spTree>
+    <p:extLst>
+      <p:ext uri="{BB962C8B-B14F-4D97-AF65-F5344CB8AC3E}">
+        <p14:creationId xmlns:p14="http://schemas.microsoft.com/office/powerpoint/2010/main" val="2366439312"/>
+      </p:ext>
+    </p:extLst>
+  </p:cSld>
+  <p:clrMapOvr>
+    <a:masterClrMapping/>
+  </p:clrMapOvr>
+</p:sldLayout>
+</file>
+
+<file path=ppt/slideLayouts/slideLayout19.xml><?xml version="1.0" encoding="utf-8"?>
+<p:sldLayout xmlns:a="http://schemas.openxmlformats.org/drawingml/2006/main" xmlns:r="http://schemas.openxmlformats.org/officeDocument/2006/relationships" xmlns:p="http://schemas.openxmlformats.org/presentationml/2006/main" type="vertTx" preserve="1">
+  <p:cSld name="Title and Vertical Text">
+    <p:spTree>
+      <p:nvGrpSpPr>
+        <p:cNvPr id="1" name=""/>
+        <p:cNvGrpSpPr/>
+        <p:nvPr/>
+      </p:nvGrpSpPr>
+      <p:grpSpPr>
+        <a:xfrm>
+          <a:off x="0" y="0"/>
+          <a:ext cx="0" cy="0"/>
+          <a:chOff x="0" y="0"/>
+          <a:chExt cx="0" cy="0"/>
+        </a:xfrm>
+      </p:grpSpPr>
+      <p:sp>
+        <p:nvSpPr>
+          <p:cNvPr id="2" name="Title 1"/>
+          <p:cNvSpPr>
+            <a:spLocks noGrp="1"/>
+          </p:cNvSpPr>
+          <p:nvPr>
+            <p:ph type="title"/>
+          </p:nvPr>
+        </p:nvSpPr>
+        <p:spPr/>
+        <p:txBody>
+          <a:bodyPr/>
+          <a:lstStyle/>
+          <a:p>
+            <a:r>
+              <a:rPr lang="en-US"/>
+              <a:t>Click to edit Master title style</a:t>
+            </a:r>
+            <a:endParaRPr lang="en-US" dirty="0"/>
+          </a:p>
+        </p:txBody>
+      </p:sp>
+      <p:sp>
+        <p:nvSpPr>
+          <p:cNvPr id="3" name="Vertical Text Placeholder 2"/>
+          <p:cNvSpPr>
+            <a:spLocks noGrp="1"/>
+          </p:cNvSpPr>
+          <p:nvPr>
+            <p:ph type="body" orient="vert" idx="1"/>
+          </p:nvPr>
+        </p:nvSpPr>
+        <p:spPr/>
+        <p:txBody>
+          <a:bodyPr vert="eaVert"/>
+          <a:lstStyle/>
+          <a:p>
+            <a:pPr lvl="0"/>
+            <a:r>
+              <a:rPr lang="en-US"/>
+              <a:t>Click to edit Master text styles</a:t>
+            </a:r>
+          </a:p>
+          <a:p>
+            <a:pPr lvl="1"/>
+            <a:r>
+              <a:rPr lang="en-US"/>
+              <a:t>Second level</a:t>
+            </a:r>
+          </a:p>
+          <a:p>
+            <a:pPr lvl="2"/>
+            <a:r>
+              <a:rPr lang="en-US"/>
+              <a:t>Third level</a:t>
+            </a:r>
+          </a:p>
+          <a:p>
+            <a:pPr lvl="3"/>
+            <a:r>
+              <a:rPr lang="en-US"/>
+              <a:t>Fourth level</a:t>
+            </a:r>
+          </a:p>
+          <a:p>
+            <a:pPr lvl="4"/>
+            <a:r>
+              <a:rPr lang="en-US"/>
+              <a:t>Fifth level</a:t>
+            </a:r>
+            <a:endParaRPr lang="en-US" dirty="0"/>
+          </a:p>
+        </p:txBody>
+      </p:sp>
+      <p:sp>
+        <p:nvSpPr>
+          <p:cNvPr id="4" name="Date Placeholder 3"/>
+          <p:cNvSpPr>
+            <a:spLocks noGrp="1"/>
+          </p:cNvSpPr>
+          <p:nvPr>
+            <p:ph type="dt" sz="half" idx="10"/>
+          </p:nvPr>
+        </p:nvSpPr>
+        <p:spPr/>
+        <p:txBody>
+          <a:bodyPr/>
+          <a:lstStyle/>
+          <a:p>
+            <a:fld id="{E9F9C37B-1D36-470B-8223-D6C91242EC14}" type="datetimeFigureOut">
+              <a:rPr lang="en-US" dirty="0"/>
+              <a:t>6/14/2020</a:t>
+            </a:fld>
+            <a:endParaRPr lang="en-US" dirty="0"/>
+          </a:p>
+        </p:txBody>
+      </p:sp>
+      <p:sp>
+        <p:nvSpPr>
+          <p:cNvPr id="5" name="Footer Placeholder 4"/>
+          <p:cNvSpPr>
+            <a:spLocks noGrp="1"/>
+          </p:cNvSpPr>
+          <p:nvPr>
+            <p:ph type="ftr" sz="quarter" idx="11"/>
+          </p:nvPr>
+        </p:nvSpPr>
+        <p:spPr/>
+        <p:txBody>
+          <a:bodyPr/>
+          <a:lstStyle/>
+          <a:p>
+            <a:endParaRPr lang="en-US" dirty="0"/>
+          </a:p>
+        </p:txBody>
+      </p:sp>
+      <p:sp>
+        <p:nvSpPr>
+          <p:cNvPr id="6" name="Slide Number Placeholder 5"/>
+          <p:cNvSpPr>
+            <a:spLocks noGrp="1"/>
+          </p:cNvSpPr>
+          <p:nvPr>
+            <p:ph type="sldNum" sz="quarter" idx="12"/>
+          </p:nvPr>
+        </p:nvSpPr>
+        <p:spPr/>
+        <p:txBody>
+          <a:bodyPr/>
+          <a:lstStyle/>
+          <a:p>
+            <a:fld id="{8A7A6979-0714-4377-B894-6BE4C2D6E202}" type="slidenum">
+              <a:rPr lang="en-US" dirty="0"/>
+              <a:t>‹#›</a:t>
+            </a:fld>
+            <a:endParaRPr lang="en-US" dirty="0"/>
+          </a:p>
+        </p:txBody>
+      </p:sp>
+    </p:spTree>
+    <p:extLst>
+      <p:ext uri="{BB962C8B-B14F-4D97-AF65-F5344CB8AC3E}">
+        <p14:creationId xmlns:p14="http://schemas.microsoft.com/office/powerpoint/2010/main" val="649287301"/>
+      </p:ext>
+    </p:extLst>
+  </p:cSld>
+  <p:clrMapOvr>
+    <a:masterClrMapping/>
+  </p:clrMapOvr>
+</p:sldLayout>
+</file>
+
 <file path=ppt/slideLayouts/slideLayout2.xml><?xml version="1.0" encoding="utf-8"?>
 <p:sldLayout xmlns:a="http://schemas.openxmlformats.org/drawingml/2006/main" xmlns:r="http://schemas.openxmlformats.org/officeDocument/2006/relationships" xmlns:p="http://schemas.openxmlformats.org/presentationml/2006/main" type="obj" preserve="1">
   <p:cSld name="Title and Content">
@@ -893,7 +3286,7 @@
           <a:p>
             <a:fld id="{5BC980F7-5BD4-479F-A39E-510B2770630D}" type="datetime1">
               <a:rPr lang="en-US" smtClean="0"/>
-              <a:t>6/13/2020</a:t>
+              <a:t>6/14/2020</a:t>
             </a:fld>
             <a:endParaRPr lang="en-US"/>
           </a:p>
@@ -960,6 +3353,186 @@
     <p:extLst>
       <p:ext uri="{BB962C8B-B14F-4D97-AF65-F5344CB8AC3E}">
         <p14:creationId xmlns:p14="http://schemas.microsoft.com/office/powerpoint/2010/main" val="223124415"/>
+      </p:ext>
+    </p:extLst>
+  </p:cSld>
+  <p:clrMapOvr>
+    <a:masterClrMapping/>
+  </p:clrMapOvr>
+</p:sldLayout>
+</file>
+
+<file path=ppt/slideLayouts/slideLayout20.xml><?xml version="1.0" encoding="utf-8"?>
+<p:sldLayout xmlns:a="http://schemas.openxmlformats.org/drawingml/2006/main" xmlns:r="http://schemas.openxmlformats.org/officeDocument/2006/relationships" xmlns:p="http://schemas.openxmlformats.org/presentationml/2006/main" type="vertTitleAndTx" preserve="1">
+  <p:cSld name="Vertical Title and Text">
+    <p:spTree>
+      <p:nvGrpSpPr>
+        <p:cNvPr id="1" name=""/>
+        <p:cNvGrpSpPr/>
+        <p:nvPr/>
+      </p:nvGrpSpPr>
+      <p:grpSpPr>
+        <a:xfrm>
+          <a:off x="0" y="0"/>
+          <a:ext cx="0" cy="0"/>
+          <a:chOff x="0" y="0"/>
+          <a:chExt cx="0" cy="0"/>
+        </a:xfrm>
+      </p:grpSpPr>
+      <p:sp>
+        <p:nvSpPr>
+          <p:cNvPr id="2" name="Vertical Title 1"/>
+          <p:cNvSpPr>
+            <a:spLocks noGrp="1"/>
+          </p:cNvSpPr>
+          <p:nvPr>
+            <p:ph type="title" orient="vert"/>
+          </p:nvPr>
+        </p:nvSpPr>
+        <p:spPr>
+          <a:xfrm>
+            <a:off x="8653112" y="937260"/>
+            <a:ext cx="1298608" cy="4983480"/>
+          </a:xfrm>
+        </p:spPr>
+        <p:txBody>
+          <a:bodyPr vert="eaVert"/>
+          <a:lstStyle/>
+          <a:p>
+            <a:r>
+              <a:rPr lang="en-US"/>
+              <a:t>Click to edit Master title style</a:t>
+            </a:r>
+            <a:endParaRPr lang="en-US" dirty="0"/>
+          </a:p>
+        </p:txBody>
+      </p:sp>
+      <p:sp>
+        <p:nvSpPr>
+          <p:cNvPr id="3" name="Vertical Text Placeholder 2"/>
+          <p:cNvSpPr>
+            <a:spLocks noGrp="1"/>
+          </p:cNvSpPr>
+          <p:nvPr>
+            <p:ph type="body" orient="vert" idx="1"/>
+          </p:nvPr>
+        </p:nvSpPr>
+        <p:spPr>
+          <a:xfrm>
+            <a:off x="2231136" y="937260"/>
+            <a:ext cx="6198489" cy="4983480"/>
+          </a:xfrm>
+        </p:spPr>
+        <p:txBody>
+          <a:bodyPr vert="eaVert"/>
+          <a:lstStyle/>
+          <a:p>
+            <a:pPr lvl="0"/>
+            <a:r>
+              <a:rPr lang="en-US"/>
+              <a:t>Click to edit Master text styles</a:t>
+            </a:r>
+          </a:p>
+          <a:p>
+            <a:pPr lvl="1"/>
+            <a:r>
+              <a:rPr lang="en-US"/>
+              <a:t>Second level</a:t>
+            </a:r>
+          </a:p>
+          <a:p>
+            <a:pPr lvl="2"/>
+            <a:r>
+              <a:rPr lang="en-US"/>
+              <a:t>Third level</a:t>
+            </a:r>
+          </a:p>
+          <a:p>
+            <a:pPr lvl="3"/>
+            <a:r>
+              <a:rPr lang="en-US"/>
+              <a:t>Fourth level</a:t>
+            </a:r>
+          </a:p>
+          <a:p>
+            <a:pPr lvl="4"/>
+            <a:r>
+              <a:rPr lang="en-US"/>
+              <a:t>Fifth level</a:t>
+            </a:r>
+            <a:endParaRPr lang="en-US" dirty="0"/>
+          </a:p>
+        </p:txBody>
+      </p:sp>
+      <p:sp>
+        <p:nvSpPr>
+          <p:cNvPr id="4" name="Date Placeholder 3"/>
+          <p:cNvSpPr>
+            <a:spLocks noGrp="1"/>
+          </p:cNvSpPr>
+          <p:nvPr>
+            <p:ph type="dt" sz="half" idx="10"/>
+          </p:nvPr>
+        </p:nvSpPr>
+        <p:spPr/>
+        <p:txBody>
+          <a:bodyPr/>
+          <a:lstStyle/>
+          <a:p>
+            <a:fld id="{67C6F52A-A82B-47A2-A83A-8C4C91F2D59F}" type="datetimeFigureOut">
+              <a:rPr lang="en-US" dirty="0"/>
+              <a:t>6/14/2020</a:t>
+            </a:fld>
+            <a:endParaRPr lang="en-US" dirty="0"/>
+          </a:p>
+        </p:txBody>
+      </p:sp>
+      <p:sp>
+        <p:nvSpPr>
+          <p:cNvPr id="5" name="Footer Placeholder 4"/>
+          <p:cNvSpPr>
+            <a:spLocks noGrp="1"/>
+          </p:cNvSpPr>
+          <p:nvPr>
+            <p:ph type="ftr" sz="quarter" idx="11"/>
+          </p:nvPr>
+        </p:nvSpPr>
+        <p:spPr/>
+        <p:txBody>
+          <a:bodyPr/>
+          <a:lstStyle/>
+          <a:p>
+            <a:endParaRPr lang="en-US" dirty="0"/>
+          </a:p>
+        </p:txBody>
+      </p:sp>
+      <p:sp>
+        <p:nvSpPr>
+          <p:cNvPr id="6" name="Slide Number Placeholder 5"/>
+          <p:cNvSpPr>
+            <a:spLocks noGrp="1"/>
+          </p:cNvSpPr>
+          <p:nvPr>
+            <p:ph type="sldNum" sz="quarter" idx="12"/>
+          </p:nvPr>
+        </p:nvSpPr>
+        <p:spPr/>
+        <p:txBody>
+          <a:bodyPr/>
+          <a:lstStyle/>
+          <a:p>
+            <a:fld id="{8A7A6979-0714-4377-B894-6BE4C2D6E202}" type="slidenum">
+              <a:rPr lang="en-US" dirty="0"/>
+              <a:t>‹#›</a:t>
+            </a:fld>
+            <a:endParaRPr lang="en-US" dirty="0"/>
+          </a:p>
+        </p:txBody>
+      </p:sp>
+    </p:spTree>
+    <p:extLst>
+      <p:ext uri="{BB962C8B-B14F-4D97-AF65-F5344CB8AC3E}">
+        <p14:creationId xmlns:p14="http://schemas.microsoft.com/office/powerpoint/2010/main" val="3939360811"/>
       </p:ext>
     </p:extLst>
   </p:cSld>
@@ -1174,7 +3747,7 @@
           <a:p>
             <a:fld id="{B0A2EBFB-EDCF-45C8-BE6B-B69D1DBE344E}" type="datetime1">
               <a:rPr lang="en-US" smtClean="0"/>
-              <a:t>6/13/2020</a:t>
+              <a:t>6/14/2020</a:t>
             </a:fld>
             <a:endParaRPr lang="en-US"/>
           </a:p>
@@ -1442,7 +4015,7 @@
           <a:p>
             <a:fld id="{378FC028-104B-4078-9DEB-FFD6CC8DDF24}" type="datetime1">
               <a:rPr lang="en-US" smtClean="0"/>
-              <a:t>6/13/2020</a:t>
+              <a:t>6/14/2020</a:t>
             </a:fld>
             <a:endParaRPr lang="en-US"/>
           </a:p>
@@ -1857,7 +4430,7 @@
           <a:p>
             <a:fld id="{9E8EF1B5-7862-49EB-B521-C2A50A72DB5A}" type="datetime1">
               <a:rPr lang="en-US" smtClean="0"/>
-              <a:t>6/13/2020</a:t>
+              <a:t>6/14/2020</a:t>
             </a:fld>
             <a:endParaRPr lang="en-US"/>
           </a:p>
@@ -2001,7 +4574,7 @@
           <a:p>
             <a:fld id="{6A20FF79-B33E-4A6B-AA97-60C34012DDCB}" type="datetime1">
               <a:rPr lang="en-US" smtClean="0"/>
-              <a:t>6/13/2020</a:t>
+              <a:t>6/14/2020</a:t>
             </a:fld>
             <a:endParaRPr lang="en-US"/>
           </a:p>
@@ -2117,7 +4690,7 @@
           <a:p>
             <a:fld id="{71945FE8-5929-4EA6-BE95-AFF05AD8C9FF}" type="datetime1">
               <a:rPr lang="en-US" smtClean="0"/>
-              <a:t>6/13/2020</a:t>
+              <a:t>6/14/2020</a:t>
             </a:fld>
             <a:endParaRPr lang="en-US"/>
           </a:p>
@@ -2431,7 +5004,7 @@
           <a:p>
             <a:fld id="{F66C89F2-D9E3-470B-8E41-ADA07051F9EB}" type="datetime1">
               <a:rPr lang="en-US" smtClean="0"/>
-              <a:t>6/13/2020</a:t>
+              <a:t>6/14/2020</a:t>
             </a:fld>
             <a:endParaRPr lang="en-US"/>
           </a:p>
@@ -2725,7 +5298,7 @@
           <a:p>
             <a:fld id="{5F6144FA-6336-4097-BCD5-014BC9EC3E1A}" type="datetime1">
               <a:rPr lang="en-US" smtClean="0"/>
-              <a:t>6/13/2020</a:t>
+              <a:t>6/14/2020</a:t>
             </a:fld>
             <a:endParaRPr lang="en-US"/>
           </a:p>
@@ -2970,7 +5543,7 @@
           <a:p>
             <a:fld id="{5105DB7E-1F84-4FC6-B315-E8E45EC1B634}" type="datetime1">
               <a:rPr lang="en-US" smtClean="0"/>
-              <a:t>6/13/2020</a:t>
+              <a:t>6/14/2020</a:t>
             </a:fld>
             <a:endParaRPr lang="en-US" dirty="0"/>
           </a:p>
@@ -3373,6 +5946,609 @@
 </p:sldMaster>
 </file>
 
+<file path=ppt/slideMasters/slideMaster2.xml><?xml version="1.0" encoding="utf-8"?>
+<p:sldMaster xmlns:a="http://schemas.openxmlformats.org/drawingml/2006/main" xmlns:r="http://schemas.openxmlformats.org/officeDocument/2006/relationships" xmlns:p="http://schemas.openxmlformats.org/presentationml/2006/main">
+  <p:cSld>
+    <p:bg>
+      <p:bgPr>
+        <a:solidFill>
+          <a:schemeClr val="bg1">
+            <a:lumMod val="95000"/>
+          </a:schemeClr>
+        </a:solidFill>
+        <a:effectLst/>
+      </p:bgPr>
+    </p:bg>
+    <p:spTree>
+      <p:nvGrpSpPr>
+        <p:cNvPr id="1" name=""/>
+        <p:cNvGrpSpPr/>
+        <p:nvPr/>
+      </p:nvGrpSpPr>
+      <p:grpSpPr>
+        <a:xfrm>
+          <a:off x="0" y="0"/>
+          <a:ext cx="0" cy="0"/>
+          <a:chOff x="0" y="0"/>
+          <a:chExt cx="0" cy="0"/>
+        </a:xfrm>
+      </p:grpSpPr>
+      <p:sp>
+        <p:nvSpPr>
+          <p:cNvPr id="2" name="Title Placeholder 1"/>
+          <p:cNvSpPr>
+            <a:spLocks noGrp="1"/>
+          </p:cNvSpPr>
+          <p:nvPr>
+            <p:ph type="title"/>
+          </p:nvPr>
+        </p:nvSpPr>
+        <p:spPr bwMode="black">
+          <a:xfrm>
+            <a:off x="2231136" y="964692"/>
+            <a:ext cx="7729728" cy="1188720"/>
+          </a:xfrm>
+          <a:prstGeom prst="rect">
+            <a:avLst/>
+          </a:prstGeom>
+          <a:solidFill>
+            <a:srgbClr val="FFFFFF"/>
+          </a:solidFill>
+          <a:ln w="31750" cap="sq">
+            <a:solidFill>
+              <a:srgbClr val="404040"/>
+            </a:solidFill>
+            <a:miter lim="800000"/>
+          </a:ln>
+        </p:spPr>
+        <p:txBody>
+          <a:bodyPr vert="horz" lIns="182880" tIns="182880" rIns="182880" bIns="182880" rtlCol="0" anchor="ctr">
+            <a:normAutofit/>
+          </a:bodyPr>
+          <a:lstStyle/>
+          <a:p>
+            <a:r>
+              <a:rPr lang="en-US"/>
+              <a:t>Click to edit Master title style</a:t>
+            </a:r>
+            <a:endParaRPr lang="en-US" dirty="0"/>
+          </a:p>
+        </p:txBody>
+      </p:sp>
+      <p:sp>
+        <p:nvSpPr>
+          <p:cNvPr id="3" name="Text Placeholder 2"/>
+          <p:cNvSpPr>
+            <a:spLocks noGrp="1"/>
+          </p:cNvSpPr>
+          <p:nvPr>
+            <p:ph type="body" idx="1"/>
+          </p:nvPr>
+        </p:nvSpPr>
+        <p:spPr>
+          <a:xfrm>
+            <a:off x="2231136" y="2638044"/>
+            <a:ext cx="7729728" cy="3101983"/>
+          </a:xfrm>
+          <a:prstGeom prst="rect">
+            <a:avLst/>
+          </a:prstGeom>
+        </p:spPr>
+        <p:txBody>
+          <a:bodyPr vert="horz" lIns="91440" tIns="45720" rIns="91440" bIns="45720" rtlCol="0">
+            <a:normAutofit/>
+          </a:bodyPr>
+          <a:lstStyle/>
+          <a:p>
+            <a:pPr lvl="0"/>
+            <a:r>
+              <a:rPr lang="en-US"/>
+              <a:t>Click to edit Master text styles</a:t>
+            </a:r>
+          </a:p>
+          <a:p>
+            <a:pPr lvl="1"/>
+            <a:r>
+              <a:rPr lang="en-US"/>
+              <a:t>Second level</a:t>
+            </a:r>
+          </a:p>
+          <a:p>
+            <a:pPr lvl="2"/>
+            <a:r>
+              <a:rPr lang="en-US"/>
+              <a:t>Third level</a:t>
+            </a:r>
+          </a:p>
+          <a:p>
+            <a:pPr lvl="3"/>
+            <a:r>
+              <a:rPr lang="en-US"/>
+              <a:t>Fourth level</a:t>
+            </a:r>
+          </a:p>
+          <a:p>
+            <a:pPr lvl="4"/>
+            <a:r>
+              <a:rPr lang="en-US"/>
+              <a:t>Fifth level</a:t>
+            </a:r>
+            <a:endParaRPr lang="en-US" dirty="0"/>
+          </a:p>
+        </p:txBody>
+      </p:sp>
+      <p:sp>
+        <p:nvSpPr>
+          <p:cNvPr id="4" name="Date Placeholder 3"/>
+          <p:cNvSpPr>
+            <a:spLocks noGrp="1"/>
+          </p:cNvSpPr>
+          <p:nvPr>
+            <p:ph type="dt" sz="half" idx="2"/>
+          </p:nvPr>
+        </p:nvSpPr>
+        <p:spPr>
+          <a:xfrm>
+            <a:off x="7821429" y="6238816"/>
+            <a:ext cx="2753746" cy="323968"/>
+          </a:xfrm>
+          <a:prstGeom prst="rect">
+            <a:avLst/>
+          </a:prstGeom>
+        </p:spPr>
+        <p:txBody>
+          <a:bodyPr vert="horz" lIns="91440" tIns="45720" rIns="91440" bIns="45720" rtlCol="0" anchor="ctr"/>
+          <a:lstStyle>
+            <a:lvl1pPr algn="r">
+              <a:defRPr sz="1050">
+                <a:solidFill>
+                  <a:schemeClr val="tx1">
+                    <a:alpha val="70000"/>
+                  </a:schemeClr>
+                </a:solidFill>
+              </a:defRPr>
+            </a:lvl1pPr>
+          </a:lstStyle>
+          <a:p>
+            <a:fld id="{1160EA64-D806-43AC-9DF2-F8C432F32B4C}" type="datetimeFigureOut">
+              <a:rPr lang="en-US" dirty="0"/>
+              <a:t>6/14/2020</a:t>
+            </a:fld>
+            <a:endParaRPr lang="en-US" dirty="0"/>
+          </a:p>
+        </p:txBody>
+      </p:sp>
+      <p:sp>
+        <p:nvSpPr>
+          <p:cNvPr id="5" name="Footer Placeholder 4"/>
+          <p:cNvSpPr>
+            <a:spLocks noGrp="1"/>
+          </p:cNvSpPr>
+          <p:nvPr>
+            <p:ph type="ftr" sz="quarter" idx="3"/>
+          </p:nvPr>
+        </p:nvSpPr>
+        <p:spPr>
+          <a:xfrm>
+            <a:off x="1600200" y="6236208"/>
+            <a:ext cx="5901189" cy="320040"/>
+          </a:xfrm>
+          <a:prstGeom prst="rect">
+            <a:avLst/>
+          </a:prstGeom>
+        </p:spPr>
+        <p:txBody>
+          <a:bodyPr vert="horz" lIns="91440" tIns="45720" rIns="91440" bIns="45720" rtlCol="0" anchor="ctr"/>
+          <a:lstStyle>
+            <a:lvl1pPr algn="l">
+              <a:defRPr sz="1050">
+                <a:solidFill>
+                  <a:schemeClr val="tx1">
+                    <a:alpha val="70000"/>
+                  </a:schemeClr>
+                </a:solidFill>
+              </a:defRPr>
+            </a:lvl1pPr>
+          </a:lstStyle>
+          <a:p>
+            <a:endParaRPr lang="en-US" dirty="0"/>
+          </a:p>
+        </p:txBody>
+      </p:sp>
+      <p:sp>
+        <p:nvSpPr>
+          <p:cNvPr id="6" name="Slide Number Placeholder 5"/>
+          <p:cNvSpPr>
+            <a:spLocks noGrp="1"/>
+          </p:cNvSpPr>
+          <p:nvPr>
+            <p:ph type="sldNum" sz="quarter" idx="4"/>
+          </p:nvPr>
+        </p:nvSpPr>
+        <p:spPr>
+          <a:xfrm>
+            <a:off x="10758922" y="6217920"/>
+            <a:ext cx="365760" cy="365760"/>
+          </a:xfrm>
+          <a:prstGeom prst="ellipse">
+            <a:avLst/>
+          </a:prstGeom>
+          <a:solidFill>
+            <a:srgbClr val="1D1D1D">
+              <a:alpha val="70000"/>
+            </a:srgbClr>
+          </a:solidFill>
+        </p:spPr>
+        <p:txBody>
+          <a:bodyPr vert="horz" lIns="18288" tIns="45720" rIns="18288" bIns="45720" rtlCol="0" anchor="ctr">
+            <a:noAutofit/>
+          </a:bodyPr>
+          <a:lstStyle>
+            <a:lvl1pPr algn="ctr">
+              <a:defRPr sz="1100" spc="0" baseline="0">
+                <a:solidFill>
+                  <a:srgbClr val="FFFFFF"/>
+                </a:solidFill>
+              </a:defRPr>
+            </a:lvl1pPr>
+          </a:lstStyle>
+          <a:p>
+            <a:fld id="{8A7A6979-0714-4377-B894-6BE4C2D6E202}" type="slidenum">
+              <a:rPr lang="en-US" dirty="0"/>
+              <a:pPr/>
+              <a:t>‹#›</a:t>
+            </a:fld>
+            <a:endParaRPr lang="en-US" dirty="0"/>
+          </a:p>
+        </p:txBody>
+      </p:sp>
+    </p:spTree>
+    <p:extLst>
+      <p:ext uri="{BB962C8B-B14F-4D97-AF65-F5344CB8AC3E}">
+        <p14:creationId xmlns:p14="http://schemas.microsoft.com/office/powerpoint/2010/main" val="2767992414"/>
+      </p:ext>
+    </p:extLst>
+  </p:cSld>
+  <p:clrMap bg1="lt1" tx1="dk1" bg2="lt2" tx2="dk2" accent1="accent1" accent2="accent2" accent3="accent3" accent4="accent4" accent5="accent5" accent6="accent6" hlink="hlink" folHlink="folHlink"/>
+  <p:sldLayoutIdLst>
+    <p:sldLayoutId id="2147483659" r:id="rId1"/>
+    <p:sldLayoutId id="2147483660" r:id="rId2"/>
+    <p:sldLayoutId id="2147483661" r:id="rId3"/>
+    <p:sldLayoutId id="2147483662" r:id="rId4"/>
+    <p:sldLayoutId id="2147483663" r:id="rId5"/>
+    <p:sldLayoutId id="2147483664" r:id="rId6"/>
+    <p:sldLayoutId id="2147483665" r:id="rId7"/>
+    <p:sldLayoutId id="2147483666" r:id="rId8"/>
+    <p:sldLayoutId id="2147483667" r:id="rId9"/>
+    <p:sldLayoutId id="2147483668" r:id="rId10"/>
+    <p:sldLayoutId id="2147483669" r:id="rId11"/>
+  </p:sldLayoutIdLst>
+  <p:hf sldNum="0" hdr="0" ftr="0" dt="0"/>
+  <p:txStyles>
+    <p:titleStyle>
+      <a:lvl1pPr algn="ctr" defTabSz="914400" rtl="0" eaLnBrk="1" latinLnBrk="0" hangingPunct="1">
+        <a:lnSpc>
+          <a:spcPct val="90000"/>
+        </a:lnSpc>
+        <a:spcBef>
+          <a:spcPct val="0"/>
+        </a:spcBef>
+        <a:buNone/>
+        <a:defRPr sz="2800" kern="1200" cap="all" spc="200" baseline="0">
+          <a:solidFill>
+            <a:srgbClr val="262626"/>
+          </a:solidFill>
+          <a:latin typeface="+mj-lt"/>
+          <a:ea typeface="+mj-ea"/>
+          <a:cs typeface="+mj-cs"/>
+        </a:defRPr>
+      </a:lvl1pPr>
+    </p:titleStyle>
+    <p:bodyStyle>
+      <a:lvl1pPr marL="228600" indent="-228600" algn="l" defTabSz="914400" rtl="0" eaLnBrk="1" latinLnBrk="0" hangingPunct="1">
+        <a:lnSpc>
+          <a:spcPct val="100000"/>
+        </a:lnSpc>
+        <a:spcBef>
+          <a:spcPts val="1000"/>
+        </a:spcBef>
+        <a:buClr>
+          <a:schemeClr val="accent2"/>
+        </a:buClr>
+        <a:buFont typeface="Arial" panose="020B0604020202020204" pitchFamily="34" charset="0"/>
+        <a:buChar char="•"/>
+        <a:defRPr sz="1800" kern="1200">
+          <a:solidFill>
+            <a:schemeClr val="tx1">
+              <a:lumMod val="85000"/>
+              <a:lumOff val="15000"/>
+            </a:schemeClr>
+          </a:solidFill>
+          <a:latin typeface="+mn-lt"/>
+          <a:ea typeface="+mn-ea"/>
+          <a:cs typeface="+mn-cs"/>
+        </a:defRPr>
+      </a:lvl1pPr>
+      <a:lvl2pPr marL="457200" indent="-228600" algn="l" defTabSz="914400" rtl="0" eaLnBrk="1" latinLnBrk="0" hangingPunct="1">
+        <a:lnSpc>
+          <a:spcPct val="100000"/>
+        </a:lnSpc>
+        <a:spcBef>
+          <a:spcPts val="1000"/>
+        </a:spcBef>
+        <a:buClr>
+          <a:schemeClr val="accent2"/>
+        </a:buClr>
+        <a:buFont typeface="Arial" panose="020B0604020202020204" pitchFamily="34" charset="0"/>
+        <a:buChar char="•"/>
+        <a:defRPr sz="1600" kern="1200">
+          <a:solidFill>
+            <a:schemeClr val="tx1">
+              <a:lumMod val="85000"/>
+              <a:lumOff val="15000"/>
+            </a:schemeClr>
+          </a:solidFill>
+          <a:latin typeface="+mn-lt"/>
+          <a:ea typeface="+mn-ea"/>
+          <a:cs typeface="+mn-cs"/>
+        </a:defRPr>
+      </a:lvl2pPr>
+      <a:lvl3pPr marL="685800" indent="-228600" algn="l" defTabSz="914400" rtl="0" eaLnBrk="1" latinLnBrk="0" hangingPunct="1">
+        <a:lnSpc>
+          <a:spcPct val="100000"/>
+        </a:lnSpc>
+        <a:spcBef>
+          <a:spcPts val="1000"/>
+        </a:spcBef>
+        <a:buClr>
+          <a:schemeClr val="accent2"/>
+        </a:buClr>
+        <a:buFont typeface="Arial" panose="020B0604020202020204" pitchFamily="34" charset="0"/>
+        <a:buChar char="•"/>
+        <a:defRPr sz="1600" kern="1200">
+          <a:solidFill>
+            <a:schemeClr val="tx1">
+              <a:lumMod val="85000"/>
+              <a:lumOff val="15000"/>
+            </a:schemeClr>
+          </a:solidFill>
+          <a:latin typeface="+mn-lt"/>
+          <a:ea typeface="+mn-ea"/>
+          <a:cs typeface="+mn-cs"/>
+        </a:defRPr>
+      </a:lvl3pPr>
+      <a:lvl4pPr marL="914400" indent="-228600" algn="l" defTabSz="914400" rtl="0" eaLnBrk="1" latinLnBrk="0" hangingPunct="1">
+        <a:lnSpc>
+          <a:spcPct val="100000"/>
+        </a:lnSpc>
+        <a:spcBef>
+          <a:spcPts val="1000"/>
+        </a:spcBef>
+        <a:buClr>
+          <a:schemeClr val="accent2"/>
+        </a:buClr>
+        <a:buFont typeface="Arial" panose="020B0604020202020204" pitchFamily="34" charset="0"/>
+        <a:buChar char="•"/>
+        <a:defRPr sz="1600" kern="1200">
+          <a:solidFill>
+            <a:schemeClr val="tx1">
+              <a:lumMod val="85000"/>
+              <a:lumOff val="15000"/>
+            </a:schemeClr>
+          </a:solidFill>
+          <a:latin typeface="+mn-lt"/>
+          <a:ea typeface="+mn-ea"/>
+          <a:cs typeface="+mn-cs"/>
+        </a:defRPr>
+      </a:lvl4pPr>
+      <a:lvl5pPr marL="1143000" indent="-228600" algn="l" defTabSz="914400" rtl="0" eaLnBrk="1" latinLnBrk="0" hangingPunct="1">
+        <a:lnSpc>
+          <a:spcPct val="100000"/>
+        </a:lnSpc>
+        <a:spcBef>
+          <a:spcPts val="1000"/>
+        </a:spcBef>
+        <a:buClr>
+          <a:schemeClr val="accent2"/>
+        </a:buClr>
+        <a:buFont typeface="Arial" panose="020B0604020202020204" pitchFamily="34" charset="0"/>
+        <a:buChar char="•"/>
+        <a:defRPr sz="1600" kern="1200">
+          <a:solidFill>
+            <a:schemeClr val="tx1">
+              <a:lumMod val="85000"/>
+              <a:lumOff val="15000"/>
+            </a:schemeClr>
+          </a:solidFill>
+          <a:latin typeface="+mn-lt"/>
+          <a:ea typeface="+mn-ea"/>
+          <a:cs typeface="+mn-cs"/>
+        </a:defRPr>
+      </a:lvl5pPr>
+      <a:lvl6pPr marL="1312863" indent="-228600" algn="l" defTabSz="914400" rtl="0" eaLnBrk="1" latinLnBrk="0" hangingPunct="1">
+        <a:lnSpc>
+          <a:spcPct val="100000"/>
+        </a:lnSpc>
+        <a:spcBef>
+          <a:spcPts val="1000"/>
+        </a:spcBef>
+        <a:buClr>
+          <a:schemeClr val="accent2"/>
+        </a:buClr>
+        <a:buFont typeface="Arial" panose="020B0604020202020204" pitchFamily="34" charset="0"/>
+        <a:buChar char="•"/>
+        <a:defRPr sz="1600" kern="1200">
+          <a:solidFill>
+            <a:schemeClr val="tx1"/>
+          </a:solidFill>
+          <a:latin typeface="+mn-lt"/>
+          <a:ea typeface="+mn-ea"/>
+          <a:cs typeface="+mn-cs"/>
+        </a:defRPr>
+      </a:lvl6pPr>
+      <a:lvl7pPr marL="1484313" indent="-228600" algn="l" defTabSz="914400" rtl="0" eaLnBrk="1" latinLnBrk="0" hangingPunct="1">
+        <a:lnSpc>
+          <a:spcPct val="100000"/>
+        </a:lnSpc>
+        <a:spcBef>
+          <a:spcPts val="1000"/>
+        </a:spcBef>
+        <a:buClr>
+          <a:schemeClr val="accent2"/>
+        </a:buClr>
+        <a:buFont typeface="Arial" panose="020B0604020202020204" pitchFamily="34" charset="0"/>
+        <a:buChar char="•"/>
+        <a:defRPr sz="1600" kern="1200">
+          <a:solidFill>
+            <a:schemeClr val="tx1"/>
+          </a:solidFill>
+          <a:latin typeface="+mn-lt"/>
+          <a:ea typeface="+mn-ea"/>
+          <a:cs typeface="+mn-cs"/>
+        </a:defRPr>
+      </a:lvl7pPr>
+      <a:lvl8pPr marL="1657350" indent="-228600" algn="l" defTabSz="914400" rtl="0" eaLnBrk="1" latinLnBrk="0" hangingPunct="1">
+        <a:lnSpc>
+          <a:spcPct val="100000"/>
+        </a:lnSpc>
+        <a:spcBef>
+          <a:spcPts val="1000"/>
+        </a:spcBef>
+        <a:buClr>
+          <a:schemeClr val="accent2"/>
+        </a:buClr>
+        <a:buFont typeface="Arial" panose="020B0604020202020204" pitchFamily="34" charset="0"/>
+        <a:buChar char="•"/>
+        <a:defRPr sz="1600" kern="1200" baseline="0">
+          <a:solidFill>
+            <a:schemeClr val="tx1"/>
+          </a:solidFill>
+          <a:latin typeface="+mn-lt"/>
+          <a:ea typeface="+mn-ea"/>
+          <a:cs typeface="+mn-cs"/>
+        </a:defRPr>
+      </a:lvl8pPr>
+      <a:lvl9pPr marL="1882775" indent="-228600" algn="l" defTabSz="914400" rtl="0" eaLnBrk="1" latinLnBrk="0" hangingPunct="1">
+        <a:lnSpc>
+          <a:spcPct val="100000"/>
+        </a:lnSpc>
+        <a:spcBef>
+          <a:spcPts val="1000"/>
+        </a:spcBef>
+        <a:buClr>
+          <a:schemeClr val="accent2"/>
+        </a:buClr>
+        <a:buFont typeface="Arial" panose="020B0604020202020204" pitchFamily="34" charset="0"/>
+        <a:buChar char="•"/>
+        <a:defRPr sz="1600" kern="1200" baseline="0">
+          <a:solidFill>
+            <a:schemeClr val="tx1"/>
+          </a:solidFill>
+          <a:latin typeface="+mn-lt"/>
+          <a:ea typeface="+mn-ea"/>
+          <a:cs typeface="+mn-cs"/>
+        </a:defRPr>
+      </a:lvl9pPr>
+    </p:bodyStyle>
+    <p:otherStyle>
+      <a:defPPr>
+        <a:defRPr lang="en-US"/>
+      </a:defPPr>
+      <a:lvl1pPr marL="0" algn="l" defTabSz="914400" rtl="0" eaLnBrk="1" latinLnBrk="0" hangingPunct="1">
+        <a:defRPr sz="1800" kern="1200">
+          <a:solidFill>
+            <a:schemeClr val="tx1"/>
+          </a:solidFill>
+          <a:latin typeface="+mn-lt"/>
+          <a:ea typeface="+mn-ea"/>
+          <a:cs typeface="+mn-cs"/>
+        </a:defRPr>
+      </a:lvl1pPr>
+      <a:lvl2pPr marL="457200" algn="l" defTabSz="914400" rtl="0" eaLnBrk="1" latinLnBrk="0" hangingPunct="1">
+        <a:defRPr sz="1800" kern="1200">
+          <a:solidFill>
+            <a:schemeClr val="tx1"/>
+          </a:solidFill>
+          <a:latin typeface="+mn-lt"/>
+          <a:ea typeface="+mn-ea"/>
+          <a:cs typeface="+mn-cs"/>
+        </a:defRPr>
+      </a:lvl2pPr>
+      <a:lvl3pPr marL="914400" algn="l" defTabSz="914400" rtl="0" eaLnBrk="1" latinLnBrk="0" hangingPunct="1">
+        <a:defRPr sz="1800" kern="1200">
+          <a:solidFill>
+            <a:schemeClr val="tx1"/>
+          </a:solidFill>
+          <a:latin typeface="+mn-lt"/>
+          <a:ea typeface="+mn-ea"/>
+          <a:cs typeface="+mn-cs"/>
+        </a:defRPr>
+      </a:lvl3pPr>
+      <a:lvl4pPr marL="1371600" algn="l" defTabSz="914400" rtl="0" eaLnBrk="1" latinLnBrk="0" hangingPunct="1">
+        <a:defRPr sz="1800" kern="1200">
+          <a:solidFill>
+            <a:schemeClr val="tx1"/>
+          </a:solidFill>
+          <a:latin typeface="+mn-lt"/>
+          <a:ea typeface="+mn-ea"/>
+          <a:cs typeface="+mn-cs"/>
+        </a:defRPr>
+      </a:lvl4pPr>
+      <a:lvl5pPr marL="1828800" algn="l" defTabSz="914400" rtl="0" eaLnBrk="1" latinLnBrk="0" hangingPunct="1">
+        <a:defRPr sz="1800" kern="1200">
+          <a:solidFill>
+            <a:schemeClr val="tx1"/>
+          </a:solidFill>
+          <a:latin typeface="+mn-lt"/>
+          <a:ea typeface="+mn-ea"/>
+          <a:cs typeface="+mn-cs"/>
+        </a:defRPr>
+      </a:lvl5pPr>
+      <a:lvl6pPr marL="2286000" algn="l" defTabSz="914400" rtl="0" eaLnBrk="1" latinLnBrk="0" hangingPunct="1">
+        <a:defRPr sz="1800" kern="1200">
+          <a:solidFill>
+            <a:schemeClr val="tx1"/>
+          </a:solidFill>
+          <a:latin typeface="+mn-lt"/>
+          <a:ea typeface="+mn-ea"/>
+          <a:cs typeface="+mn-cs"/>
+        </a:defRPr>
+      </a:lvl6pPr>
+      <a:lvl7pPr marL="2743200" algn="l" defTabSz="914400" rtl="0" eaLnBrk="1" latinLnBrk="0" hangingPunct="1">
+        <a:defRPr sz="1800" kern="1200">
+          <a:solidFill>
+            <a:schemeClr val="tx1"/>
+          </a:solidFill>
+          <a:latin typeface="+mn-lt"/>
+          <a:ea typeface="+mn-ea"/>
+          <a:cs typeface="+mn-cs"/>
+        </a:defRPr>
+      </a:lvl7pPr>
+      <a:lvl8pPr marL="3200400" algn="l" defTabSz="914400" rtl="0" eaLnBrk="1" latinLnBrk="0" hangingPunct="1">
+        <a:defRPr sz="1800" kern="1200">
+          <a:solidFill>
+            <a:schemeClr val="tx1"/>
+          </a:solidFill>
+          <a:latin typeface="+mn-lt"/>
+          <a:ea typeface="+mn-ea"/>
+          <a:cs typeface="+mn-cs"/>
+        </a:defRPr>
+      </a:lvl8pPr>
+      <a:lvl9pPr marL="3657600" algn="l" defTabSz="914400" rtl="0" eaLnBrk="1" latinLnBrk="0" hangingPunct="1">
+        <a:defRPr sz="1800" kern="1200">
+          <a:solidFill>
+            <a:schemeClr val="tx1"/>
+          </a:solidFill>
+          <a:latin typeface="+mn-lt"/>
+          <a:ea typeface="+mn-ea"/>
+          <a:cs typeface="+mn-cs"/>
+        </a:defRPr>
+      </a:lvl9pPr>
+    </p:otherStyle>
+  </p:txStyles>
+</p:sldMaster>
+</file>
+
 <file path=ppt/slides/slide1.xml><?xml version="1.0" encoding="utf-8"?>
 <p:sld xmlns:a="http://schemas.openxmlformats.org/drawingml/2006/main" xmlns:r="http://schemas.openxmlformats.org/officeDocument/2006/relationships" xmlns:p="http://schemas.openxmlformats.org/presentationml/2006/main">
   <p:cSld>
@@ -3441,7 +6617,7 @@
           <a:p>
             <a:r>
               <a:rPr lang="en-US" dirty="0"/>
-              <a:t>Peter Sharpe</a:t>
+              <a:t>Peter Sharpe &amp; Jonathan Richter</a:t>
             </a:r>
           </a:p>
           <a:p>
@@ -3533,7 +6709,7 @@
           <a:p>
             <a:r>
               <a:rPr lang="en-US" dirty="0"/>
-              <a:t>And happy belated birthday! (Friday)</a:t>
+              <a:t>And happy belated birthday! (Friday?)</a:t>
             </a:r>
           </a:p>
         </p:txBody>
@@ -3561,7 +6737,7 @@
           <a:p>
             <a:fld id="{B0A2EBFB-EDCF-45C8-BE6B-B69D1DBE344E}" type="datetime1">
               <a:rPr lang="en-US" smtClean="0"/>
-              <a:t>6/13/2020</a:t>
+              <a:t>6/14/2020</a:t>
             </a:fld>
             <a:endParaRPr lang="en-US"/>
           </a:p>
@@ -3640,6 +6816,16 @@
 <file path=ppt/slides/slide3.xml><?xml version="1.0" encoding="utf-8"?>
 <p:sld xmlns:a="http://schemas.openxmlformats.org/drawingml/2006/main" xmlns:r="http://schemas.openxmlformats.org/officeDocument/2006/relationships" xmlns:p="http://schemas.openxmlformats.org/presentationml/2006/main">
   <p:cSld>
+    <p:bg>
+      <p:bgPr>
+        <a:solidFill>
+          <a:schemeClr val="bg1">
+            <a:lumMod val="95000"/>
+          </a:schemeClr>
+        </a:solidFill>
+        <a:effectLst/>
+      </p:bgPr>
+    </p:bg>
     <p:spTree>
       <p:nvGrpSpPr>
         <p:cNvPr id="1" name=""/>
@@ -3654,12 +6840,249 @@
           <a:chExt cx="0" cy="0"/>
         </a:xfrm>
       </p:grpSpPr>
+      <p:sp useBgFill="1">
+        <p:nvSpPr>
+          <p:cNvPr id="20" name="Rectangle 19">
+            <a:extLst>
+              <a:ext uri="{FF2B5EF4-FFF2-40B4-BE49-F238E27FC236}">
+                <a16:creationId xmlns:a16="http://schemas.microsoft.com/office/drawing/2014/main" id="{1660E788-AFA9-4A1B-9991-6AA74632A15B}"/>
+              </a:ext>
+              <a:ext uri="{C183D7F6-B498-43B3-948B-1728B52AA6E4}">
+                <adec:decorative xmlns:adec="http://schemas.microsoft.com/office/drawing/2017/decorative" val="1"/>
+              </a:ext>
+            </a:extLst>
+          </p:cNvPr>
+          <p:cNvSpPr>
+            <a:spLocks noGrp="1" noRot="1" noChangeAspect="1" noMove="1" noResize="1" noEditPoints="1" noAdjustHandles="1" noChangeArrowheads="1" noChangeShapeType="1" noTextEdit="1"/>
+          </p:cNvSpPr>
+          <p:nvPr>
+            <p:extLst>
+              <p:ext uri="{386F3935-93C4-4BCD-93E2-E3B085C9AB24}">
+                <p16:designElem xmlns:p16="http://schemas.microsoft.com/office/powerpoint/2015/main" val="1"/>
+              </p:ext>
+            </p:extLst>
+          </p:nvPr>
+        </p:nvSpPr>
+        <p:spPr>
+          <a:xfrm>
+            <a:off x="0" y="0"/>
+            <a:ext cx="12191999" cy="6858000"/>
+          </a:xfrm>
+          <a:prstGeom prst="rect">
+            <a:avLst/>
+          </a:prstGeom>
+          <a:ln>
+            <a:noFill/>
+          </a:ln>
+        </p:spPr>
+        <p:style>
+          <a:lnRef idx="2">
+            <a:schemeClr val="accent1">
+              <a:shade val="50000"/>
+            </a:schemeClr>
+          </a:lnRef>
+          <a:fillRef idx="1">
+            <a:schemeClr val="accent1"/>
+          </a:fillRef>
+          <a:effectRef idx="0">
+            <a:schemeClr val="accent1"/>
+          </a:effectRef>
+          <a:fontRef idx="minor">
+            <a:schemeClr val="lt1"/>
+          </a:fontRef>
+        </p:style>
+        <p:txBody>
+          <a:bodyPr rtlCol="0" anchor="ctr"/>
+          <a:lstStyle/>
+          <a:p>
+            <a:pPr marL="0" marR="0" lvl="0" indent="0" algn="ctr" defTabSz="457200" rtl="0" eaLnBrk="1" fontAlgn="auto" latinLnBrk="0" hangingPunct="1">
+              <a:lnSpc>
+                <a:spcPct val="100000"/>
+              </a:lnSpc>
+              <a:spcBef>
+                <a:spcPts val="0"/>
+              </a:spcBef>
+              <a:spcAft>
+                <a:spcPts val="0"/>
+              </a:spcAft>
+              <a:buClrTx/>
+              <a:buSzTx/>
+              <a:buFontTx/>
+              <a:buNone/>
+              <a:tabLst/>
+              <a:defRPr/>
+            </a:pPr>
+            <a:endParaRPr kumimoji="0" lang="en-US" sz="1800" b="0" i="0" u="none" strike="noStrike" kern="1200" cap="none" spc="0" normalizeH="0" baseline="0" noProof="0">
+              <a:ln>
+                <a:noFill/>
+              </a:ln>
+              <a:solidFill>
+                <a:srgbClr val="FFFFFF"/>
+              </a:solidFill>
+              <a:effectLst/>
+              <a:uLnTx/>
+              <a:uFillTx/>
+              <a:latin typeface="Gill Sans MT" panose="020B0502020104020203"/>
+              <a:ea typeface="+mn-ea"/>
+              <a:cs typeface="+mn-cs"/>
+            </a:endParaRPr>
+          </a:p>
+        </p:txBody>
+      </p:sp>
+      <p:pic>
+        <p:nvPicPr>
+          <p:cNvPr id="12" name="Picture 11" descr="A plane flying in a clear blue sky&#10;&#10;Description automatically generated">
+            <a:extLst>
+              <a:ext uri="{FF2B5EF4-FFF2-40B4-BE49-F238E27FC236}">
+                <a16:creationId xmlns:a16="http://schemas.microsoft.com/office/drawing/2014/main" id="{1A69DD09-E44D-9C45-9901-AC90DE5F524A}"/>
+              </a:ext>
+            </a:extLst>
+          </p:cNvPr>
+          <p:cNvPicPr>
+            <a:picLocks noChangeAspect="1"/>
+          </p:cNvPicPr>
+          <p:nvPr/>
+        </p:nvPicPr>
+        <p:blipFill rotWithShape="1">
+          <a:blip r:embed="rId2"/>
+          <a:srcRect l="4353" r="-2" b="-2"/>
+          <a:stretch/>
+        </p:blipFill>
+        <p:spPr>
+          <a:xfrm>
+            <a:off x="4649234" y="10"/>
+            <a:ext cx="3775438" cy="2634800"/>
+          </a:xfrm>
+          <a:prstGeom prst="rect">
+            <a:avLst/>
+          </a:prstGeom>
+        </p:spPr>
+      </p:pic>
+      <p:pic>
+        <p:nvPicPr>
+          <p:cNvPr id="7" name="Picture 6" descr="A large air plane flying in the sky&#10;&#10;Description automatically generated">
+            <a:extLst>
+              <a:ext uri="{FF2B5EF4-FFF2-40B4-BE49-F238E27FC236}">
+                <a16:creationId xmlns:a16="http://schemas.microsoft.com/office/drawing/2014/main" id="{5D130FF4-B198-5940-B069-18524F2F0847}"/>
+              </a:ext>
+            </a:extLst>
+          </p:cNvPr>
+          <p:cNvPicPr>
+            <a:picLocks noChangeAspect="1"/>
+          </p:cNvPicPr>
+          <p:nvPr/>
+        </p:nvPicPr>
+        <p:blipFill rotWithShape="1">
+          <a:blip r:embed="rId3"/>
+          <a:srcRect t="16272" r="-1" b="-1"/>
+          <a:stretch/>
+        </p:blipFill>
+        <p:spPr>
+          <a:xfrm>
+            <a:off x="4649234" y="2634810"/>
+            <a:ext cx="7537702" cy="4212708"/>
+          </a:xfrm>
+          <a:prstGeom prst="rect">
+            <a:avLst/>
+          </a:prstGeom>
+        </p:spPr>
+      </p:pic>
+      <p:sp>
+        <p:nvSpPr>
+          <p:cNvPr id="22" name="Rectangle 21">
+            <a:extLst>
+              <a:ext uri="{FF2B5EF4-FFF2-40B4-BE49-F238E27FC236}">
+                <a16:creationId xmlns:a16="http://schemas.microsoft.com/office/drawing/2014/main" id="{867D4867-5BA7-4462-B2F6-A23F4A622AA7}"/>
+              </a:ext>
+              <a:ext uri="{C183D7F6-B498-43B3-948B-1728B52AA6E4}">
+                <adec:decorative xmlns:adec="http://schemas.microsoft.com/office/drawing/2017/decorative" val="1"/>
+              </a:ext>
+            </a:extLst>
+          </p:cNvPr>
+          <p:cNvSpPr>
+            <a:spLocks noGrp="1" noRot="1" noChangeAspect="1" noMove="1" noResize="1" noEditPoints="1" noAdjustHandles="1" noChangeArrowheads="1" noChangeShapeType="1" noTextEdit="1"/>
+          </p:cNvSpPr>
+          <p:nvPr>
+            <p:extLst>
+              <p:ext uri="{386F3935-93C4-4BCD-93E2-E3B085C9AB24}">
+                <p16:designElem xmlns:p16="http://schemas.microsoft.com/office/powerpoint/2015/main" val="1"/>
+              </p:ext>
+            </p:extLst>
+          </p:nvPr>
+        </p:nvSpPr>
+        <p:spPr>
+          <a:xfrm>
+            <a:off x="0" y="0"/>
+            <a:ext cx="4654296" cy="6858000"/>
+          </a:xfrm>
+          <a:prstGeom prst="rect">
+            <a:avLst/>
+          </a:prstGeom>
+          <a:solidFill>
+            <a:schemeClr val="tx2"/>
+          </a:solidFill>
+          <a:ln>
+            <a:noFill/>
+          </a:ln>
+        </p:spPr>
+        <p:style>
+          <a:lnRef idx="0">
+            <a:scrgbClr r="0" g="0" b="0"/>
+          </a:lnRef>
+          <a:fillRef idx="0">
+            <a:scrgbClr r="0" g="0" b="0"/>
+          </a:fillRef>
+          <a:effectRef idx="0">
+            <a:scrgbClr r="0" g="0" b="0"/>
+          </a:effectRef>
+          <a:fontRef idx="minor">
+            <a:schemeClr val="lt1"/>
+          </a:fontRef>
+        </p:style>
+        <p:txBody>
+          <a:bodyPr rtlCol="0" anchor="ctr"/>
+          <a:lstStyle/>
+          <a:p>
+            <a:pPr marL="0" marR="0" lvl="0" indent="0" algn="ctr" defTabSz="457200" rtl="0" eaLnBrk="1" fontAlgn="auto" latinLnBrk="0" hangingPunct="1">
+              <a:lnSpc>
+                <a:spcPct val="100000"/>
+              </a:lnSpc>
+              <a:spcBef>
+                <a:spcPts val="0"/>
+              </a:spcBef>
+              <a:spcAft>
+                <a:spcPts val="0"/>
+              </a:spcAft>
+              <a:buClrTx/>
+              <a:buSzTx/>
+              <a:buFontTx/>
+              <a:buNone/>
+              <a:tabLst/>
+              <a:defRPr/>
+            </a:pPr>
+            <a:endParaRPr kumimoji="0" lang="en-US" sz="1800" b="0" i="0" u="none" strike="noStrike" kern="1200" cap="none" spc="0" normalizeH="0" baseline="0" noProof="0">
+              <a:ln>
+                <a:noFill/>
+              </a:ln>
+              <a:solidFill>
+                <a:srgbClr val="FFFFFF"/>
+              </a:solidFill>
+              <a:effectLst/>
+              <a:uLnTx/>
+              <a:uFillTx/>
+              <a:latin typeface="Gill Sans MT" panose="020B0502020104020203"/>
+              <a:ea typeface="+mn-ea"/>
+              <a:cs typeface="+mn-cs"/>
+            </a:endParaRPr>
+          </a:p>
+        </p:txBody>
+      </p:sp>
       <p:sp>
         <p:nvSpPr>
           <p:cNvPr id="2" name="Title 1">
             <a:extLst>
               <a:ext uri="{FF2B5EF4-FFF2-40B4-BE49-F238E27FC236}">
-                <a16:creationId xmlns:a16="http://schemas.microsoft.com/office/drawing/2014/main" id="{517703E9-D918-4570-BAD2-9E4ABC9783F2}"/>
+                <a16:creationId xmlns:a16="http://schemas.microsoft.com/office/drawing/2014/main" id="{EF427E9F-79E5-3A48-8060-2098225BEBDF}"/>
               </a:ext>
             </a:extLst>
           </p:cNvPr>
@@ -3670,133 +7093,169 @@
             <p:ph type="title"/>
           </p:nvPr>
         </p:nvSpPr>
-        <p:spPr/>
-        <p:txBody>
-          <a:bodyPr/>
-          <a:lstStyle/>
-          <a:p>
-            <a:r>
-              <a:rPr lang="en-US" dirty="0"/>
-              <a:t>Battery Modelling</a:t>
-            </a:r>
-          </a:p>
-        </p:txBody>
-      </p:sp>
-      <p:sp>
-        <p:nvSpPr>
-          <p:cNvPr id="3" name="Text Placeholder 2">
-            <a:extLst>
-              <a:ext uri="{FF2B5EF4-FFF2-40B4-BE49-F238E27FC236}">
-                <a16:creationId xmlns:a16="http://schemas.microsoft.com/office/drawing/2014/main" id="{5EEA1FB8-C94A-434B-A8B4-12B79991A9AF}"/>
-              </a:ext>
-            </a:extLst>
-          </p:cNvPr>
-          <p:cNvSpPr>
-            <a:spLocks noGrp="1"/>
-          </p:cNvSpPr>
-          <p:nvPr>
-            <p:ph type="body" idx="1"/>
-          </p:nvPr>
-        </p:nvSpPr>
-        <p:spPr/>
-        <p:txBody>
-          <a:bodyPr/>
-          <a:lstStyle/>
-          <a:p>
-            <a:endParaRPr lang="en-US"/>
-          </a:p>
-        </p:txBody>
-      </p:sp>
-      <p:sp>
-        <p:nvSpPr>
-          <p:cNvPr id="4" name="Date Placeholder 3">
-            <a:extLst>
-              <a:ext uri="{FF2B5EF4-FFF2-40B4-BE49-F238E27FC236}">
-                <a16:creationId xmlns:a16="http://schemas.microsoft.com/office/drawing/2014/main" id="{5585D0D7-903C-4086-BC39-F03ED5D3ADDA}"/>
-              </a:ext>
-            </a:extLst>
-          </p:cNvPr>
-          <p:cNvSpPr>
-            <a:spLocks noGrp="1"/>
-          </p:cNvSpPr>
-          <p:nvPr>
-            <p:ph type="dt" sz="half" idx="10"/>
-          </p:nvPr>
-        </p:nvSpPr>
-        <p:spPr/>
-        <p:txBody>
-          <a:bodyPr/>
-          <a:lstStyle/>
-          <a:p>
-            <a:fld id="{B0A2EBFB-EDCF-45C8-BE6B-B69D1DBE344E}" type="datetime1">
-              <a:rPr lang="en-US" smtClean="0"/>
-              <a:t>6/13/2020</a:t>
-            </a:fld>
-            <a:endParaRPr lang="en-US"/>
-          </a:p>
-        </p:txBody>
-      </p:sp>
-      <p:sp>
-        <p:nvSpPr>
-          <p:cNvPr id="5" name="Footer Placeholder 4">
-            <a:extLst>
-              <a:ext uri="{FF2B5EF4-FFF2-40B4-BE49-F238E27FC236}">
-                <a16:creationId xmlns:a16="http://schemas.microsoft.com/office/drawing/2014/main" id="{635E238E-3342-4CA8-AEE4-D0F92196E1A1}"/>
-              </a:ext>
-            </a:extLst>
-          </p:cNvPr>
-          <p:cNvSpPr>
-            <a:spLocks noGrp="1"/>
-          </p:cNvSpPr>
-          <p:nvPr>
-            <p:ph type="ftr" sz="quarter" idx="11"/>
-          </p:nvPr>
-        </p:nvSpPr>
-        <p:spPr/>
-        <p:txBody>
-          <a:bodyPr/>
-          <a:lstStyle/>
-          <a:p>
-            <a:r>
-              <a:rPr lang="en-US"/>
-              <a:t>Peter Sharpe, MIT AeroAstro</a:t>
-            </a:r>
-          </a:p>
-        </p:txBody>
-      </p:sp>
-      <p:sp>
-        <p:nvSpPr>
-          <p:cNvPr id="6" name="Slide Number Placeholder 5">
-            <a:extLst>
-              <a:ext uri="{FF2B5EF4-FFF2-40B4-BE49-F238E27FC236}">
-                <a16:creationId xmlns:a16="http://schemas.microsoft.com/office/drawing/2014/main" id="{0A382B8C-EF10-460D-ADA7-DAEEEB6536B5}"/>
-              </a:ext>
-            </a:extLst>
-          </p:cNvPr>
-          <p:cNvSpPr>
-            <a:spLocks noGrp="1"/>
-          </p:cNvSpPr>
-          <p:nvPr>
-            <p:ph type="sldNum" sz="quarter" idx="12"/>
-          </p:nvPr>
-        </p:nvSpPr>
-        <p:spPr/>
-        <p:txBody>
-          <a:bodyPr/>
-          <a:lstStyle/>
-          <a:p>
-            <a:fld id="{A7F4FF59-E917-45B2-BF6D-2D6762FCD355}" type="slidenum">
-              <a:rPr lang="en-US" smtClean="0"/>
-              <a:t>3</a:t>
-            </a:fld>
-            <a:endParaRPr lang="en-US"/>
-          </a:p>
-        </p:txBody>
-      </p:sp>
+        <p:spPr>
+          <a:xfrm>
+            <a:off x="643467" y="643467"/>
+            <a:ext cx="3363974" cy="1728044"/>
+          </a:xfrm>
+          <a:noFill/>
+          <a:ln>
+            <a:solidFill>
+              <a:schemeClr val="bg1"/>
+            </a:solidFill>
+          </a:ln>
+        </p:spPr>
+        <p:txBody>
+          <a:bodyPr wrap="square">
+            <a:normAutofit/>
+          </a:bodyPr>
+          <a:lstStyle/>
+          <a:p>
+            <a:r>
+              <a:rPr lang="en-US">
+                <a:solidFill>
+                  <a:schemeClr val="bg1"/>
+                </a:solidFill>
+              </a:rPr>
+              <a:t>New Intern: Jonathan Richter</a:t>
+            </a:r>
+          </a:p>
+        </p:txBody>
+      </p:sp>
+      <p:sp>
+        <p:nvSpPr>
+          <p:cNvPr id="10" name="Content Placeholder 9">
+            <a:extLst>
+              <a:ext uri="{FF2B5EF4-FFF2-40B4-BE49-F238E27FC236}">
+                <a16:creationId xmlns:a16="http://schemas.microsoft.com/office/drawing/2014/main" id="{8A20F4A4-2C5F-4842-974F-FB8E27E520C5}"/>
+              </a:ext>
+            </a:extLst>
+          </p:cNvPr>
+          <p:cNvSpPr>
+            <a:spLocks noGrp="1"/>
+          </p:cNvSpPr>
+          <p:nvPr>
+            <p:ph idx="1"/>
+          </p:nvPr>
+        </p:nvSpPr>
+        <p:spPr>
+          <a:xfrm>
+            <a:off x="643468" y="2638044"/>
+            <a:ext cx="3363974" cy="3415622"/>
+          </a:xfrm>
+        </p:spPr>
+        <p:txBody>
+          <a:bodyPr>
+            <a:normAutofit/>
+          </a:bodyPr>
+          <a:lstStyle/>
+          <a:p>
+            <a:r>
+              <a:rPr lang="en-US" dirty="0">
+                <a:solidFill>
+                  <a:schemeClr val="bg1"/>
+                </a:solidFill>
+              </a:rPr>
+              <a:t>Washington University in St. Louis Class of 2021</a:t>
+            </a:r>
+          </a:p>
+          <a:p>
+            <a:r>
+              <a:rPr lang="en-US" dirty="0">
+                <a:solidFill>
+                  <a:schemeClr val="bg1"/>
+                </a:solidFill>
+              </a:rPr>
+              <a:t>BS Mechanical Engineering Minor Aerospace Engineering</a:t>
+            </a:r>
+          </a:p>
+          <a:p>
+            <a:r>
+              <a:rPr lang="en-US" dirty="0" err="1">
+                <a:solidFill>
+                  <a:schemeClr val="bg1"/>
+                </a:solidFill>
+              </a:rPr>
+              <a:t>WashU</a:t>
+            </a:r>
+            <a:r>
+              <a:rPr lang="en-US" dirty="0">
+                <a:solidFill>
+                  <a:schemeClr val="bg1"/>
+                </a:solidFill>
+              </a:rPr>
+              <a:t> Design Build Fly Chief Engineer 2019-2020</a:t>
+            </a:r>
+          </a:p>
+          <a:p>
+            <a:r>
+              <a:rPr lang="en-US" dirty="0">
+                <a:solidFill>
+                  <a:schemeClr val="bg1"/>
+                </a:solidFill>
+              </a:rPr>
+              <a:t>Poor Man’s Pilot: 15 years of RC experience</a:t>
+            </a:r>
+          </a:p>
+          <a:p>
+            <a:r>
+              <a:rPr lang="en-US" dirty="0">
+                <a:solidFill>
+                  <a:schemeClr val="bg1"/>
+                </a:solidFill>
+              </a:rPr>
+              <a:t>Currently Located: Stamford, CT (~45 mi NYC)</a:t>
+            </a:r>
+          </a:p>
+          <a:p>
+            <a:endParaRPr lang="en-US" dirty="0">
+              <a:solidFill>
+                <a:schemeClr val="bg1"/>
+              </a:solidFill>
+            </a:endParaRPr>
+          </a:p>
+          <a:p>
+            <a:endParaRPr lang="en-US" dirty="0">
+              <a:solidFill>
+                <a:schemeClr val="bg1"/>
+              </a:solidFill>
+            </a:endParaRPr>
+          </a:p>
+        </p:txBody>
+      </p:sp>
+      <p:pic>
+        <p:nvPicPr>
+          <p:cNvPr id="15" name="Picture 14" descr="A group of people in a room&#10;&#10;Description automatically generated">
+            <a:extLst>
+              <a:ext uri="{FF2B5EF4-FFF2-40B4-BE49-F238E27FC236}">
+                <a16:creationId xmlns:a16="http://schemas.microsoft.com/office/drawing/2014/main" id="{28EB63B0-F97B-FA42-A5BA-AC4BC382BF63}"/>
+              </a:ext>
+            </a:extLst>
+          </p:cNvPr>
+          <p:cNvPicPr>
+            <a:picLocks noChangeAspect="1"/>
+          </p:cNvPicPr>
+          <p:nvPr/>
+        </p:nvPicPr>
+        <p:blipFill rotWithShape="1">
+          <a:blip r:embed="rId4"/>
+          <a:srcRect r="-2" b="6603"/>
+          <a:stretch/>
+        </p:blipFill>
+        <p:spPr>
+          <a:xfrm>
+            <a:off x="8424672" y="10"/>
+            <a:ext cx="3776472" cy="2645284"/>
+          </a:xfrm>
+          <a:prstGeom prst="rect">
+            <a:avLst/>
+          </a:prstGeom>
+        </p:spPr>
+      </p:pic>
     </p:spTree>
     <p:extLst>
       <p:ext uri="{BB962C8B-B14F-4D97-AF65-F5344CB8AC3E}">
-        <p14:creationId xmlns:p14="http://schemas.microsoft.com/office/powerpoint/2010/main" val="3152979406"/>
+        <p14:creationId xmlns:p14="http://schemas.microsoft.com/office/powerpoint/2010/main" val="1514055619"/>
       </p:ext>
     </p:extLst>
   </p:cSld>
@@ -3828,7 +7287,7 @@
           <p:cNvPr id="2" name="Title 1">
             <a:extLst>
               <a:ext uri="{FF2B5EF4-FFF2-40B4-BE49-F238E27FC236}">
-                <a16:creationId xmlns:a16="http://schemas.microsoft.com/office/drawing/2014/main" id="{0367EA18-D429-4697-9E5E-C561CF96746D}"/>
+                <a16:creationId xmlns:a16="http://schemas.microsoft.com/office/drawing/2014/main" id="{517703E9-D918-4570-BAD2-9E4ABC9783F2}"/>
               </a:ext>
             </a:extLst>
           </p:cNvPr>
@@ -3846,25 +7305,25 @@
           <a:p>
             <a:r>
               <a:rPr lang="en-US" dirty="0"/>
-              <a:t>Updates from Kevin Uleck</a:t>
-            </a:r>
-          </a:p>
-        </p:txBody>
-      </p:sp>
-      <p:sp>
-        <p:nvSpPr>
-          <p:cNvPr id="3" name="Content Placeholder 2">
-            <a:extLst>
-              <a:ext uri="{FF2B5EF4-FFF2-40B4-BE49-F238E27FC236}">
-                <a16:creationId xmlns:a16="http://schemas.microsoft.com/office/drawing/2014/main" id="{93DDE2AC-1402-4FC2-9B64-5C370644E7C6}"/>
-              </a:ext>
-            </a:extLst>
-          </p:cNvPr>
-          <p:cNvSpPr>
-            <a:spLocks noGrp="1"/>
-          </p:cNvSpPr>
-          <p:nvPr>
-            <p:ph idx="1"/>
+              <a:t>Battery Modelling</a:t>
+            </a:r>
+          </a:p>
+        </p:txBody>
+      </p:sp>
+      <p:sp>
+        <p:nvSpPr>
+          <p:cNvPr id="3" name="Text Placeholder 2">
+            <a:extLst>
+              <a:ext uri="{FF2B5EF4-FFF2-40B4-BE49-F238E27FC236}">
+                <a16:creationId xmlns:a16="http://schemas.microsoft.com/office/drawing/2014/main" id="{5EEA1FB8-C94A-434B-A8B4-12B79991A9AF}"/>
+              </a:ext>
+            </a:extLst>
+          </p:cNvPr>
+          <p:cNvSpPr>
+            <a:spLocks noGrp="1"/>
+          </p:cNvSpPr>
+          <p:nvPr>
+            <p:ph type="body" idx="1"/>
           </p:nvPr>
         </p:nvSpPr>
         <p:spPr/>
@@ -3881,7 +7340,7 @@
           <p:cNvPr id="4" name="Date Placeholder 3">
             <a:extLst>
               <a:ext uri="{FF2B5EF4-FFF2-40B4-BE49-F238E27FC236}">
-                <a16:creationId xmlns:a16="http://schemas.microsoft.com/office/drawing/2014/main" id="{CD9921C8-EFE6-4168-8620-966086D49443}"/>
+                <a16:creationId xmlns:a16="http://schemas.microsoft.com/office/drawing/2014/main" id="{5585D0D7-903C-4086-BC39-F03ED5D3ADDA}"/>
               </a:ext>
             </a:extLst>
           </p:cNvPr>
@@ -3897,9 +7356,9 @@
           <a:bodyPr/>
           <a:lstStyle/>
           <a:p>
-            <a:fld id="{5BC980F7-5BD4-479F-A39E-510B2770630D}" type="datetime1">
+            <a:fld id="{B0A2EBFB-EDCF-45C8-BE6B-B69D1DBE344E}" type="datetime1">
               <a:rPr lang="en-US" smtClean="0"/>
-              <a:t>6/13/2020</a:t>
+              <a:t>6/14/2020</a:t>
             </a:fld>
             <a:endParaRPr lang="en-US"/>
           </a:p>
@@ -3910,7 +7369,7 @@
           <p:cNvPr id="5" name="Footer Placeholder 4">
             <a:extLst>
               <a:ext uri="{FF2B5EF4-FFF2-40B4-BE49-F238E27FC236}">
-                <a16:creationId xmlns:a16="http://schemas.microsoft.com/office/drawing/2014/main" id="{08B98FAC-1F65-4913-A8B0-9F7553FB3CAC}"/>
+                <a16:creationId xmlns:a16="http://schemas.microsoft.com/office/drawing/2014/main" id="{635E238E-3342-4CA8-AEE4-D0F92196E1A1}"/>
               </a:ext>
             </a:extLst>
           </p:cNvPr>
@@ -3938,7 +7397,7 @@
           <p:cNvPr id="6" name="Slide Number Placeholder 5">
             <a:extLst>
               <a:ext uri="{FF2B5EF4-FFF2-40B4-BE49-F238E27FC236}">
-                <a16:creationId xmlns:a16="http://schemas.microsoft.com/office/drawing/2014/main" id="{F5596DF0-6A35-4977-9134-7BBB3776F664}"/>
+                <a16:creationId xmlns:a16="http://schemas.microsoft.com/office/drawing/2014/main" id="{0A382B8C-EF10-460D-ADA7-DAEEEB6536B5}"/>
               </a:ext>
             </a:extLst>
           </p:cNvPr>
@@ -3965,7 +7424,7 @@
     </p:spTree>
     <p:extLst>
       <p:ext uri="{BB962C8B-B14F-4D97-AF65-F5344CB8AC3E}">
-        <p14:creationId xmlns:p14="http://schemas.microsoft.com/office/powerpoint/2010/main" val="3300285240"/>
+        <p14:creationId xmlns:p14="http://schemas.microsoft.com/office/powerpoint/2010/main" val="3152979406"/>
       </p:ext>
     </p:extLst>
   </p:cSld>
@@ -3997,7 +7456,7 @@
           <p:cNvPr id="2" name="Title 1">
             <a:extLst>
               <a:ext uri="{FF2B5EF4-FFF2-40B4-BE49-F238E27FC236}">
-                <a16:creationId xmlns:a16="http://schemas.microsoft.com/office/drawing/2014/main" id="{35B364DD-D8FE-4249-91D3-05B5310C9D85}"/>
+                <a16:creationId xmlns:a16="http://schemas.microsoft.com/office/drawing/2014/main" id="{0367EA18-D429-4697-9E5E-C561CF96746D}"/>
               </a:ext>
             </a:extLst>
           </p:cNvPr>
@@ -4015,25 +7474,25 @@
           <a:p>
             <a:r>
               <a:rPr lang="en-US" dirty="0"/>
-              <a:t>Study #1: One Big Vertical Stabilizer</a:t>
-            </a:r>
-          </a:p>
-        </p:txBody>
-      </p:sp>
-      <p:sp>
-        <p:nvSpPr>
-          <p:cNvPr id="3" name="Text Placeholder 2">
-            <a:extLst>
-              <a:ext uri="{FF2B5EF4-FFF2-40B4-BE49-F238E27FC236}">
-                <a16:creationId xmlns:a16="http://schemas.microsoft.com/office/drawing/2014/main" id="{9558892D-E9FB-4A41-906D-DBB897F75082}"/>
-              </a:ext>
-            </a:extLst>
-          </p:cNvPr>
-          <p:cNvSpPr>
-            <a:spLocks noGrp="1"/>
-          </p:cNvSpPr>
-          <p:nvPr>
-            <p:ph type="body" idx="1"/>
+              <a:t>Updates from Kevin Uleck</a:t>
+            </a:r>
+          </a:p>
+        </p:txBody>
+      </p:sp>
+      <p:sp>
+        <p:nvSpPr>
+          <p:cNvPr id="3" name="Content Placeholder 2">
+            <a:extLst>
+              <a:ext uri="{FF2B5EF4-FFF2-40B4-BE49-F238E27FC236}">
+                <a16:creationId xmlns:a16="http://schemas.microsoft.com/office/drawing/2014/main" id="{93DDE2AC-1402-4FC2-9B64-5C370644E7C6}"/>
+              </a:ext>
+            </a:extLst>
+          </p:cNvPr>
+          <p:cNvSpPr>
+            <a:spLocks noGrp="1"/>
+          </p:cNvSpPr>
+          <p:nvPr>
+            <p:ph idx="1"/>
           </p:nvPr>
         </p:nvSpPr>
         <p:spPr/>
@@ -4050,7 +7509,7 @@
           <p:cNvPr id="4" name="Date Placeholder 3">
             <a:extLst>
               <a:ext uri="{FF2B5EF4-FFF2-40B4-BE49-F238E27FC236}">
-                <a16:creationId xmlns:a16="http://schemas.microsoft.com/office/drawing/2014/main" id="{7DECD3FD-53A9-4F86-AF64-62CBF4395A6C}"/>
+                <a16:creationId xmlns:a16="http://schemas.microsoft.com/office/drawing/2014/main" id="{CD9921C8-EFE6-4168-8620-966086D49443}"/>
               </a:ext>
             </a:extLst>
           </p:cNvPr>
@@ -4066,9 +7525,9 @@
           <a:bodyPr/>
           <a:lstStyle/>
           <a:p>
-            <a:fld id="{B0A2EBFB-EDCF-45C8-BE6B-B69D1DBE344E}" type="datetime1">
+            <a:fld id="{5BC980F7-5BD4-479F-A39E-510B2770630D}" type="datetime1">
               <a:rPr lang="en-US" smtClean="0"/>
-              <a:t>6/13/2020</a:t>
+              <a:t>6/14/2020</a:t>
             </a:fld>
             <a:endParaRPr lang="en-US"/>
           </a:p>
@@ -4079,7 +7538,7 @@
           <p:cNvPr id="5" name="Footer Placeholder 4">
             <a:extLst>
               <a:ext uri="{FF2B5EF4-FFF2-40B4-BE49-F238E27FC236}">
-                <a16:creationId xmlns:a16="http://schemas.microsoft.com/office/drawing/2014/main" id="{66E440FB-A01C-4D3D-8098-F5AA74DD147F}"/>
+                <a16:creationId xmlns:a16="http://schemas.microsoft.com/office/drawing/2014/main" id="{08B98FAC-1F65-4913-A8B0-9F7553FB3CAC}"/>
               </a:ext>
             </a:extLst>
           </p:cNvPr>
@@ -4107,7 +7566,7 @@
           <p:cNvPr id="6" name="Slide Number Placeholder 5">
             <a:extLst>
               <a:ext uri="{FF2B5EF4-FFF2-40B4-BE49-F238E27FC236}">
-                <a16:creationId xmlns:a16="http://schemas.microsoft.com/office/drawing/2014/main" id="{F87E9EF2-E66A-4250-B218-81C4D0E2B484}"/>
+                <a16:creationId xmlns:a16="http://schemas.microsoft.com/office/drawing/2014/main" id="{F5596DF0-6A35-4977-9134-7BBB3776F664}"/>
               </a:ext>
             </a:extLst>
           </p:cNvPr>
@@ -4134,7 +7593,7 @@
     </p:spTree>
     <p:extLst>
       <p:ext uri="{BB962C8B-B14F-4D97-AF65-F5344CB8AC3E}">
-        <p14:creationId xmlns:p14="http://schemas.microsoft.com/office/powerpoint/2010/main" val="4196979530"/>
+        <p14:creationId xmlns:p14="http://schemas.microsoft.com/office/powerpoint/2010/main" val="3300285240"/>
       </p:ext>
     </p:extLst>
   </p:cSld>
@@ -4166,7 +7625,7 @@
           <p:cNvPr id="2" name="Title 1">
             <a:extLst>
               <a:ext uri="{FF2B5EF4-FFF2-40B4-BE49-F238E27FC236}">
-                <a16:creationId xmlns:a16="http://schemas.microsoft.com/office/drawing/2014/main" id="{EAD6D738-D168-42F6-B6F4-EDC04DC91CD7}"/>
+                <a16:creationId xmlns:a16="http://schemas.microsoft.com/office/drawing/2014/main" id="{35B364DD-D8FE-4249-91D3-05B5310C9D85}"/>
               </a:ext>
             </a:extLst>
           </p:cNvPr>
@@ -4177,19 +7636,14 @@
             <p:ph type="title"/>
           </p:nvPr>
         </p:nvSpPr>
-        <p:spPr>
-          <a:xfrm>
-            <a:off x="839788" y="365126"/>
-            <a:ext cx="10515600" cy="596498"/>
-          </a:xfrm>
-        </p:spPr>
+        <p:spPr/>
         <p:txBody>
           <a:bodyPr/>
           <a:lstStyle/>
           <a:p>
             <a:r>
               <a:rPr lang="en-US" dirty="0"/>
-              <a:t>Options</a:t>
+              <a:t>Study #1: One Big Vertical Stabilizer</a:t>
             </a:r>
           </a:p>
         </p:txBody>
@@ -4199,7 +7653,7 @@
           <p:cNvPr id="3" name="Text Placeholder 2">
             <a:extLst>
               <a:ext uri="{FF2B5EF4-FFF2-40B4-BE49-F238E27FC236}">
-                <a16:creationId xmlns:a16="http://schemas.microsoft.com/office/drawing/2014/main" id="{1B32592C-5E8D-45F8-BC60-FEDACCB4E0CC}"/>
+                <a16:creationId xmlns:a16="http://schemas.microsoft.com/office/drawing/2014/main" id="{9558892D-E9FB-4A41-906D-DBB897F75082}"/>
               </a:ext>
             </a:extLst>
           </p:cNvPr>
@@ -4210,45 +7664,7 @@
             <p:ph type="body" idx="1"/>
           </p:nvPr>
         </p:nvSpPr>
-        <p:spPr>
-          <a:xfrm>
-            <a:off x="839788" y="796805"/>
-            <a:ext cx="5157787" cy="823912"/>
-          </a:xfrm>
-        </p:spPr>
-        <p:txBody>
-          <a:bodyPr/>
-          <a:lstStyle/>
-          <a:p>
-            <a:r>
-              <a:rPr lang="en-US" dirty="0"/>
-              <a:t>Equal Vertical Stabilizers</a:t>
-            </a:r>
-          </a:p>
-        </p:txBody>
-      </p:sp>
-      <p:sp>
-        <p:nvSpPr>
-          <p:cNvPr id="4" name="Content Placeholder 3">
-            <a:extLst>
-              <a:ext uri="{FF2B5EF4-FFF2-40B4-BE49-F238E27FC236}">
-                <a16:creationId xmlns:a16="http://schemas.microsoft.com/office/drawing/2014/main" id="{137463C9-7371-40A4-9183-687FE5945E94}"/>
-              </a:ext>
-            </a:extLst>
-          </p:cNvPr>
-          <p:cNvSpPr>
-            <a:spLocks noGrp="1"/>
-          </p:cNvSpPr>
-          <p:nvPr>
-            <p:ph sz="half" idx="2"/>
-          </p:nvPr>
-        </p:nvSpPr>
-        <p:spPr>
-          <a:xfrm>
-            <a:off x="839788" y="4031087"/>
-            <a:ext cx="5157787" cy="2158576"/>
-          </a:xfrm>
-        </p:spPr>
+        <p:spPr/>
         <p:txBody>
           <a:bodyPr/>
           <a:lstStyle/>
@@ -4259,73 +7675,10 @@
       </p:sp>
       <p:sp>
         <p:nvSpPr>
-          <p:cNvPr id="5" name="Text Placeholder 4">
-            <a:extLst>
-              <a:ext uri="{FF2B5EF4-FFF2-40B4-BE49-F238E27FC236}">
-                <a16:creationId xmlns:a16="http://schemas.microsoft.com/office/drawing/2014/main" id="{E828FC68-8E21-471A-911A-DDD2BCF1EE3F}"/>
-              </a:ext>
-            </a:extLst>
-          </p:cNvPr>
-          <p:cNvSpPr>
-            <a:spLocks noGrp="1"/>
-          </p:cNvSpPr>
-          <p:nvPr>
-            <p:ph type="body" sz="quarter" idx="3"/>
-          </p:nvPr>
-        </p:nvSpPr>
-        <p:spPr>
-          <a:xfrm>
-            <a:off x="6172200" y="796805"/>
-            <a:ext cx="5183188" cy="823912"/>
-          </a:xfrm>
-        </p:spPr>
-        <p:txBody>
-          <a:bodyPr/>
-          <a:lstStyle/>
-          <a:p>
-            <a:r>
-              <a:rPr lang="en-US" dirty="0"/>
-              <a:t>Single Center Vertical Stabilizer</a:t>
-            </a:r>
-          </a:p>
-        </p:txBody>
-      </p:sp>
-      <p:sp>
-        <p:nvSpPr>
-          <p:cNvPr id="6" name="Content Placeholder 5">
-            <a:extLst>
-              <a:ext uri="{FF2B5EF4-FFF2-40B4-BE49-F238E27FC236}">
-                <a16:creationId xmlns:a16="http://schemas.microsoft.com/office/drawing/2014/main" id="{C8ACA358-2BC6-4F25-813B-2AE14EFC40CB}"/>
-              </a:ext>
-            </a:extLst>
-          </p:cNvPr>
-          <p:cNvSpPr>
-            <a:spLocks noGrp="1"/>
-          </p:cNvSpPr>
-          <p:nvPr>
-            <p:ph sz="quarter" idx="4"/>
-          </p:nvPr>
-        </p:nvSpPr>
-        <p:spPr>
-          <a:xfrm>
-            <a:off x="6172200" y="4031087"/>
-            <a:ext cx="5183188" cy="2158576"/>
-          </a:xfrm>
-        </p:spPr>
-        <p:txBody>
-          <a:bodyPr/>
-          <a:lstStyle/>
-          <a:p>
-            <a:endParaRPr lang="en-US"/>
-          </a:p>
-        </p:txBody>
-      </p:sp>
-      <p:sp>
-        <p:nvSpPr>
-          <p:cNvPr id="7" name="Date Placeholder 6">
-            <a:extLst>
-              <a:ext uri="{FF2B5EF4-FFF2-40B4-BE49-F238E27FC236}">
-                <a16:creationId xmlns:a16="http://schemas.microsoft.com/office/drawing/2014/main" id="{D803E734-EDB2-4027-B56B-43A4DDAC0983}"/>
+          <p:cNvPr id="4" name="Date Placeholder 3">
+            <a:extLst>
+              <a:ext uri="{FF2B5EF4-FFF2-40B4-BE49-F238E27FC236}">
+                <a16:creationId xmlns:a16="http://schemas.microsoft.com/office/drawing/2014/main" id="{7DECD3FD-53A9-4F86-AF64-62CBF4395A6C}"/>
               </a:ext>
             </a:extLst>
           </p:cNvPr>
@@ -4341,9 +7694,9 @@
           <a:bodyPr/>
           <a:lstStyle/>
           <a:p>
-            <a:fld id="{9E8EF1B5-7862-49EB-B521-C2A50A72DB5A}" type="datetime1">
+            <a:fld id="{B0A2EBFB-EDCF-45C8-BE6B-B69D1DBE344E}" type="datetime1">
               <a:rPr lang="en-US" smtClean="0"/>
-              <a:t>6/13/2020</a:t>
+              <a:t>6/14/2020</a:t>
             </a:fld>
             <a:endParaRPr lang="en-US"/>
           </a:p>
@@ -4351,10 +7704,10 @@
       </p:sp>
       <p:sp>
         <p:nvSpPr>
-          <p:cNvPr id="8" name="Footer Placeholder 7">
-            <a:extLst>
-              <a:ext uri="{FF2B5EF4-FFF2-40B4-BE49-F238E27FC236}">
-                <a16:creationId xmlns:a16="http://schemas.microsoft.com/office/drawing/2014/main" id="{B5254549-3056-480F-9671-D09BBAD60FCE}"/>
+          <p:cNvPr id="5" name="Footer Placeholder 4">
+            <a:extLst>
+              <a:ext uri="{FF2B5EF4-FFF2-40B4-BE49-F238E27FC236}">
+                <a16:creationId xmlns:a16="http://schemas.microsoft.com/office/drawing/2014/main" id="{66E440FB-A01C-4D3D-8098-F5AA74DD147F}"/>
               </a:ext>
             </a:extLst>
           </p:cNvPr>
@@ -4379,10 +7732,10 @@
       </p:sp>
       <p:sp>
         <p:nvSpPr>
-          <p:cNvPr id="9" name="Slide Number Placeholder 8">
-            <a:extLst>
-              <a:ext uri="{FF2B5EF4-FFF2-40B4-BE49-F238E27FC236}">
-                <a16:creationId xmlns:a16="http://schemas.microsoft.com/office/drawing/2014/main" id="{AF5B6BE0-EEE0-45D4-93C3-D0103C47FBFA}"/>
+          <p:cNvPr id="6" name="Slide Number Placeholder 5">
+            <a:extLst>
+              <a:ext uri="{FF2B5EF4-FFF2-40B4-BE49-F238E27FC236}">
+                <a16:creationId xmlns:a16="http://schemas.microsoft.com/office/drawing/2014/main" id="{F87E9EF2-E66A-4250-B218-81C4D0E2B484}"/>
               </a:ext>
             </a:extLst>
           </p:cNvPr>
@@ -4409,7 +7762,7 @@
     </p:spTree>
     <p:extLst>
       <p:ext uri="{BB962C8B-B14F-4D97-AF65-F5344CB8AC3E}">
-        <p14:creationId xmlns:p14="http://schemas.microsoft.com/office/powerpoint/2010/main" val="2261784185"/>
+        <p14:creationId xmlns:p14="http://schemas.microsoft.com/office/powerpoint/2010/main" val="4196979530"/>
       </p:ext>
     </p:extLst>
   </p:cSld>
@@ -4441,7 +7794,7 @@
           <p:cNvPr id="2" name="Title 1">
             <a:extLst>
               <a:ext uri="{FF2B5EF4-FFF2-40B4-BE49-F238E27FC236}">
-                <a16:creationId xmlns:a16="http://schemas.microsoft.com/office/drawing/2014/main" id="{56D4E104-3990-4DB6-94C9-BF19B0688CB1}"/>
+                <a16:creationId xmlns:a16="http://schemas.microsoft.com/office/drawing/2014/main" id="{EAD6D738-D168-42F6-B6F4-EDC04DC91CD7}"/>
               </a:ext>
             </a:extLst>
           </p:cNvPr>
@@ -4452,14 +7805,19 @@
             <p:ph type="title"/>
           </p:nvPr>
         </p:nvSpPr>
-        <p:spPr/>
+        <p:spPr>
+          <a:xfrm>
+            <a:off x="839788" y="365126"/>
+            <a:ext cx="10515600" cy="596498"/>
+          </a:xfrm>
+        </p:spPr>
         <p:txBody>
           <a:bodyPr/>
           <a:lstStyle/>
           <a:p>
             <a:r>
               <a:rPr lang="en-US" dirty="0"/>
-              <a:t>Graphics for Pitches</a:t>
+              <a:t>Options</a:t>
             </a:r>
           </a:p>
         </p:txBody>
@@ -4469,7 +7827,7 @@
           <p:cNvPr id="3" name="Text Placeholder 2">
             <a:extLst>
               <a:ext uri="{FF2B5EF4-FFF2-40B4-BE49-F238E27FC236}">
-                <a16:creationId xmlns:a16="http://schemas.microsoft.com/office/drawing/2014/main" id="{D4374C92-E5D7-4BA3-9DA4-B8ABE48A3519}"/>
+                <a16:creationId xmlns:a16="http://schemas.microsoft.com/office/drawing/2014/main" id="{1B32592C-5E8D-45F8-BC60-FEDACCB4E0CC}"/>
               </a:ext>
             </a:extLst>
           </p:cNvPr>
@@ -4480,7 +7838,45 @@
             <p:ph type="body" idx="1"/>
           </p:nvPr>
         </p:nvSpPr>
-        <p:spPr/>
+        <p:spPr>
+          <a:xfrm>
+            <a:off x="839788" y="796805"/>
+            <a:ext cx="5157787" cy="823912"/>
+          </a:xfrm>
+        </p:spPr>
+        <p:txBody>
+          <a:bodyPr/>
+          <a:lstStyle/>
+          <a:p>
+            <a:r>
+              <a:rPr lang="en-US" dirty="0"/>
+              <a:t>Equal Vertical Stabilizers</a:t>
+            </a:r>
+          </a:p>
+        </p:txBody>
+      </p:sp>
+      <p:sp>
+        <p:nvSpPr>
+          <p:cNvPr id="4" name="Content Placeholder 3">
+            <a:extLst>
+              <a:ext uri="{FF2B5EF4-FFF2-40B4-BE49-F238E27FC236}">
+                <a16:creationId xmlns:a16="http://schemas.microsoft.com/office/drawing/2014/main" id="{137463C9-7371-40A4-9183-687FE5945E94}"/>
+              </a:ext>
+            </a:extLst>
+          </p:cNvPr>
+          <p:cNvSpPr>
+            <a:spLocks noGrp="1"/>
+          </p:cNvSpPr>
+          <p:nvPr>
+            <p:ph sz="half" idx="2"/>
+          </p:nvPr>
+        </p:nvSpPr>
+        <p:spPr>
+          <a:xfrm>
+            <a:off x="839788" y="4031087"/>
+            <a:ext cx="5157787" cy="2158576"/>
+          </a:xfrm>
+        </p:spPr>
         <p:txBody>
           <a:bodyPr/>
           <a:lstStyle/>
@@ -4491,10 +7887,73 @@
       </p:sp>
       <p:sp>
         <p:nvSpPr>
-          <p:cNvPr id="4" name="Date Placeholder 3">
-            <a:extLst>
-              <a:ext uri="{FF2B5EF4-FFF2-40B4-BE49-F238E27FC236}">
-                <a16:creationId xmlns:a16="http://schemas.microsoft.com/office/drawing/2014/main" id="{E16AAF9F-B4FB-4335-B8E4-34A239374E6E}"/>
+          <p:cNvPr id="5" name="Text Placeholder 4">
+            <a:extLst>
+              <a:ext uri="{FF2B5EF4-FFF2-40B4-BE49-F238E27FC236}">
+                <a16:creationId xmlns:a16="http://schemas.microsoft.com/office/drawing/2014/main" id="{E828FC68-8E21-471A-911A-DDD2BCF1EE3F}"/>
+              </a:ext>
+            </a:extLst>
+          </p:cNvPr>
+          <p:cNvSpPr>
+            <a:spLocks noGrp="1"/>
+          </p:cNvSpPr>
+          <p:nvPr>
+            <p:ph type="body" sz="quarter" idx="3"/>
+          </p:nvPr>
+        </p:nvSpPr>
+        <p:spPr>
+          <a:xfrm>
+            <a:off x="6172200" y="796805"/>
+            <a:ext cx="5183188" cy="823912"/>
+          </a:xfrm>
+        </p:spPr>
+        <p:txBody>
+          <a:bodyPr/>
+          <a:lstStyle/>
+          <a:p>
+            <a:r>
+              <a:rPr lang="en-US" dirty="0"/>
+              <a:t>Single Center Vertical Stabilizer</a:t>
+            </a:r>
+          </a:p>
+        </p:txBody>
+      </p:sp>
+      <p:sp>
+        <p:nvSpPr>
+          <p:cNvPr id="6" name="Content Placeholder 5">
+            <a:extLst>
+              <a:ext uri="{FF2B5EF4-FFF2-40B4-BE49-F238E27FC236}">
+                <a16:creationId xmlns:a16="http://schemas.microsoft.com/office/drawing/2014/main" id="{C8ACA358-2BC6-4F25-813B-2AE14EFC40CB}"/>
+              </a:ext>
+            </a:extLst>
+          </p:cNvPr>
+          <p:cNvSpPr>
+            <a:spLocks noGrp="1"/>
+          </p:cNvSpPr>
+          <p:nvPr>
+            <p:ph sz="quarter" idx="4"/>
+          </p:nvPr>
+        </p:nvSpPr>
+        <p:spPr>
+          <a:xfrm>
+            <a:off x="6172200" y="4031087"/>
+            <a:ext cx="5183188" cy="2158576"/>
+          </a:xfrm>
+        </p:spPr>
+        <p:txBody>
+          <a:bodyPr/>
+          <a:lstStyle/>
+          <a:p>
+            <a:endParaRPr lang="en-US"/>
+          </a:p>
+        </p:txBody>
+      </p:sp>
+      <p:sp>
+        <p:nvSpPr>
+          <p:cNvPr id="7" name="Date Placeholder 6">
+            <a:extLst>
+              <a:ext uri="{FF2B5EF4-FFF2-40B4-BE49-F238E27FC236}">
+                <a16:creationId xmlns:a16="http://schemas.microsoft.com/office/drawing/2014/main" id="{D803E734-EDB2-4027-B56B-43A4DDAC0983}"/>
               </a:ext>
             </a:extLst>
           </p:cNvPr>
@@ -4510,9 +7969,9 @@
           <a:bodyPr/>
           <a:lstStyle/>
           <a:p>
-            <a:fld id="{B0A2EBFB-EDCF-45C8-BE6B-B69D1DBE344E}" type="datetime1">
+            <a:fld id="{9E8EF1B5-7862-49EB-B521-C2A50A72DB5A}" type="datetime1">
               <a:rPr lang="en-US" smtClean="0"/>
-              <a:t>6/13/2020</a:t>
+              <a:t>6/14/2020</a:t>
             </a:fld>
             <a:endParaRPr lang="en-US"/>
           </a:p>
@@ -4520,10 +7979,10 @@
       </p:sp>
       <p:sp>
         <p:nvSpPr>
-          <p:cNvPr id="5" name="Footer Placeholder 4">
-            <a:extLst>
-              <a:ext uri="{FF2B5EF4-FFF2-40B4-BE49-F238E27FC236}">
-                <a16:creationId xmlns:a16="http://schemas.microsoft.com/office/drawing/2014/main" id="{F3318AEB-0D19-4C31-A214-88CEC3258B71}"/>
+          <p:cNvPr id="8" name="Footer Placeholder 7">
+            <a:extLst>
+              <a:ext uri="{FF2B5EF4-FFF2-40B4-BE49-F238E27FC236}">
+                <a16:creationId xmlns:a16="http://schemas.microsoft.com/office/drawing/2014/main" id="{B5254549-3056-480F-9671-D09BBAD60FCE}"/>
               </a:ext>
             </a:extLst>
           </p:cNvPr>
@@ -4548,10 +8007,10 @@
       </p:sp>
       <p:sp>
         <p:nvSpPr>
-          <p:cNvPr id="6" name="Slide Number Placeholder 5">
-            <a:extLst>
-              <a:ext uri="{FF2B5EF4-FFF2-40B4-BE49-F238E27FC236}">
-                <a16:creationId xmlns:a16="http://schemas.microsoft.com/office/drawing/2014/main" id="{D06A849B-4146-4829-B5CF-0199BBCF381F}"/>
+          <p:cNvPr id="9" name="Slide Number Placeholder 8">
+            <a:extLst>
+              <a:ext uri="{FF2B5EF4-FFF2-40B4-BE49-F238E27FC236}">
+                <a16:creationId xmlns:a16="http://schemas.microsoft.com/office/drawing/2014/main" id="{AF5B6BE0-EEE0-45D4-93C3-D0103C47FBFA}"/>
               </a:ext>
             </a:extLst>
           </p:cNvPr>
@@ -4570,6 +8029,175 @@
             <a:fld id="{A7F4FF59-E917-45B2-BF6D-2D6762FCD355}" type="slidenum">
               <a:rPr lang="en-US" smtClean="0"/>
               <a:t>7</a:t>
+            </a:fld>
+            <a:endParaRPr lang="en-US"/>
+          </a:p>
+        </p:txBody>
+      </p:sp>
+    </p:spTree>
+    <p:extLst>
+      <p:ext uri="{BB962C8B-B14F-4D97-AF65-F5344CB8AC3E}">
+        <p14:creationId xmlns:p14="http://schemas.microsoft.com/office/powerpoint/2010/main" val="2261784185"/>
+      </p:ext>
+    </p:extLst>
+  </p:cSld>
+  <p:clrMapOvr>
+    <a:masterClrMapping/>
+  </p:clrMapOvr>
+</p:sld>
+</file>
+
+<file path=ppt/slides/slide8.xml><?xml version="1.0" encoding="utf-8"?>
+<p:sld xmlns:a="http://schemas.openxmlformats.org/drawingml/2006/main" xmlns:r="http://schemas.openxmlformats.org/officeDocument/2006/relationships" xmlns:p="http://schemas.openxmlformats.org/presentationml/2006/main">
+  <p:cSld>
+    <p:spTree>
+      <p:nvGrpSpPr>
+        <p:cNvPr id="1" name=""/>
+        <p:cNvGrpSpPr/>
+        <p:nvPr/>
+      </p:nvGrpSpPr>
+      <p:grpSpPr>
+        <a:xfrm>
+          <a:off x="0" y="0"/>
+          <a:ext cx="0" cy="0"/>
+          <a:chOff x="0" y="0"/>
+          <a:chExt cx="0" cy="0"/>
+        </a:xfrm>
+      </p:grpSpPr>
+      <p:sp>
+        <p:nvSpPr>
+          <p:cNvPr id="2" name="Title 1">
+            <a:extLst>
+              <a:ext uri="{FF2B5EF4-FFF2-40B4-BE49-F238E27FC236}">
+                <a16:creationId xmlns:a16="http://schemas.microsoft.com/office/drawing/2014/main" id="{56D4E104-3990-4DB6-94C9-BF19B0688CB1}"/>
+              </a:ext>
+            </a:extLst>
+          </p:cNvPr>
+          <p:cNvSpPr>
+            <a:spLocks noGrp="1"/>
+          </p:cNvSpPr>
+          <p:nvPr>
+            <p:ph type="title"/>
+          </p:nvPr>
+        </p:nvSpPr>
+        <p:spPr/>
+        <p:txBody>
+          <a:bodyPr/>
+          <a:lstStyle/>
+          <a:p>
+            <a:r>
+              <a:rPr lang="en-US" dirty="0"/>
+              <a:t>Graphics for Pitches</a:t>
+            </a:r>
+          </a:p>
+        </p:txBody>
+      </p:sp>
+      <p:sp>
+        <p:nvSpPr>
+          <p:cNvPr id="3" name="Text Placeholder 2">
+            <a:extLst>
+              <a:ext uri="{FF2B5EF4-FFF2-40B4-BE49-F238E27FC236}">
+                <a16:creationId xmlns:a16="http://schemas.microsoft.com/office/drawing/2014/main" id="{D4374C92-E5D7-4BA3-9DA4-B8ABE48A3519}"/>
+              </a:ext>
+            </a:extLst>
+          </p:cNvPr>
+          <p:cNvSpPr>
+            <a:spLocks noGrp="1"/>
+          </p:cNvSpPr>
+          <p:nvPr>
+            <p:ph type="body" idx="1"/>
+          </p:nvPr>
+        </p:nvSpPr>
+        <p:spPr/>
+        <p:txBody>
+          <a:bodyPr/>
+          <a:lstStyle/>
+          <a:p>
+            <a:endParaRPr lang="en-US"/>
+          </a:p>
+        </p:txBody>
+      </p:sp>
+      <p:sp>
+        <p:nvSpPr>
+          <p:cNvPr id="4" name="Date Placeholder 3">
+            <a:extLst>
+              <a:ext uri="{FF2B5EF4-FFF2-40B4-BE49-F238E27FC236}">
+                <a16:creationId xmlns:a16="http://schemas.microsoft.com/office/drawing/2014/main" id="{E16AAF9F-B4FB-4335-B8E4-34A239374E6E}"/>
+              </a:ext>
+            </a:extLst>
+          </p:cNvPr>
+          <p:cNvSpPr>
+            <a:spLocks noGrp="1"/>
+          </p:cNvSpPr>
+          <p:nvPr>
+            <p:ph type="dt" sz="half" idx="10"/>
+          </p:nvPr>
+        </p:nvSpPr>
+        <p:spPr/>
+        <p:txBody>
+          <a:bodyPr/>
+          <a:lstStyle/>
+          <a:p>
+            <a:fld id="{B0A2EBFB-EDCF-45C8-BE6B-B69D1DBE344E}" type="datetime1">
+              <a:rPr lang="en-US" smtClean="0"/>
+              <a:t>6/14/2020</a:t>
+            </a:fld>
+            <a:endParaRPr lang="en-US"/>
+          </a:p>
+        </p:txBody>
+      </p:sp>
+      <p:sp>
+        <p:nvSpPr>
+          <p:cNvPr id="5" name="Footer Placeholder 4">
+            <a:extLst>
+              <a:ext uri="{FF2B5EF4-FFF2-40B4-BE49-F238E27FC236}">
+                <a16:creationId xmlns:a16="http://schemas.microsoft.com/office/drawing/2014/main" id="{F3318AEB-0D19-4C31-A214-88CEC3258B71}"/>
+              </a:ext>
+            </a:extLst>
+          </p:cNvPr>
+          <p:cNvSpPr>
+            <a:spLocks noGrp="1"/>
+          </p:cNvSpPr>
+          <p:nvPr>
+            <p:ph type="ftr" sz="quarter" idx="11"/>
+          </p:nvPr>
+        </p:nvSpPr>
+        <p:spPr/>
+        <p:txBody>
+          <a:bodyPr/>
+          <a:lstStyle/>
+          <a:p>
+            <a:r>
+              <a:rPr lang="en-US"/>
+              <a:t>Peter Sharpe, MIT AeroAstro</a:t>
+            </a:r>
+          </a:p>
+        </p:txBody>
+      </p:sp>
+      <p:sp>
+        <p:nvSpPr>
+          <p:cNvPr id="6" name="Slide Number Placeholder 5">
+            <a:extLst>
+              <a:ext uri="{FF2B5EF4-FFF2-40B4-BE49-F238E27FC236}">
+                <a16:creationId xmlns:a16="http://schemas.microsoft.com/office/drawing/2014/main" id="{D06A849B-4146-4829-B5CF-0199BBCF381F}"/>
+              </a:ext>
+            </a:extLst>
+          </p:cNvPr>
+          <p:cNvSpPr>
+            <a:spLocks noGrp="1"/>
+          </p:cNvSpPr>
+          <p:nvPr>
+            <p:ph type="sldNum" sz="quarter" idx="12"/>
+          </p:nvPr>
+        </p:nvSpPr>
+        <p:spPr/>
+        <p:txBody>
+          <a:bodyPr/>
+          <a:lstStyle/>
+          <a:p>
+            <a:fld id="{A7F4FF59-E917-45B2-BF6D-2D6762FCD355}" type="slidenum">
+              <a:rPr lang="en-US" smtClean="0"/>
+              <a:t>8</a:t>
             </a:fld>
             <a:endParaRPr lang="en-US"/>
           </a:p>
@@ -4790,6 +8418,266 @@
 </file>
 
 <file path=ppt/theme/theme2.xml><?xml version="1.0" encoding="utf-8"?>
+<a:theme xmlns:a="http://schemas.openxmlformats.org/drawingml/2006/main" name="Parcel">
+  <a:themeElements>
+    <a:clrScheme name="Parcel">
+      <a:dk1>
+        <a:srgbClr val="000000"/>
+      </a:dk1>
+      <a:lt1>
+        <a:srgbClr val="FFFFFF"/>
+      </a:lt1>
+      <a:dk2>
+        <a:srgbClr val="4A5356"/>
+      </a:dk2>
+      <a:lt2>
+        <a:srgbClr val="E8E3CE"/>
+      </a:lt2>
+      <a:accent1>
+        <a:srgbClr val="F6A21D"/>
+      </a:accent1>
+      <a:accent2>
+        <a:srgbClr val="9BAFB5"/>
+      </a:accent2>
+      <a:accent3>
+        <a:srgbClr val="C96731"/>
+      </a:accent3>
+      <a:accent4>
+        <a:srgbClr val="9CA383"/>
+      </a:accent4>
+      <a:accent5>
+        <a:srgbClr val="87795D"/>
+      </a:accent5>
+      <a:accent6>
+        <a:srgbClr val="A0988C"/>
+      </a:accent6>
+      <a:hlink>
+        <a:srgbClr val="00B0F0"/>
+      </a:hlink>
+      <a:folHlink>
+        <a:srgbClr val="738F97"/>
+      </a:folHlink>
+    </a:clrScheme>
+    <a:fontScheme name="Parcel">
+      <a:majorFont>
+        <a:latin typeface="Gill Sans MT" panose="020B0502020104020203"/>
+        <a:ea typeface=""/>
+        <a:cs typeface=""/>
+        <a:font script="Grek" typeface="Corbel"/>
+        <a:font script="Cyrl" typeface="Corbel"/>
+        <a:font script="Jpan" typeface="HGｺﾞｼｯｸE"/>
+        <a:font script="Hang" typeface="휴먼매직체"/>
+        <a:font script="Hans" typeface="华文中宋"/>
+        <a:font script="Hant" typeface="微軟正黑體"/>
+        <a:font script="Arab" typeface="Majalla UI"/>
+        <a:font script="Hebr" typeface="Arial"/>
+        <a:font script="Thai" typeface="Cordia New"/>
+        <a:font script="Ethi" typeface="Nyala"/>
+        <a:font script="Beng" typeface="Vrinda"/>
+        <a:font script="Gujr" typeface="Shruti"/>
+        <a:font script="Khmr" typeface="DaunPenh"/>
+        <a:font script="Knda" typeface="Tunga"/>
+        <a:font script="Guru" typeface="Raavi"/>
+        <a:font script="Cans" typeface="Euphemia"/>
+        <a:font script="Cher" typeface="Plantagenet Cherokee"/>
+        <a:font script="Yiii" typeface="Microsoft Yi Baiti"/>
+        <a:font script="Tibt" typeface="Microsoft Himalaya"/>
+        <a:font script="Thaa" typeface="MV Boli"/>
+        <a:font script="Deva" typeface="Mangal"/>
+        <a:font script="Telu" typeface="Gautami"/>
+        <a:font script="Taml" typeface="Latha"/>
+        <a:font script="Syrc" typeface="Estrangelo Edessa"/>
+        <a:font script="Orya" typeface="Kalinga"/>
+        <a:font script="Mlym" typeface="Kartika"/>
+        <a:font script="Laoo" typeface="DokChampa"/>
+        <a:font script="Sinh" typeface="Iskoola Pota"/>
+        <a:font script="Mong" typeface="Mongolian Baiti"/>
+        <a:font script="Viet" typeface="Tahoma"/>
+        <a:font script="Uigh" typeface="Microsoft Uighur"/>
+        <a:font script="Geor" typeface="Sylfaen"/>
+      </a:majorFont>
+      <a:minorFont>
+        <a:latin typeface="Gill Sans MT" panose="020B0502020104020203"/>
+        <a:ea typeface=""/>
+        <a:cs typeface=""/>
+        <a:font script="Grek" typeface="Corbel"/>
+        <a:font script="Cyrl" typeface="Corbel"/>
+        <a:font script="Jpan" typeface="HGｺﾞｼｯｸE"/>
+        <a:font script="Hang" typeface="휴먼매직체"/>
+        <a:font script="Hans" typeface="华文中宋"/>
+        <a:font script="Hant" typeface="微軟正黑體"/>
+        <a:font script="Arab" typeface="Majalla UI"/>
+        <a:font script="Hebr" typeface="Arial"/>
+        <a:font script="Thai" typeface="Cordia New"/>
+        <a:font script="Ethi" typeface="Nyala"/>
+        <a:font script="Beng" typeface="Vrinda"/>
+        <a:font script="Gujr" typeface="Shruti"/>
+        <a:font script="Khmr" typeface="DaunPenh"/>
+        <a:font script="Knda" typeface="Tunga"/>
+        <a:font script="Guru" typeface="Raavi"/>
+        <a:font script="Cans" typeface="Euphemia"/>
+        <a:font script="Cher" typeface="Plantagenet Cherokee"/>
+        <a:font script="Yiii" typeface="Microsoft Yi Baiti"/>
+        <a:font script="Tibt" typeface="Microsoft Himalaya"/>
+        <a:font script="Thaa" typeface="MV Boli"/>
+        <a:font script="Deva" typeface="Mangal"/>
+        <a:font script="Telu" typeface="Gautami"/>
+        <a:font script="Taml" typeface="Latha"/>
+        <a:font script="Syrc" typeface="Estrangelo Edessa"/>
+        <a:font script="Orya" typeface="Kalinga"/>
+        <a:font script="Mlym" typeface="Kartika"/>
+        <a:font script="Laoo" typeface="DokChampa"/>
+        <a:font script="Sinh" typeface="Iskoola Pota"/>
+        <a:font script="Mong" typeface="Mongolian Baiti"/>
+        <a:font script="Viet" typeface="Tahoma"/>
+        <a:font script="Uigh" typeface="Microsoft Uighur"/>
+        <a:font script="Geor" typeface="Sylfaen"/>
+      </a:minorFont>
+    </a:fontScheme>
+    <a:fmtScheme name="Parcel">
+      <a:fillStyleLst>
+        <a:solidFill>
+          <a:schemeClr val="phClr"/>
+        </a:solidFill>
+        <a:gradFill rotWithShape="1">
+          <a:gsLst>
+            <a:gs pos="0">
+              <a:schemeClr val="phClr">
+                <a:tint val="80000"/>
+                <a:satMod val="107000"/>
+                <a:lumMod val="103000"/>
+              </a:schemeClr>
+            </a:gs>
+            <a:gs pos="100000">
+              <a:schemeClr val="phClr">
+                <a:tint val="82000"/>
+                <a:satMod val="109000"/>
+                <a:lumMod val="103000"/>
+              </a:schemeClr>
+            </a:gs>
+          </a:gsLst>
+          <a:lin ang="5400000" scaled="0"/>
+        </a:gradFill>
+        <a:gradFill rotWithShape="1">
+          <a:gsLst>
+            <a:gs pos="0">
+              <a:schemeClr val="phClr">
+                <a:tint val="97000"/>
+                <a:satMod val="100000"/>
+                <a:lumMod val="102000"/>
+              </a:schemeClr>
+            </a:gs>
+            <a:gs pos="50000">
+              <a:schemeClr val="phClr">
+                <a:shade val="100000"/>
+                <a:satMod val="103000"/>
+                <a:lumMod val="100000"/>
+              </a:schemeClr>
+            </a:gs>
+            <a:gs pos="100000">
+              <a:schemeClr val="phClr">
+                <a:shade val="93000"/>
+                <a:satMod val="110000"/>
+                <a:lumMod val="99000"/>
+              </a:schemeClr>
+            </a:gs>
+          </a:gsLst>
+          <a:lin ang="5400000" scaled="0"/>
+        </a:gradFill>
+      </a:fillStyleLst>
+      <a:lnStyleLst>
+        <a:ln w="6350" cap="flat" cmpd="sng" algn="ctr">
+          <a:solidFill>
+            <a:schemeClr val="phClr"/>
+          </a:solidFill>
+          <a:prstDash val="solid"/>
+        </a:ln>
+        <a:ln w="12700" cap="flat" cmpd="sng" algn="ctr">
+          <a:solidFill>
+            <a:schemeClr val="phClr"/>
+          </a:solidFill>
+          <a:prstDash val="solid"/>
+        </a:ln>
+        <a:ln w="31750" cap="flat" cmpd="sng" algn="ctr">
+          <a:solidFill>
+            <a:schemeClr val="phClr"/>
+          </a:solidFill>
+          <a:prstDash val="solid"/>
+        </a:ln>
+      </a:lnStyleLst>
+      <a:effectStyleLst>
+        <a:effectStyle>
+          <a:effectLst/>
+        </a:effectStyle>
+        <a:effectStyle>
+          <a:effectLst/>
+        </a:effectStyle>
+        <a:effectStyle>
+          <a:effectLst>
+            <a:outerShdw blurRad="55880" dist="15240" dir="5400000" algn="ctr" rotWithShape="0">
+              <a:srgbClr val="000000">
+                <a:alpha val="45000"/>
+              </a:srgbClr>
+            </a:outerShdw>
+          </a:effectLst>
+          <a:scene3d>
+            <a:camera prst="orthographicFront">
+              <a:rot lat="0" lon="0" rev="0"/>
+            </a:camera>
+            <a:lightRig rig="brightRoom" dir="tl"/>
+          </a:scene3d>
+          <a:sp3d prstMaterial="dkEdge">
+            <a:bevelT w="0" h="0"/>
+          </a:sp3d>
+        </a:effectStyle>
+      </a:effectStyleLst>
+      <a:bgFillStyleLst>
+        <a:solidFill>
+          <a:schemeClr val="phClr"/>
+        </a:solidFill>
+        <a:solidFill>
+          <a:schemeClr val="phClr">
+            <a:tint val="95000"/>
+            <a:satMod val="170000"/>
+          </a:schemeClr>
+        </a:solidFill>
+        <a:gradFill rotWithShape="1">
+          <a:gsLst>
+            <a:gs pos="0">
+              <a:schemeClr val="phClr">
+                <a:tint val="97000"/>
+                <a:shade val="100000"/>
+                <a:satMod val="185000"/>
+                <a:lumMod val="120000"/>
+              </a:schemeClr>
+            </a:gs>
+            <a:gs pos="100000">
+              <a:schemeClr val="phClr">
+                <a:tint val="96000"/>
+                <a:shade val="95000"/>
+                <a:satMod val="215000"/>
+                <a:lumMod val="80000"/>
+              </a:schemeClr>
+            </a:gs>
+          </a:gsLst>
+          <a:path path="circle">
+            <a:fillToRect l="50000" t="55000" r="125000" b="100000"/>
+          </a:path>
+        </a:gradFill>
+      </a:bgFillStyleLst>
+    </a:fmtScheme>
+  </a:themeElements>
+  <a:objectDefaults/>
+  <a:extraClrSchemeLst/>
+  <a:extLst>
+    <a:ext uri="{05A4C25C-085E-4340-85A3-A5531E510DB2}">
+      <thm15:themeFamily xmlns:thm15="http://schemas.microsoft.com/office/thememl/2012/main" name="Parcel" id="{8BEC4385-4EB9-4D53-BFB5-0EA123736B6D}" vid="{4DB32801-28C0-48B0-8C1D-A9A58613615A}"/>
+    </a:ext>
+  </a:extLst>
+</a:theme>
+</file>
+
+<file path=ppt/theme/theme3.xml><?xml version="1.0" encoding="utf-8"?>
 <a:theme xmlns:a="http://schemas.openxmlformats.org/drawingml/2006/main" name="Office Theme">
   <a:themeElements>
     <a:clrScheme name="Office">

</xml_diff>